<commit_message>
update knn slides and Rmd
</commit_message>
<xml_diff>
--- a/slides/w6p1-knn/w6p1.pptx
+++ b/slides/w6p1-knn/w6p1.pptx
@@ -48,23 +48,24 @@
     <p:sldId id="424" r:id="rId42"/>
     <p:sldId id="389" r:id="rId43"/>
     <p:sldId id="397" r:id="rId44"/>
-    <p:sldId id="398" r:id="rId45"/>
-    <p:sldId id="404" r:id="rId46"/>
-    <p:sldId id="405" r:id="rId47"/>
-    <p:sldId id="406" r:id="rId48"/>
-    <p:sldId id="407" r:id="rId49"/>
-    <p:sldId id="408" r:id="rId50"/>
-    <p:sldId id="409" r:id="rId51"/>
-    <p:sldId id="410" r:id="rId52"/>
-    <p:sldId id="425" r:id="rId53"/>
-    <p:sldId id="387" r:id="rId54"/>
-    <p:sldId id="426" r:id="rId55"/>
-    <p:sldId id="427" r:id="rId56"/>
-    <p:sldId id="428" r:id="rId57"/>
-    <p:sldId id="429" r:id="rId58"/>
-    <p:sldId id="430" r:id="rId59"/>
-    <p:sldId id="370" r:id="rId60"/>
-    <p:sldId id="371" r:id="rId61"/>
+    <p:sldId id="432" r:id="rId45"/>
+    <p:sldId id="398" r:id="rId46"/>
+    <p:sldId id="404" r:id="rId47"/>
+    <p:sldId id="405" r:id="rId48"/>
+    <p:sldId id="406" r:id="rId49"/>
+    <p:sldId id="407" r:id="rId50"/>
+    <p:sldId id="408" r:id="rId51"/>
+    <p:sldId id="409" r:id="rId52"/>
+    <p:sldId id="410" r:id="rId53"/>
+    <p:sldId id="425" r:id="rId54"/>
+    <p:sldId id="387" r:id="rId55"/>
+    <p:sldId id="426" r:id="rId56"/>
+    <p:sldId id="427" r:id="rId57"/>
+    <p:sldId id="428" r:id="rId58"/>
+    <p:sldId id="429" r:id="rId59"/>
+    <p:sldId id="430" r:id="rId60"/>
+    <p:sldId id="370" r:id="rId61"/>
+    <p:sldId id="371" r:id="rId62"/>
   </p:sldIdLst>
   <p:sldSz cx="12192000" cy="6858000"/>
   <p:notesSz cx="6858000" cy="9144000"/>
@@ -319,7 +320,7 @@
                 </a:solidFill>
               </a:rPr>
               <a:pPr/>
-              <a:t>3/16/2020</a:t>
+              <a:t>3/25/2020</a:t>
             </a:fld>
             <a:endParaRPr lang="en-US">
               <a:solidFill>
@@ -519,7 +520,7 @@
                 </a:solidFill>
               </a:rPr>
               <a:pPr/>
-              <a:t>3/16/2020</a:t>
+              <a:t>3/25/2020</a:t>
             </a:fld>
             <a:endParaRPr lang="en-US">
               <a:solidFill>
@@ -729,7 +730,7 @@
                 </a:solidFill>
               </a:rPr>
               <a:pPr/>
-              <a:t>3/16/2020</a:t>
+              <a:t>3/25/2020</a:t>
             </a:fld>
             <a:endParaRPr lang="en-US">
               <a:solidFill>
@@ -929,7 +930,7 @@
                 </a:solidFill>
               </a:rPr>
               <a:pPr/>
-              <a:t>3/16/2020</a:t>
+              <a:t>3/25/2020</a:t>
             </a:fld>
             <a:endParaRPr lang="en-US">
               <a:solidFill>
@@ -1206,7 +1207,7 @@
                 </a:solidFill>
               </a:rPr>
               <a:pPr/>
-              <a:t>3/16/2020</a:t>
+              <a:t>3/25/2020</a:t>
             </a:fld>
             <a:endParaRPr lang="en-US">
               <a:solidFill>
@@ -1467,7 +1468,7 @@
                 </a:solidFill>
               </a:rPr>
               <a:pPr/>
-              <a:t>3/16/2020</a:t>
+              <a:t>3/25/2020</a:t>
             </a:fld>
             <a:endParaRPr lang="en-US">
               <a:solidFill>
@@ -1863,7 +1864,7 @@
                 </a:solidFill>
               </a:rPr>
               <a:pPr/>
-              <a:t>3/16/2020</a:t>
+              <a:t>3/25/2020</a:t>
             </a:fld>
             <a:endParaRPr lang="en-US">
               <a:solidFill>
@@ -2012,7 +2013,7 @@
                 </a:solidFill>
               </a:rPr>
               <a:pPr/>
-              <a:t>3/16/2020</a:t>
+              <a:t>3/25/2020</a:t>
             </a:fld>
             <a:endParaRPr lang="en-US">
               <a:solidFill>
@@ -2139,7 +2140,7 @@
                 </a:solidFill>
               </a:rPr>
               <a:pPr/>
-              <a:t>3/16/2020</a:t>
+              <a:t>3/25/2020</a:t>
             </a:fld>
             <a:endParaRPr lang="en-US">
               <a:solidFill>
@@ -2446,7 +2447,7 @@
                 </a:solidFill>
               </a:rPr>
               <a:pPr/>
-              <a:t>3/16/2020</a:t>
+              <a:t>3/25/2020</a:t>
             </a:fld>
             <a:endParaRPr lang="en-US">
               <a:solidFill>
@@ -2730,7 +2731,7 @@
                 </a:solidFill>
               </a:rPr>
               <a:pPr/>
-              <a:t>3/16/2020</a:t>
+              <a:t>3/25/2020</a:t>
             </a:fld>
             <a:endParaRPr lang="en-US">
               <a:solidFill>
@@ -2973,7 +2974,7 @@
                 </a:solidFill>
               </a:rPr>
               <a:pPr/>
-              <a:t>3/16/2020</a:t>
+              <a:t>3/25/2020</a:t>
             </a:fld>
             <a:endParaRPr lang="en-US">
               <a:solidFill>
@@ -21331,6 +21332,41 @@
           </a:p>
         </p:txBody>
       </p:sp>
+      <p:sp>
+        <p:nvSpPr>
+          <p:cNvPr id="5" name="TextBox 4">
+            <a:extLst>
+              <a:ext uri="{FF2B5EF4-FFF2-40B4-BE49-F238E27FC236}">
+                <a16:creationId xmlns:a16="http://schemas.microsoft.com/office/drawing/2014/main" id="{B3ABF169-00F8-44A9-8ED9-640C62C26C23}"/>
+              </a:ext>
+            </a:extLst>
+          </p:cNvPr>
+          <p:cNvSpPr txBox="1"/>
+          <p:nvPr/>
+        </p:nvSpPr>
+        <p:spPr>
+          <a:xfrm>
+            <a:off x="769620" y="5882640"/>
+            <a:ext cx="6667500" cy="492443"/>
+          </a:xfrm>
+          <a:prstGeom prst="rect">
+            <a:avLst/>
+          </a:prstGeom>
+          <a:noFill/>
+        </p:spPr>
+        <p:txBody>
+          <a:bodyPr wrap="square" rtlCol="0">
+            <a:spAutoFit/>
+          </a:bodyPr>
+          <a:lstStyle/>
+          <a:p>
+            <a:r>
+              <a:rPr lang="en-US" sz="2600" dirty="0"/>
+              <a:t>Two ways to address this</a:t>
+            </a:r>
+          </a:p>
+        </p:txBody>
+      </p:sp>
     </p:spTree>
     <p:extLst>
       <p:ext uri="{BB962C8B-B14F-4D97-AF65-F5344CB8AC3E}">
@@ -21341,10 +21377,1335 @@
   <p:clrMapOvr>
     <a:masterClrMapping/>
   </p:clrMapOvr>
+  <p:timing>
+    <p:tnLst>
+      <p:par>
+        <p:cTn id="1" dur="indefinite" restart="never" nodeType="tmRoot">
+          <p:childTnLst>
+            <p:seq concurrent="1" nextAc="seek">
+              <p:cTn id="2" dur="indefinite" nodeType="mainSeq">
+                <p:childTnLst>
+                  <p:par>
+                    <p:cTn id="3" fill="hold">
+                      <p:stCondLst>
+                        <p:cond delay="indefinite"/>
+                      </p:stCondLst>
+                      <p:childTnLst>
+                        <p:par>
+                          <p:cTn id="4" fill="hold">
+                            <p:stCondLst>
+                              <p:cond delay="0"/>
+                            </p:stCondLst>
+                            <p:childTnLst>
+                              <p:par>
+                                <p:cTn id="5" presetID="1" presetClass="entr" presetSubtype="0" fill="hold" grpId="0" nodeType="clickEffect">
+                                  <p:stCondLst>
+                                    <p:cond delay="0"/>
+                                  </p:stCondLst>
+                                  <p:childTnLst>
+                                    <p:set>
+                                      <p:cBhvr>
+                                        <p:cTn id="6" dur="1" fill="hold">
+                                          <p:stCondLst>
+                                            <p:cond delay="0"/>
+                                          </p:stCondLst>
+                                        </p:cTn>
+                                        <p:tgtEl>
+                                          <p:spTgt spid="5"/>
+                                        </p:tgtEl>
+                                        <p:attrNameLst>
+                                          <p:attrName>style.visibility</p:attrName>
+                                        </p:attrNameLst>
+                                      </p:cBhvr>
+                                      <p:to>
+                                        <p:strVal val="visible"/>
+                                      </p:to>
+                                    </p:set>
+                                  </p:childTnLst>
+                                </p:cTn>
+                              </p:par>
+                            </p:childTnLst>
+                          </p:cTn>
+                        </p:par>
+                      </p:childTnLst>
+                    </p:cTn>
+                  </p:par>
+                </p:childTnLst>
+              </p:cTn>
+              <p:prevCondLst>
+                <p:cond evt="onPrev" delay="0">
+                  <p:tgtEl>
+                    <p:sldTgt/>
+                  </p:tgtEl>
+                </p:cond>
+              </p:prevCondLst>
+              <p:nextCondLst>
+                <p:cond evt="onNext" delay="0">
+                  <p:tgtEl>
+                    <p:sldTgt/>
+                  </p:tgtEl>
+                </p:cond>
+              </p:nextCondLst>
+            </p:seq>
+          </p:childTnLst>
+        </p:cTn>
+      </p:par>
+    </p:tnLst>
+    <p:bldLst>
+      <p:bldP spid="5" grpId="0"/>
+    </p:bldLst>
+  </p:timing>
 </p:sld>
 </file>
 
 <file path=ppt/slides/slide44.xml><?xml version="1.0" encoding="utf-8"?>
+<p:sld xmlns:a="http://schemas.openxmlformats.org/drawingml/2006/main" xmlns:r="http://schemas.openxmlformats.org/officeDocument/2006/relationships" xmlns:p="http://schemas.openxmlformats.org/presentationml/2006/main">
+  <p:cSld>
+    <p:bg>
+      <p:bgPr>
+        <a:solidFill>
+          <a:schemeClr val="bg1"/>
+        </a:solidFill>
+        <a:effectLst/>
+      </p:bgPr>
+    </p:bg>
+    <p:spTree>
+      <p:nvGrpSpPr>
+        <p:cNvPr id="1" name=""/>
+        <p:cNvGrpSpPr/>
+        <p:nvPr/>
+      </p:nvGrpSpPr>
+      <p:grpSpPr>
+        <a:xfrm>
+          <a:off x="0" y="0"/>
+          <a:ext cx="0" cy="0"/>
+          <a:chOff x="0" y="0"/>
+          <a:chExt cx="0" cy="0"/>
+        </a:xfrm>
+      </p:grpSpPr>
+      <p:sp>
+        <p:nvSpPr>
+          <p:cNvPr id="2" name="Title 1">
+            <a:extLst>
+              <a:ext uri="{FF2B5EF4-FFF2-40B4-BE49-F238E27FC236}">
+                <a16:creationId xmlns:a16="http://schemas.microsoft.com/office/drawing/2014/main" id="{4230D80E-A2DA-43E1-A9D6-8303A9620295}"/>
+              </a:ext>
+            </a:extLst>
+          </p:cNvPr>
+          <p:cNvSpPr>
+            <a:spLocks noGrp="1"/>
+          </p:cNvSpPr>
+          <p:nvPr>
+            <p:ph type="title"/>
+          </p:nvPr>
+        </p:nvSpPr>
+        <p:spPr>
+          <a:xfrm>
+            <a:off x="838200" y="18255"/>
+            <a:ext cx="10515600" cy="1325563"/>
+          </a:xfrm>
+        </p:spPr>
+        <p:txBody>
+          <a:bodyPr>
+            <a:normAutofit/>
+          </a:bodyPr>
+          <a:lstStyle/>
+          <a:p>
+            <a:r>
+              <a:rPr lang="en-US" sz="4000" dirty="0"/>
+              <a:t>(1) use the arguments within the hyperparameters</a:t>
+            </a:r>
+          </a:p>
+        </p:txBody>
+      </p:sp>
+      <p:sp>
+        <p:nvSpPr>
+          <p:cNvPr id="3" name="Content Placeholder 2">
+            <a:extLst>
+              <a:ext uri="{FF2B5EF4-FFF2-40B4-BE49-F238E27FC236}">
+                <a16:creationId xmlns:a16="http://schemas.microsoft.com/office/drawing/2014/main" id="{8AA8DBE0-D4D6-45C1-8FD5-AC7EC57AF2BC}"/>
+              </a:ext>
+            </a:extLst>
+          </p:cNvPr>
+          <p:cNvSpPr>
+            <a:spLocks noGrp="1"/>
+          </p:cNvSpPr>
+          <p:nvPr>
+            <p:ph idx="1"/>
+          </p:nvPr>
+        </p:nvSpPr>
+        <p:spPr>
+          <a:xfrm>
+            <a:off x="198120" y="1335881"/>
+            <a:ext cx="11993880" cy="4841082"/>
+          </a:xfrm>
+        </p:spPr>
+        <p:txBody>
+          <a:bodyPr>
+            <a:normAutofit/>
+          </a:bodyPr>
+          <a:lstStyle/>
+          <a:p>
+            <a:pPr marL="0" indent="0">
+              <a:spcBef>
+                <a:spcPts val="0"/>
+              </a:spcBef>
+              <a:buNone/>
+            </a:pPr>
+            <a:r>
+              <a:rPr lang="en-US" sz="2200" dirty="0">
+                <a:latin typeface="Courier New" panose="02070309020205020404" pitchFamily="49" charset="0"/>
+                <a:cs typeface="Courier New" panose="02070309020205020404" pitchFamily="49" charset="0"/>
+              </a:rPr>
+              <a:t>?neighbors()</a:t>
+            </a:r>
+          </a:p>
+          <a:p>
+            <a:pPr marL="0" indent="0">
+              <a:spcBef>
+                <a:spcPts val="0"/>
+              </a:spcBef>
+              <a:buNone/>
+            </a:pPr>
+            <a:r>
+              <a:rPr lang="en-US" sz="2200" dirty="0">
+                <a:highlight>
+                  <a:srgbClr val="C0C0C0"/>
+                </a:highlight>
+                <a:latin typeface="Courier New" panose="02070309020205020404" pitchFamily="49" charset="0"/>
+                <a:cs typeface="Courier New" panose="02070309020205020404" pitchFamily="49" charset="0"/>
+              </a:rPr>
+              <a:t>neighbors(range = c(1L, 10L), trans = NULL)</a:t>
+            </a:r>
+          </a:p>
+          <a:p>
+            <a:pPr marL="0" indent="0">
+              <a:spcBef>
+                <a:spcPts val="0"/>
+              </a:spcBef>
+              <a:buNone/>
+            </a:pPr>
+            <a:r>
+              <a:rPr lang="en-US" sz="2200" dirty="0">
+                <a:latin typeface="Courier New" panose="02070309020205020404" pitchFamily="49" charset="0"/>
+                <a:cs typeface="Courier New" panose="02070309020205020404" pitchFamily="49" charset="0"/>
+              </a:rPr>
+              <a:t>?</a:t>
+            </a:r>
+            <a:r>
+              <a:rPr lang="en-US" sz="2200" dirty="0" err="1">
+                <a:latin typeface="Courier New" panose="02070309020205020404" pitchFamily="49" charset="0"/>
+                <a:cs typeface="Courier New" panose="02070309020205020404" pitchFamily="49" charset="0"/>
+              </a:rPr>
+              <a:t>weight_func</a:t>
+            </a:r>
+            <a:r>
+              <a:rPr lang="en-US" sz="2200" dirty="0">
+                <a:latin typeface="Courier New" panose="02070309020205020404" pitchFamily="49" charset="0"/>
+                <a:cs typeface="Courier New" panose="02070309020205020404" pitchFamily="49" charset="0"/>
+              </a:rPr>
+              <a:t>()</a:t>
+            </a:r>
+          </a:p>
+          <a:p>
+            <a:pPr marL="0" indent="0">
+              <a:spcBef>
+                <a:spcPts val="0"/>
+              </a:spcBef>
+              <a:buNone/>
+            </a:pPr>
+            <a:r>
+              <a:rPr lang="en-US" sz="2200" dirty="0" err="1">
+                <a:highlight>
+                  <a:srgbClr val="C0C0C0"/>
+                </a:highlight>
+                <a:latin typeface="Courier New" panose="02070309020205020404" pitchFamily="49" charset="0"/>
+                <a:cs typeface="Courier New" panose="02070309020205020404" pitchFamily="49" charset="0"/>
+              </a:rPr>
+              <a:t>weight_func</a:t>
+            </a:r>
+            <a:r>
+              <a:rPr lang="en-US" sz="2200" dirty="0">
+                <a:highlight>
+                  <a:srgbClr val="C0C0C0"/>
+                </a:highlight>
+                <a:latin typeface="Courier New" panose="02070309020205020404" pitchFamily="49" charset="0"/>
+                <a:cs typeface="Courier New" panose="02070309020205020404" pitchFamily="49" charset="0"/>
+              </a:rPr>
+              <a:t>(values = </a:t>
+            </a:r>
+            <a:r>
+              <a:rPr lang="en-US" sz="2200" dirty="0" err="1">
+                <a:highlight>
+                  <a:srgbClr val="C0C0C0"/>
+                </a:highlight>
+                <a:latin typeface="Courier New" panose="02070309020205020404" pitchFamily="49" charset="0"/>
+                <a:cs typeface="Courier New" panose="02070309020205020404" pitchFamily="49" charset="0"/>
+              </a:rPr>
+              <a:t>values_weight_func</a:t>
+            </a:r>
+            <a:r>
+              <a:rPr lang="en-US" sz="2200" dirty="0">
+                <a:highlight>
+                  <a:srgbClr val="C0C0C0"/>
+                </a:highlight>
+                <a:latin typeface="Courier New" panose="02070309020205020404" pitchFamily="49" charset="0"/>
+                <a:cs typeface="Courier New" panose="02070309020205020404" pitchFamily="49" charset="0"/>
+              </a:rPr>
+              <a:t>)</a:t>
+            </a:r>
+          </a:p>
+          <a:p>
+            <a:pPr marL="0" indent="0">
+              <a:spcBef>
+                <a:spcPts val="0"/>
+              </a:spcBef>
+              <a:buNone/>
+            </a:pPr>
+            <a:r>
+              <a:rPr lang="en-US" sz="2200" dirty="0" err="1">
+                <a:latin typeface="Courier New" panose="02070309020205020404" pitchFamily="49" charset="0"/>
+                <a:cs typeface="Courier New" panose="02070309020205020404" pitchFamily="49" charset="0"/>
+              </a:rPr>
+              <a:t>values_weight_func</a:t>
+            </a:r>
+            <a:endParaRPr lang="en-US" sz="2200" dirty="0">
+              <a:latin typeface="Courier New" panose="02070309020205020404" pitchFamily="49" charset="0"/>
+              <a:cs typeface="Courier New" panose="02070309020205020404" pitchFamily="49" charset="0"/>
+            </a:endParaRPr>
+          </a:p>
+          <a:p>
+            <a:pPr marL="0" indent="0">
+              <a:spcBef>
+                <a:spcPts val="0"/>
+              </a:spcBef>
+              <a:buNone/>
+            </a:pPr>
+            <a:r>
+              <a:rPr lang="en-US" sz="2200" dirty="0">
+                <a:highlight>
+                  <a:srgbClr val="C0C0C0"/>
+                </a:highlight>
+                <a:latin typeface="Courier New" panose="02070309020205020404" pitchFamily="49" charset="0"/>
+                <a:cs typeface="Courier New" panose="02070309020205020404" pitchFamily="49" charset="0"/>
+              </a:rPr>
+              <a:t>"rectangular"  "triangular"   "</a:t>
+            </a:r>
+            <a:r>
+              <a:rPr lang="en-US" sz="2200" dirty="0" err="1">
+                <a:highlight>
+                  <a:srgbClr val="C0C0C0"/>
+                </a:highlight>
+                <a:latin typeface="Courier New" panose="02070309020205020404" pitchFamily="49" charset="0"/>
+                <a:cs typeface="Courier New" panose="02070309020205020404" pitchFamily="49" charset="0"/>
+              </a:rPr>
+              <a:t>epanechnikov</a:t>
+            </a:r>
+            <a:r>
+              <a:rPr lang="en-US" sz="2200" dirty="0">
+                <a:highlight>
+                  <a:srgbClr val="C0C0C0"/>
+                </a:highlight>
+                <a:latin typeface="Courier New" panose="02070309020205020404" pitchFamily="49" charset="0"/>
+                <a:cs typeface="Courier New" panose="02070309020205020404" pitchFamily="49" charset="0"/>
+              </a:rPr>
+              <a:t>" "</a:t>
+            </a:r>
+            <a:r>
+              <a:rPr lang="en-US" sz="2200" dirty="0" err="1">
+                <a:highlight>
+                  <a:srgbClr val="C0C0C0"/>
+                </a:highlight>
+                <a:latin typeface="Courier New" panose="02070309020205020404" pitchFamily="49" charset="0"/>
+                <a:cs typeface="Courier New" panose="02070309020205020404" pitchFamily="49" charset="0"/>
+              </a:rPr>
+              <a:t>biweight</a:t>
+            </a:r>
+            <a:r>
+              <a:rPr lang="en-US" sz="2200" dirty="0">
+                <a:highlight>
+                  <a:srgbClr val="C0C0C0"/>
+                </a:highlight>
+                <a:latin typeface="Courier New" panose="02070309020205020404" pitchFamily="49" charset="0"/>
+                <a:cs typeface="Courier New" panose="02070309020205020404" pitchFamily="49" charset="0"/>
+              </a:rPr>
+              <a:t>"     "</a:t>
+            </a:r>
+            <a:r>
+              <a:rPr lang="en-US" sz="2200" dirty="0" err="1">
+                <a:highlight>
+                  <a:srgbClr val="C0C0C0"/>
+                </a:highlight>
+                <a:latin typeface="Courier New" panose="02070309020205020404" pitchFamily="49" charset="0"/>
+                <a:cs typeface="Courier New" panose="02070309020205020404" pitchFamily="49" charset="0"/>
+              </a:rPr>
+              <a:t>triweight</a:t>
+            </a:r>
+            <a:r>
+              <a:rPr lang="en-US" sz="2200" dirty="0">
+                <a:highlight>
+                  <a:srgbClr val="C0C0C0"/>
+                </a:highlight>
+                <a:latin typeface="Courier New" panose="02070309020205020404" pitchFamily="49" charset="0"/>
+                <a:cs typeface="Courier New" panose="02070309020205020404" pitchFamily="49" charset="0"/>
+              </a:rPr>
+              <a:t>"  "cos"  "inv"  "gaussian"  "rank"  "optimal"</a:t>
+            </a:r>
+          </a:p>
+          <a:p>
+            <a:pPr marL="0" indent="0">
+              <a:spcBef>
+                <a:spcPts val="0"/>
+              </a:spcBef>
+              <a:buNone/>
+            </a:pPr>
+            <a:r>
+              <a:rPr lang="en-US" sz="2200" dirty="0" err="1">
+                <a:latin typeface="Courier New" panose="02070309020205020404" pitchFamily="49" charset="0"/>
+                <a:cs typeface="Courier New" panose="02070309020205020404" pitchFamily="49" charset="0"/>
+              </a:rPr>
+              <a:t>knn_params</a:t>
+            </a:r>
+            <a:r>
+              <a:rPr lang="en-US" sz="2200" dirty="0">
+                <a:latin typeface="Courier New" panose="02070309020205020404" pitchFamily="49" charset="0"/>
+                <a:cs typeface="Courier New" panose="02070309020205020404" pitchFamily="49" charset="0"/>
+              </a:rPr>
+              <a:t> &lt;- parameters(</a:t>
+            </a:r>
+            <a:r>
+              <a:rPr lang="en-US" sz="2200" dirty="0">
+                <a:solidFill>
+                  <a:srgbClr val="C00000"/>
+                </a:solidFill>
+                <a:latin typeface="Courier New" panose="02070309020205020404" pitchFamily="49" charset="0"/>
+                <a:cs typeface="Courier New" panose="02070309020205020404" pitchFamily="49" charset="0"/>
+              </a:rPr>
+              <a:t>neighbors</a:t>
+            </a:r>
+            <a:r>
+              <a:rPr lang="en-US" sz="2200" dirty="0">
+                <a:latin typeface="Courier New" panose="02070309020205020404" pitchFamily="49" charset="0"/>
+                <a:cs typeface="Courier New" panose="02070309020205020404" pitchFamily="49" charset="0"/>
+              </a:rPr>
+              <a:t>(</a:t>
+            </a:r>
+            <a:r>
+              <a:rPr lang="en-US" sz="2200" dirty="0">
+                <a:solidFill>
+                  <a:srgbClr val="00B0F0"/>
+                </a:solidFill>
+                <a:latin typeface="Courier New" panose="02070309020205020404" pitchFamily="49" charset="0"/>
+                <a:cs typeface="Courier New" panose="02070309020205020404" pitchFamily="49" charset="0"/>
+              </a:rPr>
+              <a:t>range = c(1, 15)</a:t>
+            </a:r>
+            <a:r>
+              <a:rPr lang="en-US" sz="2200" dirty="0">
+                <a:latin typeface="Courier New" panose="02070309020205020404" pitchFamily="49" charset="0"/>
+                <a:cs typeface="Courier New" panose="02070309020205020404" pitchFamily="49" charset="0"/>
+              </a:rPr>
+              <a:t>),</a:t>
+            </a:r>
+          </a:p>
+          <a:p>
+            <a:pPr marL="0" indent="0">
+              <a:spcBef>
+                <a:spcPts val="0"/>
+              </a:spcBef>
+              <a:buNone/>
+            </a:pPr>
+            <a:r>
+              <a:rPr lang="en-US" sz="2200" dirty="0">
+                <a:latin typeface="Courier New" panose="02070309020205020404" pitchFamily="49" charset="0"/>
+                <a:cs typeface="Courier New" panose="02070309020205020404" pitchFamily="49" charset="0"/>
+              </a:rPr>
+              <a:t>				  </a:t>
+            </a:r>
+            <a:r>
+              <a:rPr lang="en-US" sz="2200" dirty="0" err="1">
+                <a:solidFill>
+                  <a:srgbClr val="C00000"/>
+                </a:solidFill>
+                <a:latin typeface="Courier New" panose="02070309020205020404" pitchFamily="49" charset="0"/>
+                <a:cs typeface="Courier New" panose="02070309020205020404" pitchFamily="49" charset="0"/>
+              </a:rPr>
+              <a:t>weight_func</a:t>
+            </a:r>
+            <a:r>
+              <a:rPr lang="en-US" sz="2200" dirty="0">
+                <a:latin typeface="Courier New" panose="02070309020205020404" pitchFamily="49" charset="0"/>
+                <a:cs typeface="Courier New" panose="02070309020205020404" pitchFamily="49" charset="0"/>
+              </a:rPr>
+              <a:t>(</a:t>
+            </a:r>
+            <a:r>
+              <a:rPr lang="en-US" sz="2200" dirty="0">
+                <a:solidFill>
+                  <a:srgbClr val="00B0F0"/>
+                </a:solidFill>
+                <a:latin typeface="Courier New" panose="02070309020205020404" pitchFamily="49" charset="0"/>
+                <a:cs typeface="Courier New" panose="02070309020205020404" pitchFamily="49" charset="0"/>
+              </a:rPr>
+              <a:t>values = </a:t>
+            </a:r>
+            <a:r>
+              <a:rPr lang="en-US" sz="2200" dirty="0" err="1">
+                <a:solidFill>
+                  <a:srgbClr val="00B0F0"/>
+                </a:solidFill>
+                <a:latin typeface="Courier New" panose="02070309020205020404" pitchFamily="49" charset="0"/>
+                <a:cs typeface="Courier New" panose="02070309020205020404" pitchFamily="49" charset="0"/>
+              </a:rPr>
+              <a:t>values_weight_func</a:t>
+            </a:r>
+            <a:r>
+              <a:rPr lang="en-US" sz="2200" dirty="0">
+                <a:solidFill>
+                  <a:srgbClr val="00B0F0"/>
+                </a:solidFill>
+                <a:latin typeface="Courier New" panose="02070309020205020404" pitchFamily="49" charset="0"/>
+                <a:cs typeface="Courier New" panose="02070309020205020404" pitchFamily="49" charset="0"/>
+              </a:rPr>
+              <a:t>[1:5]</a:t>
+            </a:r>
+            <a:r>
+              <a:rPr lang="en-US" sz="2200" dirty="0">
+                <a:latin typeface="Courier New" panose="02070309020205020404" pitchFamily="49" charset="0"/>
+                <a:cs typeface="Courier New" panose="02070309020205020404" pitchFamily="49" charset="0"/>
+              </a:rPr>
+              <a:t>))</a:t>
+            </a:r>
+          </a:p>
+          <a:p>
+            <a:pPr marL="0" indent="0">
+              <a:spcBef>
+                <a:spcPts val="0"/>
+              </a:spcBef>
+              <a:buNone/>
+            </a:pPr>
+            <a:r>
+              <a:rPr lang="en-US" sz="2200" dirty="0" err="1">
+                <a:latin typeface="Courier New" panose="02070309020205020404" pitchFamily="49" charset="0"/>
+                <a:cs typeface="Courier New" panose="02070309020205020404" pitchFamily="49" charset="0"/>
+              </a:rPr>
+              <a:t>knn_reg_grid</a:t>
+            </a:r>
+            <a:r>
+              <a:rPr lang="en-US" sz="2200" dirty="0">
+                <a:latin typeface="Courier New" panose="02070309020205020404" pitchFamily="49" charset="0"/>
+                <a:cs typeface="Courier New" panose="02070309020205020404" pitchFamily="49" charset="0"/>
+              </a:rPr>
+              <a:t> &lt;- </a:t>
+            </a:r>
+            <a:r>
+              <a:rPr lang="en-US" sz="2200" dirty="0" err="1">
+                <a:latin typeface="Courier New" panose="02070309020205020404" pitchFamily="49" charset="0"/>
+                <a:cs typeface="Courier New" panose="02070309020205020404" pitchFamily="49" charset="0"/>
+              </a:rPr>
+              <a:t>grid_regular</a:t>
+            </a:r>
+            <a:r>
+              <a:rPr lang="en-US" sz="2200" dirty="0">
+                <a:latin typeface="Courier New" panose="02070309020205020404" pitchFamily="49" charset="0"/>
+                <a:cs typeface="Courier New" panose="02070309020205020404" pitchFamily="49" charset="0"/>
+              </a:rPr>
+              <a:t>(</a:t>
+            </a:r>
+            <a:r>
+              <a:rPr lang="en-US" sz="2200" dirty="0" err="1">
+                <a:latin typeface="Courier New" panose="02070309020205020404" pitchFamily="49" charset="0"/>
+                <a:cs typeface="Courier New" panose="02070309020205020404" pitchFamily="49" charset="0"/>
+              </a:rPr>
+              <a:t>knn_params</a:t>
+            </a:r>
+            <a:r>
+              <a:rPr lang="en-US" sz="2200" dirty="0">
+                <a:latin typeface="Courier New" panose="02070309020205020404" pitchFamily="49" charset="0"/>
+                <a:cs typeface="Courier New" panose="02070309020205020404" pitchFamily="49" charset="0"/>
+              </a:rPr>
+              <a:t>, levels = c(15, 5))</a:t>
+            </a:r>
+          </a:p>
+          <a:p>
+            <a:pPr marL="0" indent="0">
+              <a:spcBef>
+                <a:spcPts val="0"/>
+              </a:spcBef>
+              <a:buNone/>
+            </a:pPr>
+            <a:endParaRPr lang="en-US" sz="2200" dirty="0">
+              <a:latin typeface="Courier New" panose="02070309020205020404" pitchFamily="49" charset="0"/>
+              <a:cs typeface="Courier New" panose="02070309020205020404" pitchFamily="49" charset="0"/>
+            </a:endParaRPr>
+          </a:p>
+          <a:p>
+            <a:pPr marL="0" indent="0">
+              <a:spcBef>
+                <a:spcPts val="0"/>
+              </a:spcBef>
+              <a:buNone/>
+            </a:pPr>
+            <a:r>
+              <a:rPr lang="en-US" sz="1600" dirty="0" err="1">
+                <a:latin typeface="Courier New" panose="02070309020205020404" pitchFamily="49" charset="0"/>
+                <a:cs typeface="Courier New" panose="02070309020205020404" pitchFamily="49" charset="0"/>
+              </a:rPr>
+              <a:t>knn_reg_grid</a:t>
+            </a:r>
+            <a:r>
+              <a:rPr lang="en-US" sz="1600" dirty="0">
+                <a:latin typeface="Courier New" panose="02070309020205020404" pitchFamily="49" charset="0"/>
+                <a:cs typeface="Courier New" panose="02070309020205020404" pitchFamily="49" charset="0"/>
+              </a:rPr>
+              <a:t> %&gt;% </a:t>
+            </a:r>
+          </a:p>
+          <a:p>
+            <a:pPr marL="0" indent="0">
+              <a:spcBef>
+                <a:spcPts val="0"/>
+              </a:spcBef>
+              <a:buNone/>
+            </a:pPr>
+            <a:r>
+              <a:rPr lang="en-US" sz="1600" dirty="0">
+                <a:latin typeface="Courier New" panose="02070309020205020404" pitchFamily="49" charset="0"/>
+                <a:cs typeface="Courier New" panose="02070309020205020404" pitchFamily="49" charset="0"/>
+              </a:rPr>
+              <a:t>  </a:t>
+            </a:r>
+            <a:r>
+              <a:rPr lang="en-US" sz="1600" dirty="0" err="1">
+                <a:latin typeface="Courier New" panose="02070309020205020404" pitchFamily="49" charset="0"/>
+                <a:cs typeface="Courier New" panose="02070309020205020404" pitchFamily="49" charset="0"/>
+              </a:rPr>
+              <a:t>ggplot</a:t>
+            </a:r>
+            <a:r>
+              <a:rPr lang="en-US" sz="1600" dirty="0">
+                <a:latin typeface="Courier New" panose="02070309020205020404" pitchFamily="49" charset="0"/>
+                <a:cs typeface="Courier New" panose="02070309020205020404" pitchFamily="49" charset="0"/>
+              </a:rPr>
+              <a:t>(</a:t>
+            </a:r>
+            <a:r>
+              <a:rPr lang="en-US" sz="1600" dirty="0" err="1">
+                <a:latin typeface="Courier New" panose="02070309020205020404" pitchFamily="49" charset="0"/>
+                <a:cs typeface="Courier New" panose="02070309020205020404" pitchFamily="49" charset="0"/>
+              </a:rPr>
+              <a:t>aes</a:t>
+            </a:r>
+            <a:r>
+              <a:rPr lang="en-US" sz="1600" dirty="0">
+                <a:latin typeface="Courier New" panose="02070309020205020404" pitchFamily="49" charset="0"/>
+                <a:cs typeface="Courier New" panose="02070309020205020404" pitchFamily="49" charset="0"/>
+              </a:rPr>
+              <a:t>(neighbors, </a:t>
+            </a:r>
+            <a:r>
+              <a:rPr lang="en-US" sz="1600" dirty="0" err="1">
+                <a:latin typeface="Courier New" panose="02070309020205020404" pitchFamily="49" charset="0"/>
+                <a:cs typeface="Courier New" panose="02070309020205020404" pitchFamily="49" charset="0"/>
+              </a:rPr>
+              <a:t>weight_func</a:t>
+            </a:r>
+            <a:r>
+              <a:rPr lang="en-US" sz="1600" dirty="0">
+                <a:latin typeface="Courier New" panose="02070309020205020404" pitchFamily="49" charset="0"/>
+                <a:cs typeface="Courier New" panose="02070309020205020404" pitchFamily="49" charset="0"/>
+              </a:rPr>
+              <a:t>)) +</a:t>
+            </a:r>
+          </a:p>
+          <a:p>
+            <a:pPr marL="0" indent="0">
+              <a:spcBef>
+                <a:spcPts val="0"/>
+              </a:spcBef>
+              <a:buNone/>
+            </a:pPr>
+            <a:r>
+              <a:rPr lang="en-US" sz="1600" dirty="0">
+                <a:latin typeface="Courier New" panose="02070309020205020404" pitchFamily="49" charset="0"/>
+                <a:cs typeface="Courier New" panose="02070309020205020404" pitchFamily="49" charset="0"/>
+              </a:rPr>
+              <a:t>  </a:t>
+            </a:r>
+            <a:r>
+              <a:rPr lang="en-US" sz="1600" dirty="0" err="1">
+                <a:latin typeface="Courier New" panose="02070309020205020404" pitchFamily="49" charset="0"/>
+                <a:cs typeface="Courier New" panose="02070309020205020404" pitchFamily="49" charset="0"/>
+              </a:rPr>
+              <a:t>geom_point</a:t>
+            </a:r>
+            <a:r>
+              <a:rPr lang="en-US" sz="1600" dirty="0">
+                <a:latin typeface="Courier New" panose="02070309020205020404" pitchFamily="49" charset="0"/>
+                <a:cs typeface="Courier New" panose="02070309020205020404" pitchFamily="49" charset="0"/>
+              </a:rPr>
+              <a:t>()</a:t>
+            </a:r>
+          </a:p>
+          <a:p>
+            <a:pPr>
+              <a:spcBef>
+                <a:spcPts val="0"/>
+              </a:spcBef>
+            </a:pPr>
+            <a:endParaRPr lang="en-US" dirty="0">
+              <a:latin typeface="Courier New" panose="02070309020205020404" pitchFamily="49" charset="0"/>
+              <a:cs typeface="Courier New" panose="02070309020205020404" pitchFamily="49" charset="0"/>
+            </a:endParaRPr>
+          </a:p>
+        </p:txBody>
+      </p:sp>
+      <p:sp>
+        <p:nvSpPr>
+          <p:cNvPr id="4" name="Slide Number Placeholder 3">
+            <a:extLst>
+              <a:ext uri="{FF2B5EF4-FFF2-40B4-BE49-F238E27FC236}">
+                <a16:creationId xmlns:a16="http://schemas.microsoft.com/office/drawing/2014/main" id="{BC3F3EFE-8CA4-4F70-A271-978FB89D473A}"/>
+              </a:ext>
+            </a:extLst>
+          </p:cNvPr>
+          <p:cNvSpPr>
+            <a:spLocks noGrp="1"/>
+          </p:cNvSpPr>
+          <p:nvPr>
+            <p:ph type="sldNum" sz="quarter" idx="12"/>
+          </p:nvPr>
+        </p:nvSpPr>
+        <p:spPr/>
+        <p:txBody>
+          <a:bodyPr/>
+          <a:lstStyle/>
+          <a:p>
+            <a:fld id="{1FD78A80-B303-491C-AEE7-8281801B0C65}" type="slidenum">
+              <a:rPr lang="en-US" smtClean="0">
+                <a:solidFill>
+                  <a:prstClr val="black">
+                    <a:tint val="75000"/>
+                  </a:prstClr>
+                </a:solidFill>
+              </a:rPr>
+              <a:pPr/>
+              <a:t>44</a:t>
+            </a:fld>
+            <a:endParaRPr lang="en-US">
+              <a:solidFill>
+                <a:prstClr val="black">
+                  <a:tint val="75000"/>
+                </a:prstClr>
+              </a:solidFill>
+            </a:endParaRPr>
+          </a:p>
+        </p:txBody>
+      </p:sp>
+      <p:pic>
+        <p:nvPicPr>
+          <p:cNvPr id="8" name="Picture 7">
+            <a:extLst>
+              <a:ext uri="{FF2B5EF4-FFF2-40B4-BE49-F238E27FC236}">
+                <a16:creationId xmlns:a16="http://schemas.microsoft.com/office/drawing/2014/main" id="{A22D20D5-305F-4A2A-B686-FB0E2FC75EEB}"/>
+              </a:ext>
+            </a:extLst>
+          </p:cNvPr>
+          <p:cNvPicPr>
+            <a:picLocks noChangeAspect="1"/>
+          </p:cNvPicPr>
+          <p:nvPr/>
+        </p:nvPicPr>
+        <p:blipFill>
+          <a:blip r:embed="rId2"/>
+          <a:stretch>
+            <a:fillRect/>
+          </a:stretch>
+        </p:blipFill>
+        <p:spPr>
+          <a:xfrm>
+            <a:off x="6617756" y="4389087"/>
+            <a:ext cx="3985687" cy="2418587"/>
+          </a:xfrm>
+          <a:prstGeom prst="rect">
+            <a:avLst/>
+          </a:prstGeom>
+        </p:spPr>
+      </p:pic>
+    </p:spTree>
+    <p:extLst>
+      <p:ext uri="{BB962C8B-B14F-4D97-AF65-F5344CB8AC3E}">
+        <p14:creationId xmlns:p14="http://schemas.microsoft.com/office/powerpoint/2010/main" val="1550948516"/>
+      </p:ext>
+    </p:extLst>
+  </p:cSld>
+  <p:clrMapOvr>
+    <a:masterClrMapping/>
+  </p:clrMapOvr>
+  <p:timing>
+    <p:tnLst>
+      <p:par>
+        <p:cTn id="1" dur="indefinite" restart="never" nodeType="tmRoot">
+          <p:childTnLst>
+            <p:seq concurrent="1" nextAc="seek">
+              <p:cTn id="2" dur="indefinite" nodeType="mainSeq">
+                <p:childTnLst>
+                  <p:par>
+                    <p:cTn id="3" fill="hold">
+                      <p:stCondLst>
+                        <p:cond delay="indefinite"/>
+                      </p:stCondLst>
+                      <p:childTnLst>
+                        <p:par>
+                          <p:cTn id="4" fill="hold">
+                            <p:stCondLst>
+                              <p:cond delay="0"/>
+                            </p:stCondLst>
+                            <p:childTnLst>
+                              <p:par>
+                                <p:cTn id="5" presetID="1" presetClass="entr" presetSubtype="0" fill="hold" nodeType="clickEffect">
+                                  <p:stCondLst>
+                                    <p:cond delay="0"/>
+                                  </p:stCondLst>
+                                  <p:childTnLst>
+                                    <p:set>
+                                      <p:cBhvr>
+                                        <p:cTn id="6" dur="1" fill="hold">
+                                          <p:stCondLst>
+                                            <p:cond delay="0"/>
+                                          </p:stCondLst>
+                                        </p:cTn>
+                                        <p:tgtEl>
+                                          <p:spTgt spid="3">
+                                            <p:txEl>
+                                              <p:pRg st="1" end="1"/>
+                                            </p:txEl>
+                                          </p:spTgt>
+                                        </p:tgtEl>
+                                        <p:attrNameLst>
+                                          <p:attrName>style.visibility</p:attrName>
+                                        </p:attrNameLst>
+                                      </p:cBhvr>
+                                      <p:to>
+                                        <p:strVal val="visible"/>
+                                      </p:to>
+                                    </p:set>
+                                  </p:childTnLst>
+                                </p:cTn>
+                              </p:par>
+                            </p:childTnLst>
+                          </p:cTn>
+                        </p:par>
+                      </p:childTnLst>
+                    </p:cTn>
+                  </p:par>
+                  <p:par>
+                    <p:cTn id="7" fill="hold">
+                      <p:stCondLst>
+                        <p:cond delay="indefinite"/>
+                      </p:stCondLst>
+                      <p:childTnLst>
+                        <p:par>
+                          <p:cTn id="8" fill="hold">
+                            <p:stCondLst>
+                              <p:cond delay="0"/>
+                            </p:stCondLst>
+                            <p:childTnLst>
+                              <p:par>
+                                <p:cTn id="9" presetID="1" presetClass="entr" presetSubtype="0" fill="hold" nodeType="clickEffect">
+                                  <p:stCondLst>
+                                    <p:cond delay="0"/>
+                                  </p:stCondLst>
+                                  <p:childTnLst>
+                                    <p:set>
+                                      <p:cBhvr>
+                                        <p:cTn id="10" dur="1" fill="hold">
+                                          <p:stCondLst>
+                                            <p:cond delay="0"/>
+                                          </p:stCondLst>
+                                        </p:cTn>
+                                        <p:tgtEl>
+                                          <p:spTgt spid="3">
+                                            <p:txEl>
+                                              <p:pRg st="2" end="2"/>
+                                            </p:txEl>
+                                          </p:spTgt>
+                                        </p:tgtEl>
+                                        <p:attrNameLst>
+                                          <p:attrName>style.visibility</p:attrName>
+                                        </p:attrNameLst>
+                                      </p:cBhvr>
+                                      <p:to>
+                                        <p:strVal val="visible"/>
+                                      </p:to>
+                                    </p:set>
+                                  </p:childTnLst>
+                                </p:cTn>
+                              </p:par>
+                            </p:childTnLst>
+                          </p:cTn>
+                        </p:par>
+                      </p:childTnLst>
+                    </p:cTn>
+                  </p:par>
+                  <p:par>
+                    <p:cTn id="11" fill="hold">
+                      <p:stCondLst>
+                        <p:cond delay="indefinite"/>
+                      </p:stCondLst>
+                      <p:childTnLst>
+                        <p:par>
+                          <p:cTn id="12" fill="hold">
+                            <p:stCondLst>
+                              <p:cond delay="0"/>
+                            </p:stCondLst>
+                            <p:childTnLst>
+                              <p:par>
+                                <p:cTn id="13" presetID="1" presetClass="entr" presetSubtype="0" fill="hold" nodeType="clickEffect">
+                                  <p:stCondLst>
+                                    <p:cond delay="0"/>
+                                  </p:stCondLst>
+                                  <p:childTnLst>
+                                    <p:set>
+                                      <p:cBhvr>
+                                        <p:cTn id="14" dur="1" fill="hold">
+                                          <p:stCondLst>
+                                            <p:cond delay="0"/>
+                                          </p:stCondLst>
+                                        </p:cTn>
+                                        <p:tgtEl>
+                                          <p:spTgt spid="3">
+                                            <p:txEl>
+                                              <p:pRg st="3" end="3"/>
+                                            </p:txEl>
+                                          </p:spTgt>
+                                        </p:tgtEl>
+                                        <p:attrNameLst>
+                                          <p:attrName>style.visibility</p:attrName>
+                                        </p:attrNameLst>
+                                      </p:cBhvr>
+                                      <p:to>
+                                        <p:strVal val="visible"/>
+                                      </p:to>
+                                    </p:set>
+                                  </p:childTnLst>
+                                </p:cTn>
+                              </p:par>
+                            </p:childTnLst>
+                          </p:cTn>
+                        </p:par>
+                      </p:childTnLst>
+                    </p:cTn>
+                  </p:par>
+                  <p:par>
+                    <p:cTn id="15" fill="hold">
+                      <p:stCondLst>
+                        <p:cond delay="indefinite"/>
+                      </p:stCondLst>
+                      <p:childTnLst>
+                        <p:par>
+                          <p:cTn id="16" fill="hold">
+                            <p:stCondLst>
+                              <p:cond delay="0"/>
+                            </p:stCondLst>
+                            <p:childTnLst>
+                              <p:par>
+                                <p:cTn id="17" presetID="1" presetClass="entr" presetSubtype="0" fill="hold" nodeType="clickEffect">
+                                  <p:stCondLst>
+                                    <p:cond delay="0"/>
+                                  </p:stCondLst>
+                                  <p:childTnLst>
+                                    <p:set>
+                                      <p:cBhvr>
+                                        <p:cTn id="18" dur="1" fill="hold">
+                                          <p:stCondLst>
+                                            <p:cond delay="0"/>
+                                          </p:stCondLst>
+                                        </p:cTn>
+                                        <p:tgtEl>
+                                          <p:spTgt spid="3">
+                                            <p:txEl>
+                                              <p:pRg st="4" end="4"/>
+                                            </p:txEl>
+                                          </p:spTgt>
+                                        </p:tgtEl>
+                                        <p:attrNameLst>
+                                          <p:attrName>style.visibility</p:attrName>
+                                        </p:attrNameLst>
+                                      </p:cBhvr>
+                                      <p:to>
+                                        <p:strVal val="visible"/>
+                                      </p:to>
+                                    </p:set>
+                                  </p:childTnLst>
+                                </p:cTn>
+                              </p:par>
+                            </p:childTnLst>
+                          </p:cTn>
+                        </p:par>
+                      </p:childTnLst>
+                    </p:cTn>
+                  </p:par>
+                  <p:par>
+                    <p:cTn id="19" fill="hold">
+                      <p:stCondLst>
+                        <p:cond delay="indefinite"/>
+                      </p:stCondLst>
+                      <p:childTnLst>
+                        <p:par>
+                          <p:cTn id="20" fill="hold">
+                            <p:stCondLst>
+                              <p:cond delay="0"/>
+                            </p:stCondLst>
+                            <p:childTnLst>
+                              <p:par>
+                                <p:cTn id="21" presetID="1" presetClass="entr" presetSubtype="0" fill="hold" nodeType="clickEffect">
+                                  <p:stCondLst>
+                                    <p:cond delay="0"/>
+                                  </p:stCondLst>
+                                  <p:childTnLst>
+                                    <p:set>
+                                      <p:cBhvr>
+                                        <p:cTn id="22" dur="1" fill="hold">
+                                          <p:stCondLst>
+                                            <p:cond delay="0"/>
+                                          </p:stCondLst>
+                                        </p:cTn>
+                                        <p:tgtEl>
+                                          <p:spTgt spid="3">
+                                            <p:txEl>
+                                              <p:pRg st="5" end="5"/>
+                                            </p:txEl>
+                                          </p:spTgt>
+                                        </p:tgtEl>
+                                        <p:attrNameLst>
+                                          <p:attrName>style.visibility</p:attrName>
+                                        </p:attrNameLst>
+                                      </p:cBhvr>
+                                      <p:to>
+                                        <p:strVal val="visible"/>
+                                      </p:to>
+                                    </p:set>
+                                  </p:childTnLst>
+                                </p:cTn>
+                              </p:par>
+                            </p:childTnLst>
+                          </p:cTn>
+                        </p:par>
+                      </p:childTnLst>
+                    </p:cTn>
+                  </p:par>
+                  <p:par>
+                    <p:cTn id="23" fill="hold">
+                      <p:stCondLst>
+                        <p:cond delay="indefinite"/>
+                      </p:stCondLst>
+                      <p:childTnLst>
+                        <p:par>
+                          <p:cTn id="24" fill="hold">
+                            <p:stCondLst>
+                              <p:cond delay="0"/>
+                            </p:stCondLst>
+                            <p:childTnLst>
+                              <p:par>
+                                <p:cTn id="25" presetID="1" presetClass="entr" presetSubtype="0" fill="hold" nodeType="clickEffect">
+                                  <p:stCondLst>
+                                    <p:cond delay="0"/>
+                                  </p:stCondLst>
+                                  <p:childTnLst>
+                                    <p:set>
+                                      <p:cBhvr>
+                                        <p:cTn id="26" dur="1" fill="hold">
+                                          <p:stCondLst>
+                                            <p:cond delay="0"/>
+                                          </p:stCondLst>
+                                        </p:cTn>
+                                        <p:tgtEl>
+                                          <p:spTgt spid="3">
+                                            <p:txEl>
+                                              <p:pRg st="6" end="6"/>
+                                            </p:txEl>
+                                          </p:spTgt>
+                                        </p:tgtEl>
+                                        <p:attrNameLst>
+                                          <p:attrName>style.visibility</p:attrName>
+                                        </p:attrNameLst>
+                                      </p:cBhvr>
+                                      <p:to>
+                                        <p:strVal val="visible"/>
+                                      </p:to>
+                                    </p:set>
+                                  </p:childTnLst>
+                                </p:cTn>
+                              </p:par>
+                            </p:childTnLst>
+                          </p:cTn>
+                        </p:par>
+                      </p:childTnLst>
+                    </p:cTn>
+                  </p:par>
+                  <p:par>
+                    <p:cTn id="27" fill="hold">
+                      <p:stCondLst>
+                        <p:cond delay="indefinite"/>
+                      </p:stCondLst>
+                      <p:childTnLst>
+                        <p:par>
+                          <p:cTn id="28" fill="hold">
+                            <p:stCondLst>
+                              <p:cond delay="0"/>
+                            </p:stCondLst>
+                            <p:childTnLst>
+                              <p:par>
+                                <p:cTn id="29" presetID="1" presetClass="entr" presetSubtype="0" fill="hold" nodeType="clickEffect">
+                                  <p:stCondLst>
+                                    <p:cond delay="0"/>
+                                  </p:stCondLst>
+                                  <p:childTnLst>
+                                    <p:set>
+                                      <p:cBhvr>
+                                        <p:cTn id="30" dur="1" fill="hold">
+                                          <p:stCondLst>
+                                            <p:cond delay="0"/>
+                                          </p:stCondLst>
+                                        </p:cTn>
+                                        <p:tgtEl>
+                                          <p:spTgt spid="3">
+                                            <p:txEl>
+                                              <p:pRg st="7" end="7"/>
+                                            </p:txEl>
+                                          </p:spTgt>
+                                        </p:tgtEl>
+                                        <p:attrNameLst>
+                                          <p:attrName>style.visibility</p:attrName>
+                                        </p:attrNameLst>
+                                      </p:cBhvr>
+                                      <p:to>
+                                        <p:strVal val="visible"/>
+                                      </p:to>
+                                    </p:set>
+                                  </p:childTnLst>
+                                </p:cTn>
+                              </p:par>
+                            </p:childTnLst>
+                          </p:cTn>
+                        </p:par>
+                      </p:childTnLst>
+                    </p:cTn>
+                  </p:par>
+                  <p:par>
+                    <p:cTn id="31" fill="hold">
+                      <p:stCondLst>
+                        <p:cond delay="indefinite"/>
+                      </p:stCondLst>
+                      <p:childTnLst>
+                        <p:par>
+                          <p:cTn id="32" fill="hold">
+                            <p:stCondLst>
+                              <p:cond delay="0"/>
+                            </p:stCondLst>
+                            <p:childTnLst>
+                              <p:par>
+                                <p:cTn id="33" presetID="1" presetClass="entr" presetSubtype="0" fill="hold" nodeType="clickEffect">
+                                  <p:stCondLst>
+                                    <p:cond delay="0"/>
+                                  </p:stCondLst>
+                                  <p:childTnLst>
+                                    <p:set>
+                                      <p:cBhvr>
+                                        <p:cTn id="34" dur="1" fill="hold">
+                                          <p:stCondLst>
+                                            <p:cond delay="0"/>
+                                          </p:stCondLst>
+                                        </p:cTn>
+                                        <p:tgtEl>
+                                          <p:spTgt spid="3">
+                                            <p:txEl>
+                                              <p:pRg st="8" end="8"/>
+                                            </p:txEl>
+                                          </p:spTgt>
+                                        </p:tgtEl>
+                                        <p:attrNameLst>
+                                          <p:attrName>style.visibility</p:attrName>
+                                        </p:attrNameLst>
+                                      </p:cBhvr>
+                                      <p:to>
+                                        <p:strVal val="visible"/>
+                                      </p:to>
+                                    </p:set>
+                                  </p:childTnLst>
+                                </p:cTn>
+                              </p:par>
+                            </p:childTnLst>
+                          </p:cTn>
+                        </p:par>
+                      </p:childTnLst>
+                    </p:cTn>
+                  </p:par>
+                  <p:par>
+                    <p:cTn id="35" fill="hold">
+                      <p:stCondLst>
+                        <p:cond delay="indefinite"/>
+                      </p:stCondLst>
+                      <p:childTnLst>
+                        <p:par>
+                          <p:cTn id="36" fill="hold">
+                            <p:stCondLst>
+                              <p:cond delay="0"/>
+                            </p:stCondLst>
+                            <p:childTnLst>
+                              <p:par>
+                                <p:cTn id="37" presetID="1" presetClass="entr" presetSubtype="0" fill="hold" nodeType="clickEffect">
+                                  <p:stCondLst>
+                                    <p:cond delay="0"/>
+                                  </p:stCondLst>
+                                  <p:childTnLst>
+                                    <p:set>
+                                      <p:cBhvr>
+                                        <p:cTn id="38" dur="1" fill="hold">
+                                          <p:stCondLst>
+                                            <p:cond delay="0"/>
+                                          </p:stCondLst>
+                                        </p:cTn>
+                                        <p:tgtEl>
+                                          <p:spTgt spid="3">
+                                            <p:txEl>
+                                              <p:pRg st="10" end="10"/>
+                                            </p:txEl>
+                                          </p:spTgt>
+                                        </p:tgtEl>
+                                        <p:attrNameLst>
+                                          <p:attrName>style.visibility</p:attrName>
+                                        </p:attrNameLst>
+                                      </p:cBhvr>
+                                      <p:to>
+                                        <p:strVal val="visible"/>
+                                      </p:to>
+                                    </p:set>
+                                  </p:childTnLst>
+                                </p:cTn>
+                              </p:par>
+                              <p:par>
+                                <p:cTn id="39" presetID="1" presetClass="entr" presetSubtype="0" fill="hold" nodeType="withEffect">
+                                  <p:stCondLst>
+                                    <p:cond delay="0"/>
+                                  </p:stCondLst>
+                                  <p:childTnLst>
+                                    <p:set>
+                                      <p:cBhvr>
+                                        <p:cTn id="40" dur="1" fill="hold">
+                                          <p:stCondLst>
+                                            <p:cond delay="0"/>
+                                          </p:stCondLst>
+                                        </p:cTn>
+                                        <p:tgtEl>
+                                          <p:spTgt spid="3">
+                                            <p:txEl>
+                                              <p:pRg st="11" end="11"/>
+                                            </p:txEl>
+                                          </p:spTgt>
+                                        </p:tgtEl>
+                                        <p:attrNameLst>
+                                          <p:attrName>style.visibility</p:attrName>
+                                        </p:attrNameLst>
+                                      </p:cBhvr>
+                                      <p:to>
+                                        <p:strVal val="visible"/>
+                                      </p:to>
+                                    </p:set>
+                                  </p:childTnLst>
+                                </p:cTn>
+                              </p:par>
+                              <p:par>
+                                <p:cTn id="41" presetID="1" presetClass="entr" presetSubtype="0" fill="hold" nodeType="withEffect">
+                                  <p:stCondLst>
+                                    <p:cond delay="0"/>
+                                  </p:stCondLst>
+                                  <p:childTnLst>
+                                    <p:set>
+                                      <p:cBhvr>
+                                        <p:cTn id="42" dur="1" fill="hold">
+                                          <p:stCondLst>
+                                            <p:cond delay="0"/>
+                                          </p:stCondLst>
+                                        </p:cTn>
+                                        <p:tgtEl>
+                                          <p:spTgt spid="3">
+                                            <p:txEl>
+                                              <p:pRg st="12" end="12"/>
+                                            </p:txEl>
+                                          </p:spTgt>
+                                        </p:tgtEl>
+                                        <p:attrNameLst>
+                                          <p:attrName>style.visibility</p:attrName>
+                                        </p:attrNameLst>
+                                      </p:cBhvr>
+                                      <p:to>
+                                        <p:strVal val="visible"/>
+                                      </p:to>
+                                    </p:set>
+                                  </p:childTnLst>
+                                </p:cTn>
+                              </p:par>
+                              <p:par>
+                                <p:cTn id="43" presetID="1" presetClass="entr" presetSubtype="0" fill="hold" nodeType="withEffect">
+                                  <p:stCondLst>
+                                    <p:cond delay="0"/>
+                                  </p:stCondLst>
+                                  <p:childTnLst>
+                                    <p:set>
+                                      <p:cBhvr>
+                                        <p:cTn id="44" dur="1" fill="hold">
+                                          <p:stCondLst>
+                                            <p:cond delay="0"/>
+                                          </p:stCondLst>
+                                        </p:cTn>
+                                        <p:tgtEl>
+                                          <p:spTgt spid="8"/>
+                                        </p:tgtEl>
+                                        <p:attrNameLst>
+                                          <p:attrName>style.visibility</p:attrName>
+                                        </p:attrNameLst>
+                                      </p:cBhvr>
+                                      <p:to>
+                                        <p:strVal val="visible"/>
+                                      </p:to>
+                                    </p:set>
+                                  </p:childTnLst>
+                                </p:cTn>
+                              </p:par>
+                            </p:childTnLst>
+                          </p:cTn>
+                        </p:par>
+                      </p:childTnLst>
+                    </p:cTn>
+                  </p:par>
+                </p:childTnLst>
+              </p:cTn>
+              <p:prevCondLst>
+                <p:cond evt="onPrev" delay="0">
+                  <p:tgtEl>
+                    <p:sldTgt/>
+                  </p:tgtEl>
+                </p:cond>
+              </p:prevCondLst>
+              <p:nextCondLst>
+                <p:cond evt="onNext" delay="0">
+                  <p:tgtEl>
+                    <p:sldTgt/>
+                  </p:tgtEl>
+                </p:cond>
+              </p:nextCondLst>
+            </p:seq>
+          </p:childTnLst>
+        </p:cTn>
+      </p:par>
+    </p:tnLst>
+  </p:timing>
+</p:sld>
+</file>
+
+<file path=ppt/slides/slide45.xml><?xml version="1.0" encoding="utf-8"?>
 <p:sld xmlns:a="http://schemas.openxmlformats.org/drawingml/2006/main" xmlns:r="http://schemas.openxmlformats.org/officeDocument/2006/relationships" xmlns:p="http://schemas.openxmlformats.org/presentationml/2006/main">
   <p:cSld>
     <p:spTree>
@@ -21384,7 +22745,7 @@
           <a:p>
             <a:r>
               <a:rPr lang="en-US" dirty="0"/>
-              <a:t>So let’s make our own</a:t>
+              <a:t>(2) Let’s make our own</a:t>
             </a:r>
           </a:p>
         </p:txBody>
@@ -21543,32 +22904,14 @@
                 <a:latin typeface="Courier New" panose="02070309020205020404" pitchFamily="49" charset="0"/>
                 <a:cs typeface="Courier New" panose="02070309020205020404" pitchFamily="49" charset="0"/>
               </a:rPr>
-              <a:t>weight_func</a:t>
+              <a:t>values_weight_func</a:t>
             </a:r>
             <a:r>
               <a:rPr lang="en-US" sz="1900" dirty="0">
                 <a:latin typeface="Courier New" panose="02070309020205020404" pitchFamily="49" charset="0"/>
                 <a:cs typeface="Courier New" panose="02070309020205020404" pitchFamily="49" charset="0"/>
               </a:rPr>
-              <a:t>()$values[1:5}</a:t>
-            </a:r>
-          </a:p>
-          <a:p>
-            <a:pPr marL="0" indent="0">
-              <a:lnSpc>
-                <a:spcPct val="100000"/>
-              </a:lnSpc>
-              <a:spcBef>
-                <a:spcPts val="0"/>
-              </a:spcBef>
-              <a:buNone/>
-            </a:pPr>
-            <a:r>
-              <a:rPr lang="en-US" sz="1900" dirty="0">
-                <a:latin typeface="Courier New" panose="02070309020205020404" pitchFamily="49" charset="0"/>
-                <a:cs typeface="Courier New" panose="02070309020205020404" pitchFamily="49" charset="0"/>
-              </a:rPr>
-              <a:t>)</a:t>
+              <a:t>[1:5])</a:t>
             </a:r>
           </a:p>
           <a:p>
@@ -21651,7 +22994,7 @@
                 </a:solidFill>
               </a:rPr>
               <a:pPr/>
-              <a:t>44</a:t>
+              <a:t>45</a:t>
             </a:fld>
             <a:endParaRPr lang="en-US">
               <a:solidFill>
@@ -21816,37 +23159,6 @@
                                   </p:childTnLst>
                                 </p:cTn>
                               </p:par>
-                              <p:par>
-                                <p:cTn id="11" presetID="1" presetClass="entr" presetSubtype="0" fill="hold" nodeType="withEffect">
-                                  <p:stCondLst>
-                                    <p:cond delay="0"/>
-                                  </p:stCondLst>
-                                  <p:childTnLst>
-                                    <p:set>
-                                      <p:cBhvr>
-                                        <p:cTn id="12" dur="1" fill="hold">
-                                          <p:stCondLst>
-                                            <p:cond delay="0"/>
-                                          </p:stCondLst>
-                                        </p:cTn>
-                                        <p:tgtEl>
-                                          <p:spTgt spid="3">
-                                            <p:txEl>
-                                              <p:pRg st="5" end="5"/>
-                                            </p:txEl>
-                                          </p:spTgt>
-                                        </p:tgtEl>
-                                        <p:attrNameLst>
-                                          <p:attrName>style.visibility</p:attrName>
-                                        </p:attrNameLst>
-                                      </p:cBhvr>
-                                      <p:to>
-                                        <p:strVal val="visible"/>
-                                      </p:to>
-                                    </p:set>
-                                  </p:childTnLst>
-                                </p:cTn>
-                              </p:par>
                             </p:childTnLst>
                           </p:cTn>
                         </p:par>
@@ -21878,7 +23190,7 @@
 </p:sld>
 </file>
 
-<file path=ppt/slides/slide45.xml><?xml version="1.0" encoding="utf-8"?>
+<file path=ppt/slides/slide46.xml><?xml version="1.0" encoding="utf-8"?>
 <p:sld xmlns:a="http://schemas.openxmlformats.org/drawingml/2006/main" xmlns:r="http://schemas.openxmlformats.org/officeDocument/2006/relationships" xmlns:p="http://schemas.openxmlformats.org/presentationml/2006/main">
   <p:cSld>
     <p:spTree>
@@ -22012,7 +23324,7 @@
                 </a:solidFill>
               </a:rPr>
               <a:pPr/>
-              <a:t>45</a:t>
+              <a:t>46</a:t>
             </a:fld>
             <a:endParaRPr lang="en-US">
               <a:solidFill>
@@ -22037,7 +23349,7 @@
 </p:sld>
 </file>
 
-<file path=ppt/slides/slide46.xml><?xml version="1.0" encoding="utf-8"?>
+<file path=ppt/slides/slide47.xml><?xml version="1.0" encoding="utf-8"?>
 <p:sld xmlns:a="http://schemas.openxmlformats.org/drawingml/2006/main" xmlns:r="http://schemas.openxmlformats.org/officeDocument/2006/relationships" xmlns:p="http://schemas.openxmlformats.org/presentationml/2006/main">
   <p:cSld>
     <p:spTree>
@@ -22288,7 +23600,7 @@
                 </a:solidFill>
               </a:rPr>
               <a:pPr/>
-              <a:t>46</a:t>
+              <a:t>47</a:t>
             </a:fld>
             <a:endParaRPr lang="en-US">
               <a:solidFill>
@@ -22697,7 +24009,7 @@
 </p:sld>
 </file>
 
-<file path=ppt/slides/slide47.xml><?xml version="1.0" encoding="utf-8"?>
+<file path=ppt/slides/slide48.xml><?xml version="1.0" encoding="utf-8"?>
 <p:sld xmlns:a="http://schemas.openxmlformats.org/drawingml/2006/main" xmlns:r="http://schemas.openxmlformats.org/officeDocument/2006/relationships" xmlns:p="http://schemas.openxmlformats.org/presentationml/2006/main">
   <p:cSld>
     <p:spTree>
@@ -22976,7 +24288,7 @@
                 </a:solidFill>
               </a:rPr>
               <a:pPr/>
-              <a:t>47</a:t>
+              <a:t>48</a:t>
             </a:fld>
             <a:endParaRPr lang="en-US">
               <a:solidFill>
@@ -23061,7 +24373,7 @@
 </p:sld>
 </file>
 
-<file path=ppt/slides/slide48.xml><?xml version="1.0" encoding="utf-8"?>
+<file path=ppt/slides/slide49.xml><?xml version="1.0" encoding="utf-8"?>
 <p:sld xmlns:a="http://schemas.openxmlformats.org/drawingml/2006/main" xmlns:r="http://schemas.openxmlformats.org/officeDocument/2006/relationships" xmlns:p="http://schemas.openxmlformats.org/presentationml/2006/main">
   <p:cSld>
     <p:spTree>
@@ -23344,7 +24656,7 @@
                 </a:solidFill>
               </a:rPr>
               <a:pPr/>
-              <a:t>48</a:t>
+              <a:t>49</a:t>
             </a:fld>
             <a:endParaRPr lang="en-US">
               <a:solidFill>
@@ -23616,7 +24928,109 @@
 </p:sld>
 </file>
 
-<file path=ppt/slides/slide49.xml><?xml version="1.0" encoding="utf-8"?>
+<file path=ppt/slides/slide5.xml><?xml version="1.0" encoding="utf-8"?>
+<p:sld xmlns:a="http://schemas.openxmlformats.org/drawingml/2006/main" xmlns:r="http://schemas.openxmlformats.org/officeDocument/2006/relationships" xmlns:p="http://schemas.openxmlformats.org/presentationml/2006/main">
+  <p:cSld>
+    <p:spTree>
+      <p:nvGrpSpPr>
+        <p:cNvPr id="1" name=""/>
+        <p:cNvGrpSpPr/>
+        <p:nvPr/>
+      </p:nvGrpSpPr>
+      <p:grpSpPr>
+        <a:xfrm>
+          <a:off x="0" y="0"/>
+          <a:ext cx="0" cy="0"/>
+          <a:chOff x="0" y="0"/>
+          <a:chExt cx="0" cy="0"/>
+        </a:xfrm>
+      </p:grpSpPr>
+      <p:sp>
+        <p:nvSpPr>
+          <p:cNvPr id="4" name="Slide Number Placeholder 3">
+            <a:extLst>
+              <a:ext uri="{FF2B5EF4-FFF2-40B4-BE49-F238E27FC236}">
+                <a16:creationId xmlns:a16="http://schemas.microsoft.com/office/drawing/2014/main" id="{540DFF92-E2A0-426D-8547-DD6358862BD9}"/>
+              </a:ext>
+            </a:extLst>
+          </p:cNvPr>
+          <p:cNvSpPr>
+            <a:spLocks noGrp="1"/>
+          </p:cNvSpPr>
+          <p:nvPr>
+            <p:ph type="sldNum" sz="quarter" idx="12"/>
+          </p:nvPr>
+        </p:nvSpPr>
+        <p:spPr/>
+        <p:txBody>
+          <a:bodyPr/>
+          <a:lstStyle/>
+          <a:p>
+            <a:fld id="{1FD78A80-B303-491C-AEE7-8281801B0C65}" type="slidenum">
+              <a:rPr lang="en-US" smtClean="0">
+                <a:solidFill>
+                  <a:prstClr val="black">
+                    <a:tint val="75000"/>
+                  </a:prstClr>
+                </a:solidFill>
+              </a:rPr>
+              <a:pPr/>
+              <a:t>5</a:t>
+            </a:fld>
+            <a:endParaRPr lang="en-US">
+              <a:solidFill>
+                <a:prstClr val="black">
+                  <a:tint val="75000"/>
+                </a:prstClr>
+              </a:solidFill>
+            </a:endParaRPr>
+          </a:p>
+        </p:txBody>
+      </p:sp>
+      <p:pic>
+        <p:nvPicPr>
+          <p:cNvPr id="5" name="Picture 4">
+            <a:extLst>
+              <a:ext uri="{FF2B5EF4-FFF2-40B4-BE49-F238E27FC236}">
+                <a16:creationId xmlns:a16="http://schemas.microsoft.com/office/drawing/2014/main" id="{2870A04C-AD75-40D4-B6B5-66CCA9E1D8FF}"/>
+              </a:ext>
+            </a:extLst>
+          </p:cNvPr>
+          <p:cNvPicPr>
+            <a:picLocks noChangeAspect="1"/>
+          </p:cNvPicPr>
+          <p:nvPr/>
+        </p:nvPicPr>
+        <p:blipFill>
+          <a:blip r:embed="rId2"/>
+          <a:stretch>
+            <a:fillRect/>
+          </a:stretch>
+        </p:blipFill>
+        <p:spPr>
+          <a:xfrm>
+            <a:off x="2936696" y="0"/>
+            <a:ext cx="6318607" cy="6858000"/>
+          </a:xfrm>
+          <a:prstGeom prst="rect">
+            <a:avLst/>
+          </a:prstGeom>
+        </p:spPr>
+      </p:pic>
+    </p:spTree>
+    <p:extLst>
+      <p:ext uri="{BB962C8B-B14F-4D97-AF65-F5344CB8AC3E}">
+        <p14:creationId xmlns:p14="http://schemas.microsoft.com/office/powerpoint/2010/main" val="1910017591"/>
+      </p:ext>
+    </p:extLst>
+  </p:cSld>
+  <p:clrMapOvr>
+    <a:masterClrMapping/>
+  </p:clrMapOvr>
+</p:sld>
+</file>
+
+<file path=ppt/slides/slide50.xml><?xml version="1.0" encoding="utf-8"?>
 <p:sld xmlns:a="http://schemas.openxmlformats.org/drawingml/2006/main" xmlns:r="http://schemas.openxmlformats.org/officeDocument/2006/relationships" xmlns:p="http://schemas.openxmlformats.org/presentationml/2006/main">
   <p:cSld>
     <p:spTree>
@@ -23887,7 +25301,7 @@
                 </a:solidFill>
               </a:rPr>
               <a:pPr/>
-              <a:t>49</a:t>
+              <a:t>50</a:t>
             </a:fld>
             <a:endParaRPr lang="en-US">
               <a:solidFill>
@@ -24055,7 +25469,7 @@
                                         <p:tgtEl>
                                           <p:spTgt spid="3">
                                             <p:txEl>
-                                              <p:charRg st="151" end="190"/>
+                                              <p:pRg st="6" end="6"/>
                                             </p:txEl>
                                           </p:spTgt>
                                         </p:tgtEl>
@@ -24159,109 +25573,7 @@
 </p:sld>
 </file>
 
-<file path=ppt/slides/slide5.xml><?xml version="1.0" encoding="utf-8"?>
-<p:sld xmlns:a="http://schemas.openxmlformats.org/drawingml/2006/main" xmlns:r="http://schemas.openxmlformats.org/officeDocument/2006/relationships" xmlns:p="http://schemas.openxmlformats.org/presentationml/2006/main">
-  <p:cSld>
-    <p:spTree>
-      <p:nvGrpSpPr>
-        <p:cNvPr id="1" name=""/>
-        <p:cNvGrpSpPr/>
-        <p:nvPr/>
-      </p:nvGrpSpPr>
-      <p:grpSpPr>
-        <a:xfrm>
-          <a:off x="0" y="0"/>
-          <a:ext cx="0" cy="0"/>
-          <a:chOff x="0" y="0"/>
-          <a:chExt cx="0" cy="0"/>
-        </a:xfrm>
-      </p:grpSpPr>
-      <p:sp>
-        <p:nvSpPr>
-          <p:cNvPr id="4" name="Slide Number Placeholder 3">
-            <a:extLst>
-              <a:ext uri="{FF2B5EF4-FFF2-40B4-BE49-F238E27FC236}">
-                <a16:creationId xmlns:a16="http://schemas.microsoft.com/office/drawing/2014/main" id="{540DFF92-E2A0-426D-8547-DD6358862BD9}"/>
-              </a:ext>
-            </a:extLst>
-          </p:cNvPr>
-          <p:cNvSpPr>
-            <a:spLocks noGrp="1"/>
-          </p:cNvSpPr>
-          <p:nvPr>
-            <p:ph type="sldNum" sz="quarter" idx="12"/>
-          </p:nvPr>
-        </p:nvSpPr>
-        <p:spPr/>
-        <p:txBody>
-          <a:bodyPr/>
-          <a:lstStyle/>
-          <a:p>
-            <a:fld id="{1FD78A80-B303-491C-AEE7-8281801B0C65}" type="slidenum">
-              <a:rPr lang="en-US" smtClean="0">
-                <a:solidFill>
-                  <a:prstClr val="black">
-                    <a:tint val="75000"/>
-                  </a:prstClr>
-                </a:solidFill>
-              </a:rPr>
-              <a:pPr/>
-              <a:t>5</a:t>
-            </a:fld>
-            <a:endParaRPr lang="en-US">
-              <a:solidFill>
-                <a:prstClr val="black">
-                  <a:tint val="75000"/>
-                </a:prstClr>
-              </a:solidFill>
-            </a:endParaRPr>
-          </a:p>
-        </p:txBody>
-      </p:sp>
-      <p:pic>
-        <p:nvPicPr>
-          <p:cNvPr id="5" name="Picture 4">
-            <a:extLst>
-              <a:ext uri="{FF2B5EF4-FFF2-40B4-BE49-F238E27FC236}">
-                <a16:creationId xmlns:a16="http://schemas.microsoft.com/office/drawing/2014/main" id="{2870A04C-AD75-40D4-B6B5-66CCA9E1D8FF}"/>
-              </a:ext>
-            </a:extLst>
-          </p:cNvPr>
-          <p:cNvPicPr>
-            <a:picLocks noChangeAspect="1"/>
-          </p:cNvPicPr>
-          <p:nvPr/>
-        </p:nvPicPr>
-        <p:blipFill>
-          <a:blip r:embed="rId2"/>
-          <a:stretch>
-            <a:fillRect/>
-          </a:stretch>
-        </p:blipFill>
-        <p:spPr>
-          <a:xfrm>
-            <a:off x="2936696" y="0"/>
-            <a:ext cx="6318607" cy="6858000"/>
-          </a:xfrm>
-          <a:prstGeom prst="rect">
-            <a:avLst/>
-          </a:prstGeom>
-        </p:spPr>
-      </p:pic>
-    </p:spTree>
-    <p:extLst>
-      <p:ext uri="{BB962C8B-B14F-4D97-AF65-F5344CB8AC3E}">
-        <p14:creationId xmlns:p14="http://schemas.microsoft.com/office/powerpoint/2010/main" val="1910017591"/>
-      </p:ext>
-    </p:extLst>
-  </p:cSld>
-  <p:clrMapOvr>
-    <a:masterClrMapping/>
-  </p:clrMapOvr>
-</p:sld>
-</file>
-
-<file path=ppt/slides/slide50.xml><?xml version="1.0" encoding="utf-8"?>
+<file path=ppt/slides/slide51.xml><?xml version="1.0" encoding="utf-8"?>
 <p:sld xmlns:a="http://schemas.openxmlformats.org/drawingml/2006/main" xmlns:r="http://schemas.openxmlformats.org/officeDocument/2006/relationships" xmlns:p="http://schemas.openxmlformats.org/presentationml/2006/main">
   <p:cSld>
     <p:spTree>
@@ -24514,7 +25826,7 @@
                 </a:solidFill>
               </a:rPr>
               <a:pPr/>
-              <a:t>50</a:t>
+              <a:t>51</a:t>
             </a:fld>
             <a:endParaRPr lang="en-US">
               <a:solidFill>
@@ -24786,7 +26098,7 @@
 </p:sld>
 </file>
 
-<file path=ppt/slides/slide51.xml><?xml version="1.0" encoding="utf-8"?>
+<file path=ppt/slides/slide52.xml><?xml version="1.0" encoding="utf-8"?>
 <p:sld xmlns:a="http://schemas.openxmlformats.org/drawingml/2006/main" xmlns:r="http://schemas.openxmlformats.org/officeDocument/2006/relationships" xmlns:p="http://schemas.openxmlformats.org/presentationml/2006/main">
   <p:cSld>
     <p:spTree>
@@ -25036,7 +26348,7 @@
                 </a:solidFill>
               </a:rPr>
               <a:pPr/>
-              <a:t>51</a:t>
+              <a:t>52</a:t>
             </a:fld>
             <a:endParaRPr lang="en-US">
               <a:solidFill>
@@ -25330,7 +26642,7 @@
 </p:sld>
 </file>
 
-<file path=ppt/slides/slide52.xml><?xml version="1.0" encoding="utf-8"?>
+<file path=ppt/slides/slide53.xml><?xml version="1.0" encoding="utf-8"?>
 <p:sld xmlns:a="http://schemas.openxmlformats.org/drawingml/2006/main" xmlns:r="http://schemas.openxmlformats.org/officeDocument/2006/relationships" xmlns:p="http://schemas.openxmlformats.org/presentationml/2006/main">
   <p:cSld>
     <p:bg>
@@ -25453,7 +26765,7 @@
                 <a:tabLst/>
                 <a:defRPr/>
               </a:pPr>
-              <a:t>52</a:t>
+              <a:t>53</a:t>
             </a:fld>
             <a:endParaRPr kumimoji="0" lang="en-US" sz="1200" b="0" i="0" u="none" strike="noStrike" kern="1200" cap="none" spc="0" normalizeH="0" baseline="0" noProof="0">
               <a:ln>
@@ -25524,7 +26836,7 @@
 </p:sld>
 </file>
 
-<file path=ppt/slides/slide53.xml><?xml version="1.0" encoding="utf-8"?>
+<file path=ppt/slides/slide54.xml><?xml version="1.0" encoding="utf-8"?>
 <p:sld xmlns:a="http://schemas.openxmlformats.org/drawingml/2006/main" xmlns:r="http://schemas.openxmlformats.org/officeDocument/2006/relationships" xmlns:p="http://schemas.openxmlformats.org/presentationml/2006/main">
   <p:cSld>
     <p:spTree>
@@ -26061,7 +27373,7 @@
                 </a:solidFill>
               </a:rPr>
               <a:pPr/>
-              <a:t>53</a:t>
+              <a:t>54</a:t>
             </a:fld>
             <a:endParaRPr lang="en-US">
               <a:solidFill>
@@ -26320,7 +27632,7 @@
 </p:sld>
 </file>
 
-<file path=ppt/slides/slide54.xml><?xml version="1.0" encoding="utf-8"?>
+<file path=ppt/slides/slide55.xml><?xml version="1.0" encoding="utf-8"?>
 <p:sld xmlns:a="http://schemas.openxmlformats.org/drawingml/2006/main" xmlns:r="http://schemas.openxmlformats.org/officeDocument/2006/relationships" xmlns:p="http://schemas.openxmlformats.org/presentationml/2006/main">
   <p:cSld>
     <p:spTree>
@@ -26720,7 +28032,7 @@
                 </a:solidFill>
               </a:rPr>
               <a:pPr/>
-              <a:t>54</a:t>
+              <a:t>55</a:t>
             </a:fld>
             <a:endParaRPr lang="en-US">
               <a:solidFill>
@@ -27072,7 +28384,7 @@
 </p:sld>
 </file>
 
-<file path=ppt/slides/slide55.xml><?xml version="1.0" encoding="utf-8"?>
+<file path=ppt/slides/slide56.xml><?xml version="1.0" encoding="utf-8"?>
 <p:sld xmlns:a="http://schemas.openxmlformats.org/drawingml/2006/main" xmlns:r="http://schemas.openxmlformats.org/officeDocument/2006/relationships" xmlns:p="http://schemas.openxmlformats.org/presentationml/2006/main">
   <p:cSld>
     <p:spTree>
@@ -27897,676 +29209,6 @@
                 </a:solidFill>
               </a:rPr>
               <a:pPr/>
-              <a:t>55</a:t>
-            </a:fld>
-            <a:endParaRPr lang="en-US">
-              <a:solidFill>
-                <a:prstClr val="black">
-                  <a:tint val="75000"/>
-                </a:prstClr>
-              </a:solidFill>
-            </a:endParaRPr>
-          </a:p>
-        </p:txBody>
-      </p:sp>
-    </p:spTree>
-    <p:extLst>
-      <p:ext uri="{BB962C8B-B14F-4D97-AF65-F5344CB8AC3E}">
-        <p14:creationId xmlns:p14="http://schemas.microsoft.com/office/powerpoint/2010/main" val="281666730"/>
-      </p:ext>
-    </p:extLst>
-  </p:cSld>
-  <p:clrMapOvr>
-    <a:masterClrMapping/>
-  </p:clrMapOvr>
-</p:sld>
-</file>
-
-<file path=ppt/slides/slide56.xml><?xml version="1.0" encoding="utf-8"?>
-<p:sld xmlns:a="http://schemas.openxmlformats.org/drawingml/2006/main" xmlns:r="http://schemas.openxmlformats.org/officeDocument/2006/relationships" xmlns:p="http://schemas.openxmlformats.org/presentationml/2006/main">
-  <p:cSld>
-    <p:spTree>
-      <p:nvGrpSpPr>
-        <p:cNvPr id="1" name=""/>
-        <p:cNvGrpSpPr/>
-        <p:nvPr/>
-      </p:nvGrpSpPr>
-      <p:grpSpPr>
-        <a:xfrm>
-          <a:off x="0" y="0"/>
-          <a:ext cx="0" cy="0"/>
-          <a:chOff x="0" y="0"/>
-          <a:chExt cx="0" cy="0"/>
-        </a:xfrm>
-      </p:grpSpPr>
-      <p:sp>
-        <p:nvSpPr>
-          <p:cNvPr id="3" name="Content Placeholder 2">
-            <a:extLst>
-              <a:ext uri="{FF2B5EF4-FFF2-40B4-BE49-F238E27FC236}">
-                <a16:creationId xmlns:a16="http://schemas.microsoft.com/office/drawing/2014/main" id="{DB7474A6-12B8-4D5A-9967-966A564A53D6}"/>
-              </a:ext>
-            </a:extLst>
-          </p:cNvPr>
-          <p:cNvSpPr>
-            <a:spLocks noGrp="1"/>
-          </p:cNvSpPr>
-          <p:nvPr>
-            <p:ph idx="1"/>
-          </p:nvPr>
-        </p:nvSpPr>
-        <p:spPr>
-          <a:xfrm>
-            <a:off x="214313" y="264319"/>
-            <a:ext cx="11139487" cy="6272212"/>
-          </a:xfrm>
-        </p:spPr>
-        <p:txBody>
-          <a:bodyPr>
-            <a:normAutofit/>
-          </a:bodyPr>
-          <a:lstStyle/>
-          <a:p>
-            <a:pPr marL="0" indent="0">
-              <a:buNone/>
-            </a:pPr>
-            <a:r>
-              <a:rPr lang="en-US" sz="2200" dirty="0" err="1">
-                <a:latin typeface="Courier New" panose="02070309020205020404" pitchFamily="49" charset="0"/>
-                <a:cs typeface="Courier New" panose="02070309020205020404" pitchFamily="49" charset="0"/>
-              </a:rPr>
-              <a:t>knn_clas_res</a:t>
-            </a:r>
-            <a:r>
-              <a:rPr lang="en-US" sz="2200" dirty="0">
-                <a:latin typeface="Courier New" panose="02070309020205020404" pitchFamily="49" charset="0"/>
-                <a:cs typeface="Courier New" panose="02070309020205020404" pitchFamily="49" charset="0"/>
-              </a:rPr>
-              <a:t> %&gt;% </a:t>
-            </a:r>
-          </a:p>
-          <a:p>
-            <a:pPr marL="0" indent="0">
-              <a:buNone/>
-            </a:pPr>
-            <a:r>
-              <a:rPr lang="en-US" sz="2200" dirty="0">
-                <a:latin typeface="Courier New" panose="02070309020205020404" pitchFamily="49" charset="0"/>
-                <a:cs typeface="Courier New" panose="02070309020205020404" pitchFamily="49" charset="0"/>
-              </a:rPr>
-              <a:t>  </a:t>
-            </a:r>
-            <a:r>
-              <a:rPr lang="en-US" sz="2200" dirty="0" err="1">
-                <a:latin typeface="Courier New" panose="02070309020205020404" pitchFamily="49" charset="0"/>
-                <a:cs typeface="Courier New" panose="02070309020205020404" pitchFamily="49" charset="0"/>
-              </a:rPr>
-              <a:t>show_best</a:t>
-            </a:r>
-            <a:r>
-              <a:rPr lang="en-US" sz="2200" dirty="0">
-                <a:latin typeface="Courier New" panose="02070309020205020404" pitchFamily="49" charset="0"/>
-                <a:cs typeface="Courier New" panose="02070309020205020404" pitchFamily="49" charset="0"/>
-              </a:rPr>
-              <a:t>(metric = "</a:t>
-            </a:r>
-            <a:r>
-              <a:rPr lang="en-US" sz="2200" dirty="0" err="1">
-                <a:latin typeface="Courier New" panose="02070309020205020404" pitchFamily="49" charset="0"/>
-                <a:cs typeface="Courier New" panose="02070309020205020404" pitchFamily="49" charset="0"/>
-              </a:rPr>
-              <a:t>roc_auc</a:t>
-            </a:r>
-            <a:r>
-              <a:rPr lang="en-US" sz="2200" dirty="0">
-                <a:latin typeface="Courier New" panose="02070309020205020404" pitchFamily="49" charset="0"/>
-                <a:cs typeface="Courier New" panose="02070309020205020404" pitchFamily="49" charset="0"/>
-              </a:rPr>
-              <a:t>", n = 5)</a:t>
-            </a:r>
-          </a:p>
-          <a:p>
-            <a:pPr marL="0" indent="0">
-              <a:buNone/>
-            </a:pPr>
-            <a:endParaRPr lang="en-US" sz="2200" dirty="0">
-              <a:latin typeface="Courier New" panose="02070309020205020404" pitchFamily="49" charset="0"/>
-              <a:cs typeface="Courier New" panose="02070309020205020404" pitchFamily="49" charset="0"/>
-            </a:endParaRPr>
-          </a:p>
-          <a:p>
-            <a:pPr marL="0" indent="0">
-              <a:spcBef>
-                <a:spcPts val="0"/>
-              </a:spcBef>
-              <a:buNone/>
-            </a:pPr>
-            <a:r>
-              <a:rPr lang="en-US" sz="2200" dirty="0">
-                <a:highlight>
-                  <a:srgbClr val="C0C0C0"/>
-                </a:highlight>
-                <a:latin typeface="Courier New" panose="02070309020205020404" pitchFamily="49" charset="0"/>
-                <a:cs typeface="Courier New" panose="02070309020205020404" pitchFamily="49" charset="0"/>
-              </a:rPr>
-              <a:t># A </a:t>
-            </a:r>
-            <a:r>
-              <a:rPr lang="en-US" sz="2200" dirty="0" err="1">
-                <a:highlight>
-                  <a:srgbClr val="C0C0C0"/>
-                </a:highlight>
-                <a:latin typeface="Courier New" panose="02070309020205020404" pitchFamily="49" charset="0"/>
-                <a:cs typeface="Courier New" panose="02070309020205020404" pitchFamily="49" charset="0"/>
-              </a:rPr>
-              <a:t>tibble</a:t>
-            </a:r>
-            <a:r>
-              <a:rPr lang="en-US" sz="2200" dirty="0">
-                <a:highlight>
-                  <a:srgbClr val="C0C0C0"/>
-                </a:highlight>
-                <a:latin typeface="Courier New" panose="02070309020205020404" pitchFamily="49" charset="0"/>
-                <a:cs typeface="Courier New" panose="02070309020205020404" pitchFamily="49" charset="0"/>
-              </a:rPr>
-              <a:t>: 5 x 7</a:t>
-            </a:r>
-          </a:p>
-          <a:p>
-            <a:pPr marL="0" indent="0">
-              <a:spcBef>
-                <a:spcPts val="0"/>
-              </a:spcBef>
-              <a:buNone/>
-            </a:pPr>
-            <a:r>
-              <a:rPr lang="en-US" sz="2200" dirty="0">
-                <a:highlight>
-                  <a:srgbClr val="C0C0C0"/>
-                </a:highlight>
-                <a:latin typeface="Courier New" panose="02070309020205020404" pitchFamily="49" charset="0"/>
-                <a:cs typeface="Courier New" panose="02070309020205020404" pitchFamily="49" charset="0"/>
-              </a:rPr>
-              <a:t>  neighbors </a:t>
-            </a:r>
-            <a:r>
-              <a:rPr lang="en-US" sz="2200" dirty="0" err="1">
-                <a:highlight>
-                  <a:srgbClr val="C0C0C0"/>
-                </a:highlight>
-                <a:latin typeface="Courier New" panose="02070309020205020404" pitchFamily="49" charset="0"/>
-                <a:cs typeface="Courier New" panose="02070309020205020404" pitchFamily="49" charset="0"/>
-              </a:rPr>
-              <a:t>weight_func</a:t>
-            </a:r>
-            <a:r>
-              <a:rPr lang="en-US" sz="2200" dirty="0">
-                <a:highlight>
-                  <a:srgbClr val="C0C0C0"/>
-                </a:highlight>
-                <a:latin typeface="Courier New" panose="02070309020205020404" pitchFamily="49" charset="0"/>
-                <a:cs typeface="Courier New" panose="02070309020205020404" pitchFamily="49" charset="0"/>
-              </a:rPr>
-              <a:t> .metric .estimator  mean     n </a:t>
-            </a:r>
-            <a:r>
-              <a:rPr lang="en-US" sz="2200" dirty="0" err="1">
-                <a:highlight>
-                  <a:srgbClr val="C0C0C0"/>
-                </a:highlight>
-                <a:latin typeface="Courier New" panose="02070309020205020404" pitchFamily="49" charset="0"/>
-                <a:cs typeface="Courier New" panose="02070309020205020404" pitchFamily="49" charset="0"/>
-              </a:rPr>
-              <a:t>std_err</a:t>
-            </a:r>
-            <a:endParaRPr lang="en-US" sz="2200" dirty="0">
-              <a:highlight>
-                <a:srgbClr val="C0C0C0"/>
-              </a:highlight>
-              <a:latin typeface="Courier New" panose="02070309020205020404" pitchFamily="49" charset="0"/>
-              <a:cs typeface="Courier New" panose="02070309020205020404" pitchFamily="49" charset="0"/>
-            </a:endParaRPr>
-          </a:p>
-          <a:p>
-            <a:pPr marL="0" indent="0">
-              <a:spcBef>
-                <a:spcPts val="0"/>
-              </a:spcBef>
-              <a:buNone/>
-            </a:pPr>
-            <a:r>
-              <a:rPr lang="en-US" sz="2200" dirty="0">
-                <a:highlight>
-                  <a:srgbClr val="C0C0C0"/>
-                </a:highlight>
-                <a:latin typeface="Courier New" panose="02070309020205020404" pitchFamily="49" charset="0"/>
-                <a:cs typeface="Courier New" panose="02070309020205020404" pitchFamily="49" charset="0"/>
-              </a:rPr>
-              <a:t>      &lt;int&gt; &lt;</a:t>
-            </a:r>
-            <a:r>
-              <a:rPr lang="en-US" sz="2200" dirty="0" err="1">
-                <a:highlight>
-                  <a:srgbClr val="C0C0C0"/>
-                </a:highlight>
-                <a:latin typeface="Courier New" panose="02070309020205020404" pitchFamily="49" charset="0"/>
-                <a:cs typeface="Courier New" panose="02070309020205020404" pitchFamily="49" charset="0"/>
-              </a:rPr>
-              <a:t>chr</a:t>
-            </a:r>
-            <a:r>
-              <a:rPr lang="en-US" sz="2200" dirty="0">
-                <a:highlight>
-                  <a:srgbClr val="C0C0C0"/>
-                </a:highlight>
-                <a:latin typeface="Courier New" panose="02070309020205020404" pitchFamily="49" charset="0"/>
-                <a:cs typeface="Courier New" panose="02070309020205020404" pitchFamily="49" charset="0"/>
-              </a:rPr>
-              <a:t>&gt;       &lt;</a:t>
-            </a:r>
-            <a:r>
-              <a:rPr lang="en-US" sz="2200" dirty="0" err="1">
-                <a:highlight>
-                  <a:srgbClr val="C0C0C0"/>
-                </a:highlight>
-                <a:latin typeface="Courier New" panose="02070309020205020404" pitchFamily="49" charset="0"/>
-                <a:cs typeface="Courier New" panose="02070309020205020404" pitchFamily="49" charset="0"/>
-              </a:rPr>
-              <a:t>chr</a:t>
-            </a:r>
-            <a:r>
-              <a:rPr lang="en-US" sz="2200" dirty="0">
-                <a:highlight>
-                  <a:srgbClr val="C0C0C0"/>
-                </a:highlight>
-                <a:latin typeface="Courier New" panose="02070309020205020404" pitchFamily="49" charset="0"/>
-                <a:cs typeface="Courier New" panose="02070309020205020404" pitchFamily="49" charset="0"/>
-              </a:rPr>
-              <a:t>&gt;   &lt;</a:t>
-            </a:r>
-            <a:r>
-              <a:rPr lang="en-US" sz="2200" dirty="0" err="1">
-                <a:highlight>
-                  <a:srgbClr val="C0C0C0"/>
-                </a:highlight>
-                <a:latin typeface="Courier New" panose="02070309020205020404" pitchFamily="49" charset="0"/>
-                <a:cs typeface="Courier New" panose="02070309020205020404" pitchFamily="49" charset="0"/>
-              </a:rPr>
-              <a:t>chr</a:t>
-            </a:r>
-            <a:r>
-              <a:rPr lang="en-US" sz="2200" dirty="0">
-                <a:highlight>
-                  <a:srgbClr val="C0C0C0"/>
-                </a:highlight>
-                <a:latin typeface="Courier New" panose="02070309020205020404" pitchFamily="49" charset="0"/>
-                <a:cs typeface="Courier New" panose="02070309020205020404" pitchFamily="49" charset="0"/>
-              </a:rPr>
-              <a:t>&gt;      &lt;</a:t>
-            </a:r>
-            <a:r>
-              <a:rPr lang="en-US" sz="2200" dirty="0" err="1">
-                <a:highlight>
-                  <a:srgbClr val="C0C0C0"/>
-                </a:highlight>
-                <a:latin typeface="Courier New" panose="02070309020205020404" pitchFamily="49" charset="0"/>
-                <a:cs typeface="Courier New" panose="02070309020205020404" pitchFamily="49" charset="0"/>
-              </a:rPr>
-              <a:t>dbl</a:t>
-            </a:r>
-            <a:r>
-              <a:rPr lang="en-US" sz="2200" dirty="0">
-                <a:highlight>
-                  <a:srgbClr val="C0C0C0"/>
-                </a:highlight>
-                <a:latin typeface="Courier New" panose="02070309020205020404" pitchFamily="49" charset="0"/>
-                <a:cs typeface="Courier New" panose="02070309020205020404" pitchFamily="49" charset="0"/>
-              </a:rPr>
-              <a:t>&gt; &lt;int&gt;   &lt;</a:t>
-            </a:r>
-            <a:r>
-              <a:rPr lang="en-US" sz="2200" dirty="0" err="1">
-                <a:highlight>
-                  <a:srgbClr val="C0C0C0"/>
-                </a:highlight>
-                <a:latin typeface="Courier New" panose="02070309020205020404" pitchFamily="49" charset="0"/>
-                <a:cs typeface="Courier New" panose="02070309020205020404" pitchFamily="49" charset="0"/>
-              </a:rPr>
-              <a:t>dbl</a:t>
-            </a:r>
-            <a:r>
-              <a:rPr lang="en-US" sz="2200" dirty="0">
-                <a:highlight>
-                  <a:srgbClr val="C0C0C0"/>
-                </a:highlight>
-                <a:latin typeface="Courier New" panose="02070309020205020404" pitchFamily="49" charset="0"/>
-                <a:cs typeface="Courier New" panose="02070309020205020404" pitchFamily="49" charset="0"/>
-              </a:rPr>
-              <a:t>&gt;</a:t>
-            </a:r>
-          </a:p>
-          <a:p>
-            <a:pPr marL="0" indent="0">
-              <a:spcBef>
-                <a:spcPts val="0"/>
-              </a:spcBef>
-              <a:buNone/>
-            </a:pPr>
-            <a:r>
-              <a:rPr lang="en-US" sz="2200" dirty="0">
-                <a:highlight>
-                  <a:srgbClr val="C0C0C0"/>
-                </a:highlight>
-                <a:latin typeface="Courier New" panose="02070309020205020404" pitchFamily="49" charset="0"/>
-                <a:cs typeface="Courier New" panose="02070309020205020404" pitchFamily="49" charset="0"/>
-              </a:rPr>
-              <a:t>1        10 rank        </a:t>
-            </a:r>
-            <a:r>
-              <a:rPr lang="en-US" sz="2200" dirty="0" err="1">
-                <a:highlight>
-                  <a:srgbClr val="C0C0C0"/>
-                </a:highlight>
-                <a:latin typeface="Courier New" panose="02070309020205020404" pitchFamily="49" charset="0"/>
-                <a:cs typeface="Courier New" panose="02070309020205020404" pitchFamily="49" charset="0"/>
-              </a:rPr>
-              <a:t>roc_auc</a:t>
-            </a:r>
-            <a:r>
-              <a:rPr lang="en-US" sz="2200" dirty="0">
-                <a:highlight>
-                  <a:srgbClr val="C0C0C0"/>
-                </a:highlight>
-                <a:latin typeface="Courier New" panose="02070309020205020404" pitchFamily="49" charset="0"/>
-                <a:cs typeface="Courier New" panose="02070309020205020404" pitchFamily="49" charset="0"/>
-              </a:rPr>
-              <a:t> </a:t>
-            </a:r>
-            <a:r>
-              <a:rPr lang="en-US" sz="2200" dirty="0" err="1">
-                <a:highlight>
-                  <a:srgbClr val="C0C0C0"/>
-                </a:highlight>
-                <a:latin typeface="Courier New" panose="02070309020205020404" pitchFamily="49" charset="0"/>
-                <a:cs typeface="Courier New" panose="02070309020205020404" pitchFamily="49" charset="0"/>
-              </a:rPr>
-              <a:t>hand_till</a:t>
-            </a:r>
-            <a:r>
-              <a:rPr lang="en-US" sz="2200" dirty="0">
-                <a:highlight>
-                  <a:srgbClr val="C0C0C0"/>
-                </a:highlight>
-                <a:latin typeface="Courier New" panose="02070309020205020404" pitchFamily="49" charset="0"/>
-                <a:cs typeface="Courier New" panose="02070309020205020404" pitchFamily="49" charset="0"/>
-              </a:rPr>
-              <a:t>  0.605    10 0.00558</a:t>
-            </a:r>
-          </a:p>
-          <a:p>
-            <a:pPr marL="0" indent="0">
-              <a:spcBef>
-                <a:spcPts val="0"/>
-              </a:spcBef>
-              <a:buNone/>
-            </a:pPr>
-            <a:r>
-              <a:rPr lang="en-US" sz="2200" dirty="0">
-                <a:highlight>
-                  <a:srgbClr val="C0C0C0"/>
-                </a:highlight>
-                <a:latin typeface="Courier New" panose="02070309020205020404" pitchFamily="49" charset="0"/>
-                <a:cs typeface="Courier New" panose="02070309020205020404" pitchFamily="49" charset="0"/>
-              </a:rPr>
-              <a:t>2         9 gaussian    </a:t>
-            </a:r>
-            <a:r>
-              <a:rPr lang="en-US" sz="2200" dirty="0" err="1">
-                <a:highlight>
-                  <a:srgbClr val="C0C0C0"/>
-                </a:highlight>
-                <a:latin typeface="Courier New" panose="02070309020205020404" pitchFamily="49" charset="0"/>
-                <a:cs typeface="Courier New" panose="02070309020205020404" pitchFamily="49" charset="0"/>
-              </a:rPr>
-              <a:t>roc_auc</a:t>
-            </a:r>
-            <a:r>
-              <a:rPr lang="en-US" sz="2200" dirty="0">
-                <a:highlight>
-                  <a:srgbClr val="C0C0C0"/>
-                </a:highlight>
-                <a:latin typeface="Courier New" panose="02070309020205020404" pitchFamily="49" charset="0"/>
-                <a:cs typeface="Courier New" panose="02070309020205020404" pitchFamily="49" charset="0"/>
-              </a:rPr>
-              <a:t> </a:t>
-            </a:r>
-            <a:r>
-              <a:rPr lang="en-US" sz="2200" dirty="0" err="1">
-                <a:highlight>
-                  <a:srgbClr val="C0C0C0"/>
-                </a:highlight>
-                <a:latin typeface="Courier New" panose="02070309020205020404" pitchFamily="49" charset="0"/>
-                <a:cs typeface="Courier New" panose="02070309020205020404" pitchFamily="49" charset="0"/>
-              </a:rPr>
-              <a:t>hand_till</a:t>
-            </a:r>
-            <a:r>
-              <a:rPr lang="en-US" sz="2200" dirty="0">
-                <a:highlight>
-                  <a:srgbClr val="C0C0C0"/>
-                </a:highlight>
-                <a:latin typeface="Courier New" panose="02070309020205020404" pitchFamily="49" charset="0"/>
-                <a:cs typeface="Courier New" panose="02070309020205020404" pitchFamily="49" charset="0"/>
-              </a:rPr>
-              <a:t>  0.605    10 0.00600</a:t>
-            </a:r>
-          </a:p>
-          <a:p>
-            <a:pPr marL="0" indent="0">
-              <a:spcBef>
-                <a:spcPts val="0"/>
-              </a:spcBef>
-              <a:buNone/>
-            </a:pPr>
-            <a:r>
-              <a:rPr lang="en-US" sz="2200" dirty="0">
-                <a:highlight>
-                  <a:srgbClr val="C0C0C0"/>
-                </a:highlight>
-                <a:latin typeface="Courier New" panose="02070309020205020404" pitchFamily="49" charset="0"/>
-                <a:cs typeface="Courier New" panose="02070309020205020404" pitchFamily="49" charset="0"/>
-              </a:rPr>
-              <a:t>3         8 triangular  </a:t>
-            </a:r>
-            <a:r>
-              <a:rPr lang="en-US" sz="2200" dirty="0" err="1">
-                <a:highlight>
-                  <a:srgbClr val="C0C0C0"/>
-                </a:highlight>
-                <a:latin typeface="Courier New" panose="02070309020205020404" pitchFamily="49" charset="0"/>
-                <a:cs typeface="Courier New" panose="02070309020205020404" pitchFamily="49" charset="0"/>
-              </a:rPr>
-              <a:t>roc_auc</a:t>
-            </a:r>
-            <a:r>
-              <a:rPr lang="en-US" sz="2200" dirty="0">
-                <a:highlight>
-                  <a:srgbClr val="C0C0C0"/>
-                </a:highlight>
-                <a:latin typeface="Courier New" panose="02070309020205020404" pitchFamily="49" charset="0"/>
-                <a:cs typeface="Courier New" panose="02070309020205020404" pitchFamily="49" charset="0"/>
-              </a:rPr>
-              <a:t> </a:t>
-            </a:r>
-            <a:r>
-              <a:rPr lang="en-US" sz="2200" dirty="0" err="1">
-                <a:highlight>
-                  <a:srgbClr val="C0C0C0"/>
-                </a:highlight>
-                <a:latin typeface="Courier New" panose="02070309020205020404" pitchFamily="49" charset="0"/>
-                <a:cs typeface="Courier New" panose="02070309020205020404" pitchFamily="49" charset="0"/>
-              </a:rPr>
-              <a:t>hand_till</a:t>
-            </a:r>
-            <a:r>
-              <a:rPr lang="en-US" sz="2200" dirty="0">
-                <a:highlight>
-                  <a:srgbClr val="C0C0C0"/>
-                </a:highlight>
-                <a:latin typeface="Courier New" panose="02070309020205020404" pitchFamily="49" charset="0"/>
-                <a:cs typeface="Courier New" panose="02070309020205020404" pitchFamily="49" charset="0"/>
-              </a:rPr>
-              <a:t>  0.601    10 0.00596</a:t>
-            </a:r>
-          </a:p>
-          <a:p>
-            <a:pPr marL="0" indent="0">
-              <a:spcBef>
-                <a:spcPts val="0"/>
-              </a:spcBef>
-              <a:buNone/>
-            </a:pPr>
-            <a:r>
-              <a:rPr lang="en-US" sz="2200" dirty="0">
-                <a:highlight>
-                  <a:srgbClr val="C0C0C0"/>
-                </a:highlight>
-                <a:latin typeface="Courier New" panose="02070309020205020404" pitchFamily="49" charset="0"/>
-                <a:cs typeface="Courier New" panose="02070309020205020404" pitchFamily="49" charset="0"/>
-              </a:rPr>
-              <a:t>4         7 gaussian    </a:t>
-            </a:r>
-            <a:r>
-              <a:rPr lang="en-US" sz="2200" dirty="0" err="1">
-                <a:highlight>
-                  <a:srgbClr val="C0C0C0"/>
-                </a:highlight>
-                <a:latin typeface="Courier New" panose="02070309020205020404" pitchFamily="49" charset="0"/>
-                <a:cs typeface="Courier New" panose="02070309020205020404" pitchFamily="49" charset="0"/>
-              </a:rPr>
-              <a:t>roc_auc</a:t>
-            </a:r>
-            <a:r>
-              <a:rPr lang="en-US" sz="2200" dirty="0">
-                <a:highlight>
-                  <a:srgbClr val="C0C0C0"/>
-                </a:highlight>
-                <a:latin typeface="Courier New" panose="02070309020205020404" pitchFamily="49" charset="0"/>
-                <a:cs typeface="Courier New" panose="02070309020205020404" pitchFamily="49" charset="0"/>
-              </a:rPr>
-              <a:t> </a:t>
-            </a:r>
-            <a:r>
-              <a:rPr lang="en-US" sz="2200" dirty="0" err="1">
-                <a:highlight>
-                  <a:srgbClr val="C0C0C0"/>
-                </a:highlight>
-                <a:latin typeface="Courier New" panose="02070309020205020404" pitchFamily="49" charset="0"/>
-                <a:cs typeface="Courier New" panose="02070309020205020404" pitchFamily="49" charset="0"/>
-              </a:rPr>
-              <a:t>hand_till</a:t>
-            </a:r>
-            <a:r>
-              <a:rPr lang="en-US" sz="2200" dirty="0">
-                <a:highlight>
-                  <a:srgbClr val="C0C0C0"/>
-                </a:highlight>
-                <a:latin typeface="Courier New" panose="02070309020205020404" pitchFamily="49" charset="0"/>
-                <a:cs typeface="Courier New" panose="02070309020205020404" pitchFamily="49" charset="0"/>
-              </a:rPr>
-              <a:t>  0.601    10 0.00552</a:t>
-            </a:r>
-          </a:p>
-          <a:p>
-            <a:pPr marL="0" indent="0">
-              <a:spcBef>
-                <a:spcPts val="0"/>
-              </a:spcBef>
-              <a:buNone/>
-            </a:pPr>
-            <a:r>
-              <a:rPr lang="en-US" sz="2200" dirty="0">
-                <a:highlight>
-                  <a:srgbClr val="C0C0C0"/>
-                </a:highlight>
-                <a:latin typeface="Courier New" panose="02070309020205020404" pitchFamily="49" charset="0"/>
-                <a:cs typeface="Courier New" panose="02070309020205020404" pitchFamily="49" charset="0"/>
-              </a:rPr>
-              <a:t>5         6 rank        </a:t>
-            </a:r>
-            <a:r>
-              <a:rPr lang="en-US" sz="2200" dirty="0" err="1">
-                <a:highlight>
-                  <a:srgbClr val="C0C0C0"/>
-                </a:highlight>
-                <a:latin typeface="Courier New" panose="02070309020205020404" pitchFamily="49" charset="0"/>
-                <a:cs typeface="Courier New" panose="02070309020205020404" pitchFamily="49" charset="0"/>
-              </a:rPr>
-              <a:t>roc_auc</a:t>
-            </a:r>
-            <a:r>
-              <a:rPr lang="en-US" sz="2200" dirty="0">
-                <a:highlight>
-                  <a:srgbClr val="C0C0C0"/>
-                </a:highlight>
-                <a:latin typeface="Courier New" panose="02070309020205020404" pitchFamily="49" charset="0"/>
-                <a:cs typeface="Courier New" panose="02070309020205020404" pitchFamily="49" charset="0"/>
-              </a:rPr>
-              <a:t> </a:t>
-            </a:r>
-            <a:r>
-              <a:rPr lang="en-US" sz="2200" dirty="0" err="1">
-                <a:highlight>
-                  <a:srgbClr val="C0C0C0"/>
-                </a:highlight>
-                <a:latin typeface="Courier New" panose="02070309020205020404" pitchFamily="49" charset="0"/>
-                <a:cs typeface="Courier New" panose="02070309020205020404" pitchFamily="49" charset="0"/>
-              </a:rPr>
-              <a:t>hand_till</a:t>
-            </a:r>
-            <a:r>
-              <a:rPr lang="en-US" sz="2200" dirty="0">
-                <a:highlight>
-                  <a:srgbClr val="C0C0C0"/>
-                </a:highlight>
-                <a:latin typeface="Courier New" panose="02070309020205020404" pitchFamily="49" charset="0"/>
-                <a:cs typeface="Courier New" panose="02070309020205020404" pitchFamily="49" charset="0"/>
-              </a:rPr>
-              <a:t>  0.600    10 0.00544</a:t>
-            </a:r>
-          </a:p>
-        </p:txBody>
-      </p:sp>
-      <p:sp>
-        <p:nvSpPr>
-          <p:cNvPr id="4" name="Slide Number Placeholder 3">
-            <a:extLst>
-              <a:ext uri="{FF2B5EF4-FFF2-40B4-BE49-F238E27FC236}">
-                <a16:creationId xmlns:a16="http://schemas.microsoft.com/office/drawing/2014/main" id="{37125842-965B-46C4-989A-7782CC7BB415}"/>
-              </a:ext>
-            </a:extLst>
-          </p:cNvPr>
-          <p:cNvSpPr>
-            <a:spLocks noGrp="1"/>
-          </p:cNvSpPr>
-          <p:nvPr>
-            <p:ph type="sldNum" sz="quarter" idx="12"/>
-          </p:nvPr>
-        </p:nvSpPr>
-        <p:spPr/>
-        <p:txBody>
-          <a:bodyPr/>
-          <a:lstStyle/>
-          <a:p>
-            <a:fld id="{1FD78A80-B303-491C-AEE7-8281801B0C65}" type="slidenum">
-              <a:rPr lang="en-US" smtClean="0">
-                <a:solidFill>
-                  <a:prstClr val="black">
-                    <a:tint val="75000"/>
-                  </a:prstClr>
-                </a:solidFill>
-              </a:rPr>
-              <a:pPr/>
               <a:t>56</a:t>
             </a:fld>
             <a:endParaRPr lang="en-US">
@@ -28582,7 +29224,7 @@
     </p:spTree>
     <p:extLst>
       <p:ext uri="{BB962C8B-B14F-4D97-AF65-F5344CB8AC3E}">
-        <p14:creationId xmlns:p14="http://schemas.microsoft.com/office/powerpoint/2010/main" val="4210069212"/>
+        <p14:creationId xmlns:p14="http://schemas.microsoft.com/office/powerpoint/2010/main" val="281666730"/>
       </p:ext>
     </p:extLst>
   </p:cSld>
@@ -28671,7 +29313,7 @@
                 <a:latin typeface="Courier New" panose="02070309020205020404" pitchFamily="49" charset="0"/>
                 <a:cs typeface="Courier New" panose="02070309020205020404" pitchFamily="49" charset="0"/>
               </a:rPr>
-              <a:t>autoplot</a:t>
+              <a:t>show_best</a:t>
             </a:r>
             <a:r>
               <a:rPr lang="en-US" sz="2200" dirty="0">
@@ -28692,33 +29334,102 @@
                 <a:latin typeface="Courier New" panose="02070309020205020404" pitchFamily="49" charset="0"/>
                 <a:cs typeface="Courier New" panose="02070309020205020404" pitchFamily="49" charset="0"/>
               </a:rPr>
-              <a:t>") +</a:t>
-            </a:r>
-          </a:p>
-          <a:p>
-            <a:pPr marL="0" indent="0">
-              <a:buNone/>
-            </a:pPr>
-            <a:r>
-              <a:rPr lang="en-US" sz="2200" dirty="0">
-                <a:latin typeface="Courier New" panose="02070309020205020404" pitchFamily="49" charset="0"/>
-                <a:cs typeface="Courier New" panose="02070309020205020404" pitchFamily="49" charset="0"/>
-              </a:rPr>
-              <a:t>  </a:t>
+              <a:t>", n = 5)</a:t>
+            </a:r>
+          </a:p>
+          <a:p>
+            <a:pPr marL="0" indent="0">
+              <a:buNone/>
+            </a:pPr>
+            <a:endParaRPr lang="en-US" sz="2200" dirty="0">
+              <a:latin typeface="Courier New" panose="02070309020205020404" pitchFamily="49" charset="0"/>
+              <a:cs typeface="Courier New" panose="02070309020205020404" pitchFamily="49" charset="0"/>
+            </a:endParaRPr>
+          </a:p>
+          <a:p>
+            <a:pPr marL="0" indent="0">
+              <a:spcBef>
+                <a:spcPts val="0"/>
+              </a:spcBef>
+              <a:buNone/>
+            </a:pPr>
+            <a:r>
+              <a:rPr lang="en-US" sz="2200" dirty="0">
+                <a:highlight>
+                  <a:srgbClr val="C0C0C0"/>
+                </a:highlight>
+                <a:latin typeface="Courier New" panose="02070309020205020404" pitchFamily="49" charset="0"/>
+                <a:cs typeface="Courier New" panose="02070309020205020404" pitchFamily="49" charset="0"/>
+              </a:rPr>
+              <a:t># A </a:t>
             </a:r>
             <a:r>
               <a:rPr lang="en-US" sz="2200" dirty="0" err="1">
-                <a:latin typeface="Courier New" panose="02070309020205020404" pitchFamily="49" charset="0"/>
-                <a:cs typeface="Courier New" panose="02070309020205020404" pitchFamily="49" charset="0"/>
-              </a:rPr>
-              <a:t>geom_line</a:t>
-            </a:r>
-            <a:r>
-              <a:rPr lang="en-US" sz="2200" dirty="0">
-                <a:latin typeface="Courier New" panose="02070309020205020404" pitchFamily="49" charset="0"/>
-                <a:cs typeface="Courier New" panose="02070309020205020404" pitchFamily="49" charset="0"/>
-              </a:rPr>
-              <a:t>()</a:t>
+                <a:highlight>
+                  <a:srgbClr val="C0C0C0"/>
+                </a:highlight>
+                <a:latin typeface="Courier New" panose="02070309020205020404" pitchFamily="49" charset="0"/>
+                <a:cs typeface="Courier New" panose="02070309020205020404" pitchFamily="49" charset="0"/>
+              </a:rPr>
+              <a:t>tibble</a:t>
+            </a:r>
+            <a:r>
+              <a:rPr lang="en-US" sz="2200" dirty="0">
+                <a:highlight>
+                  <a:srgbClr val="C0C0C0"/>
+                </a:highlight>
+                <a:latin typeface="Courier New" panose="02070309020205020404" pitchFamily="49" charset="0"/>
+                <a:cs typeface="Courier New" panose="02070309020205020404" pitchFamily="49" charset="0"/>
+              </a:rPr>
+              <a:t>: 5 x 7</a:t>
+            </a:r>
+          </a:p>
+          <a:p>
+            <a:pPr marL="0" indent="0">
+              <a:spcBef>
+                <a:spcPts val="0"/>
+              </a:spcBef>
+              <a:buNone/>
+            </a:pPr>
+            <a:r>
+              <a:rPr lang="en-US" sz="2200" dirty="0">
+                <a:highlight>
+                  <a:srgbClr val="C0C0C0"/>
+                </a:highlight>
+                <a:latin typeface="Courier New" panose="02070309020205020404" pitchFamily="49" charset="0"/>
+                <a:cs typeface="Courier New" panose="02070309020205020404" pitchFamily="49" charset="0"/>
+              </a:rPr>
+              <a:t>  neighbors </a:t>
+            </a:r>
+            <a:r>
+              <a:rPr lang="en-US" sz="2200" dirty="0" err="1">
+                <a:highlight>
+                  <a:srgbClr val="C0C0C0"/>
+                </a:highlight>
+                <a:latin typeface="Courier New" panose="02070309020205020404" pitchFamily="49" charset="0"/>
+                <a:cs typeface="Courier New" panose="02070309020205020404" pitchFamily="49" charset="0"/>
+              </a:rPr>
+              <a:t>weight_func</a:t>
+            </a:r>
+            <a:r>
+              <a:rPr lang="en-US" sz="2200" dirty="0">
+                <a:highlight>
+                  <a:srgbClr val="C0C0C0"/>
+                </a:highlight>
+                <a:latin typeface="Courier New" panose="02070309020205020404" pitchFamily="49" charset="0"/>
+                <a:cs typeface="Courier New" panose="02070309020205020404" pitchFamily="49" charset="0"/>
+              </a:rPr>
+              <a:t> .metric .estimator  mean     n </a:t>
+            </a:r>
+            <a:r>
+              <a:rPr lang="en-US" sz="2200" dirty="0" err="1">
+                <a:highlight>
+                  <a:srgbClr val="C0C0C0"/>
+                </a:highlight>
+                <a:latin typeface="Courier New" panose="02070309020205020404" pitchFamily="49" charset="0"/>
+                <a:cs typeface="Courier New" panose="02070309020205020404" pitchFamily="49" charset="0"/>
+              </a:rPr>
+              <a:t>std_err</a:t>
             </a:r>
             <a:endParaRPr lang="en-US" sz="2200" dirty="0">
               <a:highlight>
@@ -28727,6 +29438,414 @@
               <a:latin typeface="Courier New" panose="02070309020205020404" pitchFamily="49" charset="0"/>
               <a:cs typeface="Courier New" panose="02070309020205020404" pitchFamily="49" charset="0"/>
             </a:endParaRPr>
+          </a:p>
+          <a:p>
+            <a:pPr marL="0" indent="0">
+              <a:spcBef>
+                <a:spcPts val="0"/>
+              </a:spcBef>
+              <a:buNone/>
+            </a:pPr>
+            <a:r>
+              <a:rPr lang="en-US" sz="2200" dirty="0">
+                <a:highlight>
+                  <a:srgbClr val="C0C0C0"/>
+                </a:highlight>
+                <a:latin typeface="Courier New" panose="02070309020205020404" pitchFamily="49" charset="0"/>
+                <a:cs typeface="Courier New" panose="02070309020205020404" pitchFamily="49" charset="0"/>
+              </a:rPr>
+              <a:t>      &lt;int&gt; &lt;</a:t>
+            </a:r>
+            <a:r>
+              <a:rPr lang="en-US" sz="2200" dirty="0" err="1">
+                <a:highlight>
+                  <a:srgbClr val="C0C0C0"/>
+                </a:highlight>
+                <a:latin typeface="Courier New" panose="02070309020205020404" pitchFamily="49" charset="0"/>
+                <a:cs typeface="Courier New" panose="02070309020205020404" pitchFamily="49" charset="0"/>
+              </a:rPr>
+              <a:t>chr</a:t>
+            </a:r>
+            <a:r>
+              <a:rPr lang="en-US" sz="2200" dirty="0">
+                <a:highlight>
+                  <a:srgbClr val="C0C0C0"/>
+                </a:highlight>
+                <a:latin typeface="Courier New" panose="02070309020205020404" pitchFamily="49" charset="0"/>
+                <a:cs typeface="Courier New" panose="02070309020205020404" pitchFamily="49" charset="0"/>
+              </a:rPr>
+              <a:t>&gt;       &lt;</a:t>
+            </a:r>
+            <a:r>
+              <a:rPr lang="en-US" sz="2200" dirty="0" err="1">
+                <a:highlight>
+                  <a:srgbClr val="C0C0C0"/>
+                </a:highlight>
+                <a:latin typeface="Courier New" panose="02070309020205020404" pitchFamily="49" charset="0"/>
+                <a:cs typeface="Courier New" panose="02070309020205020404" pitchFamily="49" charset="0"/>
+              </a:rPr>
+              <a:t>chr</a:t>
+            </a:r>
+            <a:r>
+              <a:rPr lang="en-US" sz="2200" dirty="0">
+                <a:highlight>
+                  <a:srgbClr val="C0C0C0"/>
+                </a:highlight>
+                <a:latin typeface="Courier New" panose="02070309020205020404" pitchFamily="49" charset="0"/>
+                <a:cs typeface="Courier New" panose="02070309020205020404" pitchFamily="49" charset="0"/>
+              </a:rPr>
+              <a:t>&gt;   &lt;</a:t>
+            </a:r>
+            <a:r>
+              <a:rPr lang="en-US" sz="2200" dirty="0" err="1">
+                <a:highlight>
+                  <a:srgbClr val="C0C0C0"/>
+                </a:highlight>
+                <a:latin typeface="Courier New" panose="02070309020205020404" pitchFamily="49" charset="0"/>
+                <a:cs typeface="Courier New" panose="02070309020205020404" pitchFamily="49" charset="0"/>
+              </a:rPr>
+              <a:t>chr</a:t>
+            </a:r>
+            <a:r>
+              <a:rPr lang="en-US" sz="2200" dirty="0">
+                <a:highlight>
+                  <a:srgbClr val="C0C0C0"/>
+                </a:highlight>
+                <a:latin typeface="Courier New" panose="02070309020205020404" pitchFamily="49" charset="0"/>
+                <a:cs typeface="Courier New" panose="02070309020205020404" pitchFamily="49" charset="0"/>
+              </a:rPr>
+              <a:t>&gt;      &lt;</a:t>
+            </a:r>
+            <a:r>
+              <a:rPr lang="en-US" sz="2200" dirty="0" err="1">
+                <a:highlight>
+                  <a:srgbClr val="C0C0C0"/>
+                </a:highlight>
+                <a:latin typeface="Courier New" panose="02070309020205020404" pitchFamily="49" charset="0"/>
+                <a:cs typeface="Courier New" panose="02070309020205020404" pitchFamily="49" charset="0"/>
+              </a:rPr>
+              <a:t>dbl</a:t>
+            </a:r>
+            <a:r>
+              <a:rPr lang="en-US" sz="2200" dirty="0">
+                <a:highlight>
+                  <a:srgbClr val="C0C0C0"/>
+                </a:highlight>
+                <a:latin typeface="Courier New" panose="02070309020205020404" pitchFamily="49" charset="0"/>
+                <a:cs typeface="Courier New" panose="02070309020205020404" pitchFamily="49" charset="0"/>
+              </a:rPr>
+              <a:t>&gt; &lt;int&gt;   &lt;</a:t>
+            </a:r>
+            <a:r>
+              <a:rPr lang="en-US" sz="2200" dirty="0" err="1">
+                <a:highlight>
+                  <a:srgbClr val="C0C0C0"/>
+                </a:highlight>
+                <a:latin typeface="Courier New" panose="02070309020205020404" pitchFamily="49" charset="0"/>
+                <a:cs typeface="Courier New" panose="02070309020205020404" pitchFamily="49" charset="0"/>
+              </a:rPr>
+              <a:t>dbl</a:t>
+            </a:r>
+            <a:r>
+              <a:rPr lang="en-US" sz="2200" dirty="0">
+                <a:highlight>
+                  <a:srgbClr val="C0C0C0"/>
+                </a:highlight>
+                <a:latin typeface="Courier New" panose="02070309020205020404" pitchFamily="49" charset="0"/>
+                <a:cs typeface="Courier New" panose="02070309020205020404" pitchFamily="49" charset="0"/>
+              </a:rPr>
+              <a:t>&gt;</a:t>
+            </a:r>
+          </a:p>
+          <a:p>
+            <a:pPr marL="0" indent="0">
+              <a:spcBef>
+                <a:spcPts val="0"/>
+              </a:spcBef>
+              <a:buNone/>
+            </a:pPr>
+            <a:r>
+              <a:rPr lang="en-US" sz="2200" dirty="0">
+                <a:highlight>
+                  <a:srgbClr val="C0C0C0"/>
+                </a:highlight>
+                <a:latin typeface="Courier New" panose="02070309020205020404" pitchFamily="49" charset="0"/>
+                <a:cs typeface="Courier New" panose="02070309020205020404" pitchFamily="49" charset="0"/>
+              </a:rPr>
+              <a:t>1        10 rank        </a:t>
+            </a:r>
+            <a:r>
+              <a:rPr lang="en-US" sz="2200" dirty="0" err="1">
+                <a:highlight>
+                  <a:srgbClr val="C0C0C0"/>
+                </a:highlight>
+                <a:latin typeface="Courier New" panose="02070309020205020404" pitchFamily="49" charset="0"/>
+                <a:cs typeface="Courier New" panose="02070309020205020404" pitchFamily="49" charset="0"/>
+              </a:rPr>
+              <a:t>roc_auc</a:t>
+            </a:r>
+            <a:r>
+              <a:rPr lang="en-US" sz="2200" dirty="0">
+                <a:highlight>
+                  <a:srgbClr val="C0C0C0"/>
+                </a:highlight>
+                <a:latin typeface="Courier New" panose="02070309020205020404" pitchFamily="49" charset="0"/>
+                <a:cs typeface="Courier New" panose="02070309020205020404" pitchFamily="49" charset="0"/>
+              </a:rPr>
+              <a:t> </a:t>
+            </a:r>
+            <a:r>
+              <a:rPr lang="en-US" sz="2200" dirty="0" err="1">
+                <a:highlight>
+                  <a:srgbClr val="C0C0C0"/>
+                </a:highlight>
+                <a:latin typeface="Courier New" panose="02070309020205020404" pitchFamily="49" charset="0"/>
+                <a:cs typeface="Courier New" panose="02070309020205020404" pitchFamily="49" charset="0"/>
+              </a:rPr>
+              <a:t>hand_till</a:t>
+            </a:r>
+            <a:r>
+              <a:rPr lang="en-US" sz="2200" dirty="0">
+                <a:highlight>
+                  <a:srgbClr val="C0C0C0"/>
+                </a:highlight>
+                <a:latin typeface="Courier New" panose="02070309020205020404" pitchFamily="49" charset="0"/>
+                <a:cs typeface="Courier New" panose="02070309020205020404" pitchFamily="49" charset="0"/>
+              </a:rPr>
+              <a:t>  0.605    10 0.00558</a:t>
+            </a:r>
+          </a:p>
+          <a:p>
+            <a:pPr marL="0" indent="0">
+              <a:spcBef>
+                <a:spcPts val="0"/>
+              </a:spcBef>
+              <a:buNone/>
+            </a:pPr>
+            <a:r>
+              <a:rPr lang="en-US" sz="2200" dirty="0">
+                <a:highlight>
+                  <a:srgbClr val="C0C0C0"/>
+                </a:highlight>
+                <a:latin typeface="Courier New" panose="02070309020205020404" pitchFamily="49" charset="0"/>
+                <a:cs typeface="Courier New" panose="02070309020205020404" pitchFamily="49" charset="0"/>
+              </a:rPr>
+              <a:t>2         9 gaussian    </a:t>
+            </a:r>
+            <a:r>
+              <a:rPr lang="en-US" sz="2200" dirty="0" err="1">
+                <a:highlight>
+                  <a:srgbClr val="C0C0C0"/>
+                </a:highlight>
+                <a:latin typeface="Courier New" panose="02070309020205020404" pitchFamily="49" charset="0"/>
+                <a:cs typeface="Courier New" panose="02070309020205020404" pitchFamily="49" charset="0"/>
+              </a:rPr>
+              <a:t>roc_auc</a:t>
+            </a:r>
+            <a:r>
+              <a:rPr lang="en-US" sz="2200" dirty="0">
+                <a:highlight>
+                  <a:srgbClr val="C0C0C0"/>
+                </a:highlight>
+                <a:latin typeface="Courier New" panose="02070309020205020404" pitchFamily="49" charset="0"/>
+                <a:cs typeface="Courier New" panose="02070309020205020404" pitchFamily="49" charset="0"/>
+              </a:rPr>
+              <a:t> </a:t>
+            </a:r>
+            <a:r>
+              <a:rPr lang="en-US" sz="2200" dirty="0" err="1">
+                <a:highlight>
+                  <a:srgbClr val="C0C0C0"/>
+                </a:highlight>
+                <a:latin typeface="Courier New" panose="02070309020205020404" pitchFamily="49" charset="0"/>
+                <a:cs typeface="Courier New" panose="02070309020205020404" pitchFamily="49" charset="0"/>
+              </a:rPr>
+              <a:t>hand_till</a:t>
+            </a:r>
+            <a:r>
+              <a:rPr lang="en-US" sz="2200" dirty="0">
+                <a:highlight>
+                  <a:srgbClr val="C0C0C0"/>
+                </a:highlight>
+                <a:latin typeface="Courier New" panose="02070309020205020404" pitchFamily="49" charset="0"/>
+                <a:cs typeface="Courier New" panose="02070309020205020404" pitchFamily="49" charset="0"/>
+              </a:rPr>
+              <a:t>  0.605    10 0.00600</a:t>
+            </a:r>
+          </a:p>
+          <a:p>
+            <a:pPr marL="0" indent="0">
+              <a:spcBef>
+                <a:spcPts val="0"/>
+              </a:spcBef>
+              <a:buNone/>
+            </a:pPr>
+            <a:r>
+              <a:rPr lang="en-US" sz="2200" dirty="0">
+                <a:highlight>
+                  <a:srgbClr val="C0C0C0"/>
+                </a:highlight>
+                <a:latin typeface="Courier New" panose="02070309020205020404" pitchFamily="49" charset="0"/>
+                <a:cs typeface="Courier New" panose="02070309020205020404" pitchFamily="49" charset="0"/>
+              </a:rPr>
+              <a:t>3         8 triangular  </a:t>
+            </a:r>
+            <a:r>
+              <a:rPr lang="en-US" sz="2200" dirty="0" err="1">
+                <a:highlight>
+                  <a:srgbClr val="C0C0C0"/>
+                </a:highlight>
+                <a:latin typeface="Courier New" panose="02070309020205020404" pitchFamily="49" charset="0"/>
+                <a:cs typeface="Courier New" panose="02070309020205020404" pitchFamily="49" charset="0"/>
+              </a:rPr>
+              <a:t>roc_auc</a:t>
+            </a:r>
+            <a:r>
+              <a:rPr lang="en-US" sz="2200" dirty="0">
+                <a:highlight>
+                  <a:srgbClr val="C0C0C0"/>
+                </a:highlight>
+                <a:latin typeface="Courier New" panose="02070309020205020404" pitchFamily="49" charset="0"/>
+                <a:cs typeface="Courier New" panose="02070309020205020404" pitchFamily="49" charset="0"/>
+              </a:rPr>
+              <a:t> </a:t>
+            </a:r>
+            <a:r>
+              <a:rPr lang="en-US" sz="2200" dirty="0" err="1">
+                <a:highlight>
+                  <a:srgbClr val="C0C0C0"/>
+                </a:highlight>
+                <a:latin typeface="Courier New" panose="02070309020205020404" pitchFamily="49" charset="0"/>
+                <a:cs typeface="Courier New" panose="02070309020205020404" pitchFamily="49" charset="0"/>
+              </a:rPr>
+              <a:t>hand_till</a:t>
+            </a:r>
+            <a:r>
+              <a:rPr lang="en-US" sz="2200" dirty="0">
+                <a:highlight>
+                  <a:srgbClr val="C0C0C0"/>
+                </a:highlight>
+                <a:latin typeface="Courier New" panose="02070309020205020404" pitchFamily="49" charset="0"/>
+                <a:cs typeface="Courier New" panose="02070309020205020404" pitchFamily="49" charset="0"/>
+              </a:rPr>
+              <a:t>  0.601    10 0.00596</a:t>
+            </a:r>
+          </a:p>
+          <a:p>
+            <a:pPr marL="0" indent="0">
+              <a:spcBef>
+                <a:spcPts val="0"/>
+              </a:spcBef>
+              <a:buNone/>
+            </a:pPr>
+            <a:r>
+              <a:rPr lang="en-US" sz="2200" dirty="0">
+                <a:highlight>
+                  <a:srgbClr val="C0C0C0"/>
+                </a:highlight>
+                <a:latin typeface="Courier New" panose="02070309020205020404" pitchFamily="49" charset="0"/>
+                <a:cs typeface="Courier New" panose="02070309020205020404" pitchFamily="49" charset="0"/>
+              </a:rPr>
+              <a:t>4         7 gaussian    </a:t>
+            </a:r>
+            <a:r>
+              <a:rPr lang="en-US" sz="2200" dirty="0" err="1">
+                <a:highlight>
+                  <a:srgbClr val="C0C0C0"/>
+                </a:highlight>
+                <a:latin typeface="Courier New" panose="02070309020205020404" pitchFamily="49" charset="0"/>
+                <a:cs typeface="Courier New" panose="02070309020205020404" pitchFamily="49" charset="0"/>
+              </a:rPr>
+              <a:t>roc_auc</a:t>
+            </a:r>
+            <a:r>
+              <a:rPr lang="en-US" sz="2200" dirty="0">
+                <a:highlight>
+                  <a:srgbClr val="C0C0C0"/>
+                </a:highlight>
+                <a:latin typeface="Courier New" panose="02070309020205020404" pitchFamily="49" charset="0"/>
+                <a:cs typeface="Courier New" panose="02070309020205020404" pitchFamily="49" charset="0"/>
+              </a:rPr>
+              <a:t> </a:t>
+            </a:r>
+            <a:r>
+              <a:rPr lang="en-US" sz="2200" dirty="0" err="1">
+                <a:highlight>
+                  <a:srgbClr val="C0C0C0"/>
+                </a:highlight>
+                <a:latin typeface="Courier New" panose="02070309020205020404" pitchFamily="49" charset="0"/>
+                <a:cs typeface="Courier New" panose="02070309020205020404" pitchFamily="49" charset="0"/>
+              </a:rPr>
+              <a:t>hand_till</a:t>
+            </a:r>
+            <a:r>
+              <a:rPr lang="en-US" sz="2200" dirty="0">
+                <a:highlight>
+                  <a:srgbClr val="C0C0C0"/>
+                </a:highlight>
+                <a:latin typeface="Courier New" panose="02070309020205020404" pitchFamily="49" charset="0"/>
+                <a:cs typeface="Courier New" panose="02070309020205020404" pitchFamily="49" charset="0"/>
+              </a:rPr>
+              <a:t>  0.601    10 0.00552</a:t>
+            </a:r>
+          </a:p>
+          <a:p>
+            <a:pPr marL="0" indent="0">
+              <a:spcBef>
+                <a:spcPts val="0"/>
+              </a:spcBef>
+              <a:buNone/>
+            </a:pPr>
+            <a:r>
+              <a:rPr lang="en-US" sz="2200" dirty="0">
+                <a:highlight>
+                  <a:srgbClr val="C0C0C0"/>
+                </a:highlight>
+                <a:latin typeface="Courier New" panose="02070309020205020404" pitchFamily="49" charset="0"/>
+                <a:cs typeface="Courier New" panose="02070309020205020404" pitchFamily="49" charset="0"/>
+              </a:rPr>
+              <a:t>5         6 rank        </a:t>
+            </a:r>
+            <a:r>
+              <a:rPr lang="en-US" sz="2200" dirty="0" err="1">
+                <a:highlight>
+                  <a:srgbClr val="C0C0C0"/>
+                </a:highlight>
+                <a:latin typeface="Courier New" panose="02070309020205020404" pitchFamily="49" charset="0"/>
+                <a:cs typeface="Courier New" panose="02070309020205020404" pitchFamily="49" charset="0"/>
+              </a:rPr>
+              <a:t>roc_auc</a:t>
+            </a:r>
+            <a:r>
+              <a:rPr lang="en-US" sz="2200" dirty="0">
+                <a:highlight>
+                  <a:srgbClr val="C0C0C0"/>
+                </a:highlight>
+                <a:latin typeface="Courier New" panose="02070309020205020404" pitchFamily="49" charset="0"/>
+                <a:cs typeface="Courier New" panose="02070309020205020404" pitchFamily="49" charset="0"/>
+              </a:rPr>
+              <a:t> </a:t>
+            </a:r>
+            <a:r>
+              <a:rPr lang="en-US" sz="2200" dirty="0" err="1">
+                <a:highlight>
+                  <a:srgbClr val="C0C0C0"/>
+                </a:highlight>
+                <a:latin typeface="Courier New" panose="02070309020205020404" pitchFamily="49" charset="0"/>
+                <a:cs typeface="Courier New" panose="02070309020205020404" pitchFamily="49" charset="0"/>
+              </a:rPr>
+              <a:t>hand_till</a:t>
+            </a:r>
+            <a:r>
+              <a:rPr lang="en-US" sz="2200" dirty="0">
+                <a:highlight>
+                  <a:srgbClr val="C0C0C0"/>
+                </a:highlight>
+                <a:latin typeface="Courier New" panose="02070309020205020404" pitchFamily="49" charset="0"/>
+                <a:cs typeface="Courier New" panose="02070309020205020404" pitchFamily="49" charset="0"/>
+              </a:rPr>
+              <a:t>  0.600    10 0.00544</a:t>
+            </a:r>
           </a:p>
         </p:txBody>
       </p:sp>
@@ -28761,6 +29880,199 @@
               </a:rPr>
               <a:pPr/>
               <a:t>57</a:t>
+            </a:fld>
+            <a:endParaRPr lang="en-US">
+              <a:solidFill>
+                <a:prstClr val="black">
+                  <a:tint val="75000"/>
+                </a:prstClr>
+              </a:solidFill>
+            </a:endParaRPr>
+          </a:p>
+        </p:txBody>
+      </p:sp>
+    </p:spTree>
+    <p:extLst>
+      <p:ext uri="{BB962C8B-B14F-4D97-AF65-F5344CB8AC3E}">
+        <p14:creationId xmlns:p14="http://schemas.microsoft.com/office/powerpoint/2010/main" val="4210069212"/>
+      </p:ext>
+    </p:extLst>
+  </p:cSld>
+  <p:clrMapOvr>
+    <a:masterClrMapping/>
+  </p:clrMapOvr>
+</p:sld>
+</file>
+
+<file path=ppt/slides/slide58.xml><?xml version="1.0" encoding="utf-8"?>
+<p:sld xmlns:a="http://schemas.openxmlformats.org/drawingml/2006/main" xmlns:r="http://schemas.openxmlformats.org/officeDocument/2006/relationships" xmlns:p="http://schemas.openxmlformats.org/presentationml/2006/main">
+  <p:cSld>
+    <p:spTree>
+      <p:nvGrpSpPr>
+        <p:cNvPr id="1" name=""/>
+        <p:cNvGrpSpPr/>
+        <p:nvPr/>
+      </p:nvGrpSpPr>
+      <p:grpSpPr>
+        <a:xfrm>
+          <a:off x="0" y="0"/>
+          <a:ext cx="0" cy="0"/>
+          <a:chOff x="0" y="0"/>
+          <a:chExt cx="0" cy="0"/>
+        </a:xfrm>
+      </p:grpSpPr>
+      <p:sp>
+        <p:nvSpPr>
+          <p:cNvPr id="3" name="Content Placeholder 2">
+            <a:extLst>
+              <a:ext uri="{FF2B5EF4-FFF2-40B4-BE49-F238E27FC236}">
+                <a16:creationId xmlns:a16="http://schemas.microsoft.com/office/drawing/2014/main" id="{DB7474A6-12B8-4D5A-9967-966A564A53D6}"/>
+              </a:ext>
+            </a:extLst>
+          </p:cNvPr>
+          <p:cNvSpPr>
+            <a:spLocks noGrp="1"/>
+          </p:cNvSpPr>
+          <p:nvPr>
+            <p:ph idx="1"/>
+          </p:nvPr>
+        </p:nvSpPr>
+        <p:spPr>
+          <a:xfrm>
+            <a:off x="214313" y="264319"/>
+            <a:ext cx="11139487" cy="6272212"/>
+          </a:xfrm>
+        </p:spPr>
+        <p:txBody>
+          <a:bodyPr>
+            <a:normAutofit/>
+          </a:bodyPr>
+          <a:lstStyle/>
+          <a:p>
+            <a:pPr marL="0" indent="0">
+              <a:buNone/>
+            </a:pPr>
+            <a:r>
+              <a:rPr lang="en-US" sz="2200" dirty="0" err="1">
+                <a:latin typeface="Courier New" panose="02070309020205020404" pitchFamily="49" charset="0"/>
+                <a:cs typeface="Courier New" panose="02070309020205020404" pitchFamily="49" charset="0"/>
+              </a:rPr>
+              <a:t>knn_clas_res</a:t>
+            </a:r>
+            <a:r>
+              <a:rPr lang="en-US" sz="2200" dirty="0">
+                <a:latin typeface="Courier New" panose="02070309020205020404" pitchFamily="49" charset="0"/>
+                <a:cs typeface="Courier New" panose="02070309020205020404" pitchFamily="49" charset="0"/>
+              </a:rPr>
+              <a:t> %&gt;% </a:t>
+            </a:r>
+          </a:p>
+          <a:p>
+            <a:pPr marL="0" indent="0">
+              <a:buNone/>
+            </a:pPr>
+            <a:r>
+              <a:rPr lang="en-US" sz="2200" dirty="0">
+                <a:latin typeface="Courier New" panose="02070309020205020404" pitchFamily="49" charset="0"/>
+                <a:cs typeface="Courier New" panose="02070309020205020404" pitchFamily="49" charset="0"/>
+              </a:rPr>
+              <a:t>  </a:t>
+            </a:r>
+            <a:r>
+              <a:rPr lang="en-US" sz="2200" dirty="0" err="1">
+                <a:latin typeface="Courier New" panose="02070309020205020404" pitchFamily="49" charset="0"/>
+                <a:cs typeface="Courier New" panose="02070309020205020404" pitchFamily="49" charset="0"/>
+              </a:rPr>
+              <a:t>autoplot</a:t>
+            </a:r>
+            <a:r>
+              <a:rPr lang="en-US" sz="2200" dirty="0">
+                <a:latin typeface="Courier New" panose="02070309020205020404" pitchFamily="49" charset="0"/>
+                <a:cs typeface="Courier New" panose="02070309020205020404" pitchFamily="49" charset="0"/>
+              </a:rPr>
+              <a:t>(metric = "</a:t>
+            </a:r>
+            <a:r>
+              <a:rPr lang="en-US" sz="2200" dirty="0" err="1">
+                <a:latin typeface="Courier New" panose="02070309020205020404" pitchFamily="49" charset="0"/>
+                <a:cs typeface="Courier New" panose="02070309020205020404" pitchFamily="49" charset="0"/>
+              </a:rPr>
+              <a:t>roc_auc</a:t>
+            </a:r>
+            <a:r>
+              <a:rPr lang="en-US" sz="2200" dirty="0">
+                <a:latin typeface="Courier New" panose="02070309020205020404" pitchFamily="49" charset="0"/>
+                <a:cs typeface="Courier New" panose="02070309020205020404" pitchFamily="49" charset="0"/>
+              </a:rPr>
+              <a:t>") +</a:t>
+            </a:r>
+          </a:p>
+          <a:p>
+            <a:pPr marL="0" indent="0">
+              <a:buNone/>
+            </a:pPr>
+            <a:r>
+              <a:rPr lang="en-US" sz="2200" dirty="0">
+                <a:latin typeface="Courier New" panose="02070309020205020404" pitchFamily="49" charset="0"/>
+                <a:cs typeface="Courier New" panose="02070309020205020404" pitchFamily="49" charset="0"/>
+              </a:rPr>
+              <a:t>  </a:t>
+            </a:r>
+            <a:r>
+              <a:rPr lang="en-US" sz="2200" dirty="0" err="1">
+                <a:latin typeface="Courier New" panose="02070309020205020404" pitchFamily="49" charset="0"/>
+                <a:cs typeface="Courier New" panose="02070309020205020404" pitchFamily="49" charset="0"/>
+              </a:rPr>
+              <a:t>geom_line</a:t>
+            </a:r>
+            <a:r>
+              <a:rPr lang="en-US" sz="2200" dirty="0">
+                <a:latin typeface="Courier New" panose="02070309020205020404" pitchFamily="49" charset="0"/>
+                <a:cs typeface="Courier New" panose="02070309020205020404" pitchFamily="49" charset="0"/>
+              </a:rPr>
+              <a:t>()</a:t>
+            </a:r>
+            <a:endParaRPr lang="en-US" sz="2200" dirty="0">
+              <a:highlight>
+                <a:srgbClr val="C0C0C0"/>
+              </a:highlight>
+              <a:latin typeface="Courier New" panose="02070309020205020404" pitchFamily="49" charset="0"/>
+              <a:cs typeface="Courier New" panose="02070309020205020404" pitchFamily="49" charset="0"/>
+            </a:endParaRPr>
+          </a:p>
+        </p:txBody>
+      </p:sp>
+      <p:sp>
+        <p:nvSpPr>
+          <p:cNvPr id="4" name="Slide Number Placeholder 3">
+            <a:extLst>
+              <a:ext uri="{FF2B5EF4-FFF2-40B4-BE49-F238E27FC236}">
+                <a16:creationId xmlns:a16="http://schemas.microsoft.com/office/drawing/2014/main" id="{37125842-965B-46C4-989A-7782CC7BB415}"/>
+              </a:ext>
+            </a:extLst>
+          </p:cNvPr>
+          <p:cNvSpPr>
+            <a:spLocks noGrp="1"/>
+          </p:cNvSpPr>
+          <p:nvPr>
+            <p:ph type="sldNum" sz="quarter" idx="12"/>
+          </p:nvPr>
+        </p:nvSpPr>
+        <p:spPr/>
+        <p:txBody>
+          <a:bodyPr/>
+          <a:lstStyle/>
+          <a:p>
+            <a:fld id="{1FD78A80-B303-491C-AEE7-8281801B0C65}" type="slidenum">
+              <a:rPr lang="en-US" smtClean="0">
+                <a:solidFill>
+                  <a:prstClr val="black">
+                    <a:tint val="75000"/>
+                  </a:prstClr>
+                </a:solidFill>
+              </a:rPr>
+              <a:pPr/>
+              <a:t>58</a:t>
             </a:fld>
             <a:endParaRPr lang="en-US">
               <a:solidFill>
@@ -28815,7 +30127,7 @@
 </p:sld>
 </file>
 
-<file path=ppt/slides/slide58.xml><?xml version="1.0" encoding="utf-8"?>
+<file path=ppt/slides/slide59.xml><?xml version="1.0" encoding="utf-8"?>
 <p:sld xmlns:a="http://schemas.openxmlformats.org/drawingml/2006/main" xmlns:r="http://schemas.openxmlformats.org/officeDocument/2006/relationships" xmlns:p="http://schemas.openxmlformats.org/presentationml/2006/main">
   <p:cSld>
     <p:bg>
@@ -28947,7 +30259,7 @@
                 <a:tabLst/>
                 <a:defRPr/>
               </a:pPr>
-              <a:t>58</a:t>
+              <a:t>59</a:t>
             </a:fld>
             <a:endParaRPr kumimoji="0" lang="en-US" sz="1200" b="0" i="0" u="none" strike="noStrike" kern="1200" cap="none" spc="0" normalizeH="0" baseline="0" noProof="0">
               <a:ln>
@@ -29009,177 +30321,6 @@
     <p:extLst>
       <p:ext uri="{BB962C8B-B14F-4D97-AF65-F5344CB8AC3E}">
         <p14:creationId xmlns:p14="http://schemas.microsoft.com/office/powerpoint/2010/main" val="3931660025"/>
-      </p:ext>
-    </p:extLst>
-  </p:cSld>
-  <p:clrMapOvr>
-    <a:masterClrMapping/>
-  </p:clrMapOvr>
-</p:sld>
-</file>
-
-<file path=ppt/slides/slide59.xml><?xml version="1.0" encoding="utf-8"?>
-<p:sld xmlns:a="http://schemas.openxmlformats.org/drawingml/2006/main" xmlns:r="http://schemas.openxmlformats.org/officeDocument/2006/relationships" xmlns:p="http://schemas.openxmlformats.org/presentationml/2006/main">
-  <p:cSld>
-    <p:spTree>
-      <p:nvGrpSpPr>
-        <p:cNvPr id="1" name=""/>
-        <p:cNvGrpSpPr/>
-        <p:nvPr/>
-      </p:nvGrpSpPr>
-      <p:grpSpPr>
-        <a:xfrm>
-          <a:off x="0" y="0"/>
-          <a:ext cx="0" cy="0"/>
-          <a:chOff x="0" y="0"/>
-          <a:chExt cx="0" cy="0"/>
-        </a:xfrm>
-      </p:grpSpPr>
-      <p:sp>
-        <p:nvSpPr>
-          <p:cNvPr id="2" name="Title 1">
-            <a:extLst>
-              <a:ext uri="{FF2B5EF4-FFF2-40B4-BE49-F238E27FC236}">
-                <a16:creationId xmlns:a16="http://schemas.microsoft.com/office/drawing/2014/main" id="{848EA197-4171-40D0-AEB4-16FBA43F345F}"/>
-              </a:ext>
-            </a:extLst>
-          </p:cNvPr>
-          <p:cNvSpPr>
-            <a:spLocks noGrp="1"/>
-          </p:cNvSpPr>
-          <p:nvPr>
-            <p:ph type="title"/>
-          </p:nvPr>
-        </p:nvSpPr>
-        <p:spPr/>
-        <p:txBody>
-          <a:bodyPr/>
-          <a:lstStyle/>
-          <a:p>
-            <a:r>
-              <a:rPr lang="en-US" dirty="0"/>
-              <a:t>Imputation</a:t>
-            </a:r>
-          </a:p>
-        </p:txBody>
-      </p:sp>
-      <p:sp>
-        <p:nvSpPr>
-          <p:cNvPr id="3" name="Content Placeholder 2">
-            <a:extLst>
-              <a:ext uri="{FF2B5EF4-FFF2-40B4-BE49-F238E27FC236}">
-                <a16:creationId xmlns:a16="http://schemas.microsoft.com/office/drawing/2014/main" id="{8AD46DE1-AE42-4177-BB8D-405E516E3AD8}"/>
-              </a:ext>
-            </a:extLst>
-          </p:cNvPr>
-          <p:cNvSpPr>
-            <a:spLocks noGrp="1"/>
-          </p:cNvSpPr>
-          <p:nvPr>
-            <p:ph idx="1"/>
-          </p:nvPr>
-        </p:nvSpPr>
-        <p:spPr/>
-        <p:txBody>
-          <a:bodyPr>
-            <a:normAutofit/>
-          </a:bodyPr>
-          <a:lstStyle/>
-          <a:p>
-            <a:r>
-              <a:rPr lang="en-US" dirty="0"/>
-              <a:t>Use information and relations among non-missing predictors to provide an estimate to fill in missing values</a:t>
-            </a:r>
-          </a:p>
-          <a:p>
-            <a:r>
-              <a:rPr lang="en-US" dirty="0"/>
-              <a:t>KNN is also used in feature engineering to impute missing values</a:t>
-            </a:r>
-          </a:p>
-          <a:p>
-            <a:pPr lvl="1"/>
-            <a:r>
-              <a:rPr lang="en-US" dirty="0"/>
-              <a:t>Primarily when the data is small-moderate in size</a:t>
-            </a:r>
-          </a:p>
-          <a:p>
-            <a:r>
-              <a:rPr lang="en-US" dirty="0"/>
-              <a:t>Identifies the </a:t>
-            </a:r>
-            <a:r>
-              <a:rPr lang="en-US" i="1" dirty="0"/>
-              <a:t>K</a:t>
-            </a:r>
-            <a:r>
-              <a:rPr lang="en-US" dirty="0"/>
-              <a:t> (complete data) samples in the training data most similar to the missing value(s) </a:t>
-            </a:r>
-          </a:p>
-          <a:p>
-            <a:r>
-              <a:rPr lang="en-US" dirty="0"/>
-              <a:t>The average value of the predictor of interest is calculated of the </a:t>
-            </a:r>
-            <a:r>
-              <a:rPr lang="en-US" i="1" dirty="0"/>
-              <a:t>K</a:t>
-            </a:r>
-            <a:r>
-              <a:rPr lang="en-US" dirty="0"/>
-              <a:t> closest samples and used to replace the missing value</a:t>
-            </a:r>
-          </a:p>
-        </p:txBody>
-      </p:sp>
-      <p:sp>
-        <p:nvSpPr>
-          <p:cNvPr id="4" name="Slide Number Placeholder 3">
-            <a:extLst>
-              <a:ext uri="{FF2B5EF4-FFF2-40B4-BE49-F238E27FC236}">
-                <a16:creationId xmlns:a16="http://schemas.microsoft.com/office/drawing/2014/main" id="{A205CE42-D5C3-4B6B-91F0-782475BDFD71}"/>
-              </a:ext>
-            </a:extLst>
-          </p:cNvPr>
-          <p:cNvSpPr>
-            <a:spLocks noGrp="1"/>
-          </p:cNvSpPr>
-          <p:nvPr>
-            <p:ph type="sldNum" sz="quarter" idx="12"/>
-          </p:nvPr>
-        </p:nvSpPr>
-        <p:spPr/>
-        <p:txBody>
-          <a:bodyPr/>
-          <a:lstStyle/>
-          <a:p>
-            <a:fld id="{1FD78A80-B303-491C-AEE7-8281801B0C65}" type="slidenum">
-              <a:rPr lang="en-US" smtClean="0">
-                <a:solidFill>
-                  <a:prstClr val="black">
-                    <a:tint val="75000"/>
-                  </a:prstClr>
-                </a:solidFill>
-              </a:rPr>
-              <a:pPr/>
-              <a:t>59</a:t>
-            </a:fld>
-            <a:endParaRPr lang="en-US">
-              <a:solidFill>
-                <a:prstClr val="black">
-                  <a:tint val="75000"/>
-                </a:prstClr>
-              </a:solidFill>
-            </a:endParaRPr>
-          </a:p>
-        </p:txBody>
-      </p:sp>
-    </p:spTree>
-    <p:extLst>
-      <p:ext uri="{BB962C8B-B14F-4D97-AF65-F5344CB8AC3E}">
-        <p14:creationId xmlns:p14="http://schemas.microsoft.com/office/powerpoint/2010/main" val="3523448359"/>
       </p:ext>
     </p:extLst>
   </p:cSld>
@@ -29490,8 +30631,179 @@
           </a:p>
         </p:txBody>
       </p:sp>
-      <mc:AlternateContent xmlns:mc="http://schemas.openxmlformats.org/markup-compatibility/2006">
-        <mc:Choice xmlns:a14="http://schemas.microsoft.com/office/drawing/2010/main" Requires="a14">
+      <p:sp>
+        <p:nvSpPr>
+          <p:cNvPr id="3" name="Content Placeholder 2">
+            <a:extLst>
+              <a:ext uri="{FF2B5EF4-FFF2-40B4-BE49-F238E27FC236}">
+                <a16:creationId xmlns:a16="http://schemas.microsoft.com/office/drawing/2014/main" id="{8AD46DE1-AE42-4177-BB8D-405E516E3AD8}"/>
+              </a:ext>
+            </a:extLst>
+          </p:cNvPr>
+          <p:cNvSpPr>
+            <a:spLocks noGrp="1"/>
+          </p:cNvSpPr>
+          <p:nvPr>
+            <p:ph idx="1"/>
+          </p:nvPr>
+        </p:nvSpPr>
+        <p:spPr/>
+        <p:txBody>
+          <a:bodyPr>
+            <a:normAutofit/>
+          </a:bodyPr>
+          <a:lstStyle/>
+          <a:p>
+            <a:r>
+              <a:rPr lang="en-US" dirty="0"/>
+              <a:t>Use information and relations among non-missing predictors to provide an estimate to fill in missing values</a:t>
+            </a:r>
+          </a:p>
+          <a:p>
+            <a:r>
+              <a:rPr lang="en-US" dirty="0"/>
+              <a:t>KNN is also used in feature engineering to impute missing values</a:t>
+            </a:r>
+          </a:p>
+          <a:p>
+            <a:pPr lvl="1"/>
+            <a:r>
+              <a:rPr lang="en-US" dirty="0"/>
+              <a:t>Primarily when the data is small-moderate in size</a:t>
+            </a:r>
+          </a:p>
+          <a:p>
+            <a:r>
+              <a:rPr lang="en-US" dirty="0"/>
+              <a:t>Identifies the </a:t>
+            </a:r>
+            <a:r>
+              <a:rPr lang="en-US" i="1" dirty="0"/>
+              <a:t>K</a:t>
+            </a:r>
+            <a:r>
+              <a:rPr lang="en-US" dirty="0"/>
+              <a:t> (complete data) samples in the training data most similar to the missing value(s) </a:t>
+            </a:r>
+          </a:p>
+          <a:p>
+            <a:r>
+              <a:rPr lang="en-US" dirty="0"/>
+              <a:t>The average value of the predictor of interest is calculated of the </a:t>
+            </a:r>
+            <a:r>
+              <a:rPr lang="en-US" i="1" dirty="0"/>
+              <a:t>K</a:t>
+            </a:r>
+            <a:r>
+              <a:rPr lang="en-US" dirty="0"/>
+              <a:t> closest samples and used to replace the missing value</a:t>
+            </a:r>
+          </a:p>
+        </p:txBody>
+      </p:sp>
+      <p:sp>
+        <p:nvSpPr>
+          <p:cNvPr id="4" name="Slide Number Placeholder 3">
+            <a:extLst>
+              <a:ext uri="{FF2B5EF4-FFF2-40B4-BE49-F238E27FC236}">
+                <a16:creationId xmlns:a16="http://schemas.microsoft.com/office/drawing/2014/main" id="{A205CE42-D5C3-4B6B-91F0-782475BDFD71}"/>
+              </a:ext>
+            </a:extLst>
+          </p:cNvPr>
+          <p:cNvSpPr>
+            <a:spLocks noGrp="1"/>
+          </p:cNvSpPr>
+          <p:nvPr>
+            <p:ph type="sldNum" sz="quarter" idx="12"/>
+          </p:nvPr>
+        </p:nvSpPr>
+        <p:spPr/>
+        <p:txBody>
+          <a:bodyPr/>
+          <a:lstStyle/>
+          <a:p>
+            <a:fld id="{1FD78A80-B303-491C-AEE7-8281801B0C65}" type="slidenum">
+              <a:rPr lang="en-US" smtClean="0">
+                <a:solidFill>
+                  <a:prstClr val="black">
+                    <a:tint val="75000"/>
+                  </a:prstClr>
+                </a:solidFill>
+              </a:rPr>
+              <a:pPr/>
+              <a:t>60</a:t>
+            </a:fld>
+            <a:endParaRPr lang="en-US">
+              <a:solidFill>
+                <a:prstClr val="black">
+                  <a:tint val="75000"/>
+                </a:prstClr>
+              </a:solidFill>
+            </a:endParaRPr>
+          </a:p>
+        </p:txBody>
+      </p:sp>
+    </p:spTree>
+    <p:extLst>
+      <p:ext uri="{BB962C8B-B14F-4D97-AF65-F5344CB8AC3E}">
+        <p14:creationId xmlns:p14="http://schemas.microsoft.com/office/powerpoint/2010/main" val="3523448359"/>
+      </p:ext>
+    </p:extLst>
+  </p:cSld>
+  <p:clrMapOvr>
+    <a:masterClrMapping/>
+  </p:clrMapOvr>
+</p:sld>
+</file>
+
+<file path=ppt/slides/slide61.xml><?xml version="1.0" encoding="utf-8"?>
+<p:sld xmlns:a="http://schemas.openxmlformats.org/drawingml/2006/main" xmlns:r="http://schemas.openxmlformats.org/officeDocument/2006/relationships" xmlns:p="http://schemas.openxmlformats.org/presentationml/2006/main">
+  <p:cSld>
+    <p:spTree>
+      <p:nvGrpSpPr>
+        <p:cNvPr id="1" name=""/>
+        <p:cNvGrpSpPr/>
+        <p:nvPr/>
+      </p:nvGrpSpPr>
+      <p:grpSpPr>
+        <a:xfrm>
+          <a:off x="0" y="0"/>
+          <a:ext cx="0" cy="0"/>
+          <a:chOff x="0" y="0"/>
+          <a:chExt cx="0" cy="0"/>
+        </a:xfrm>
+      </p:grpSpPr>
+      <p:sp>
+        <p:nvSpPr>
+          <p:cNvPr id="2" name="Title 1">
+            <a:extLst>
+              <a:ext uri="{FF2B5EF4-FFF2-40B4-BE49-F238E27FC236}">
+                <a16:creationId xmlns:a16="http://schemas.microsoft.com/office/drawing/2014/main" id="{848EA197-4171-40D0-AEB4-16FBA43F345F}"/>
+              </a:ext>
+            </a:extLst>
+          </p:cNvPr>
+          <p:cNvSpPr>
+            <a:spLocks noGrp="1"/>
+          </p:cNvSpPr>
+          <p:nvPr>
+            <p:ph type="title"/>
+          </p:nvPr>
+        </p:nvSpPr>
+        <p:spPr/>
+        <p:txBody>
+          <a:bodyPr/>
+          <a:lstStyle/>
+          <a:p>
+            <a:r>
+              <a:rPr lang="en-US" dirty="0"/>
+              <a:t>Imputation</a:t>
+            </a:r>
+          </a:p>
+        </p:txBody>
+      </p:sp>
+      <mc:AlternateContent xmlns:mc="http://schemas.openxmlformats.org/markup-compatibility/2006" xmlns:a14="http://schemas.microsoft.com/office/drawing/2010/main">
+        <mc:Choice Requires="a14">
           <p:sp>
             <p:nvSpPr>
               <p:cNvPr id="3" name="Content Placeholder 2">
@@ -29821,7 +31133,7 @@
             </p:txBody>
           </p:sp>
         </mc:Choice>
-        <mc:Fallback>
+        <mc:Fallback xmlns="">
           <p:sp>
             <p:nvSpPr>
               <p:cNvPr id="3" name="Content Placeholder 2">
@@ -29891,7 +31203,7 @@
                 </a:solidFill>
               </a:rPr>
               <a:pPr/>
-              <a:t>60</a:t>
+              <a:t>61</a:t>
             </a:fld>
             <a:endParaRPr lang="en-US">
               <a:solidFill>

</xml_diff>

<commit_message>
update w4 & w6 slides with grid info
</commit_message>
<xml_diff>
--- a/slides/w6p1-knn/w6p1.pptx
+++ b/slides/w6p1-knn/w6p1.pptx
@@ -47,28 +47,32 @@
     <p:sldId id="420" r:id="rId41"/>
     <p:sldId id="435" r:id="rId42"/>
     <p:sldId id="424" r:id="rId43"/>
-    <p:sldId id="389" r:id="rId44"/>
-    <p:sldId id="397" r:id="rId45"/>
-    <p:sldId id="432" r:id="rId46"/>
-    <p:sldId id="398" r:id="rId47"/>
-    <p:sldId id="404" r:id="rId48"/>
-    <p:sldId id="405" r:id="rId49"/>
-    <p:sldId id="406" r:id="rId50"/>
-    <p:sldId id="407" r:id="rId51"/>
-    <p:sldId id="408" r:id="rId52"/>
-    <p:sldId id="409" r:id="rId53"/>
-    <p:sldId id="410" r:id="rId54"/>
-    <p:sldId id="425" r:id="rId55"/>
-    <p:sldId id="387" r:id="rId56"/>
-    <p:sldId id="426" r:id="rId57"/>
-    <p:sldId id="427" r:id="rId58"/>
-    <p:sldId id="428" r:id="rId59"/>
-    <p:sldId id="429" r:id="rId60"/>
-    <p:sldId id="434" r:id="rId61"/>
-    <p:sldId id="436" r:id="rId62"/>
-    <p:sldId id="430" r:id="rId63"/>
-    <p:sldId id="370" r:id="rId64"/>
-    <p:sldId id="371" r:id="rId65"/>
+    <p:sldId id="437" r:id="rId44"/>
+    <p:sldId id="449" r:id="rId45"/>
+    <p:sldId id="389" r:id="rId46"/>
+    <p:sldId id="397" r:id="rId47"/>
+    <p:sldId id="432" r:id="rId48"/>
+    <p:sldId id="398" r:id="rId49"/>
+    <p:sldId id="404" r:id="rId50"/>
+    <p:sldId id="405" r:id="rId51"/>
+    <p:sldId id="406" r:id="rId52"/>
+    <p:sldId id="407" r:id="rId53"/>
+    <p:sldId id="408" r:id="rId54"/>
+    <p:sldId id="409" r:id="rId55"/>
+    <p:sldId id="410" r:id="rId56"/>
+    <p:sldId id="451" r:id="rId57"/>
+    <p:sldId id="450" r:id="rId58"/>
+    <p:sldId id="425" r:id="rId59"/>
+    <p:sldId id="387" r:id="rId60"/>
+    <p:sldId id="426" r:id="rId61"/>
+    <p:sldId id="427" r:id="rId62"/>
+    <p:sldId id="428" r:id="rId63"/>
+    <p:sldId id="429" r:id="rId64"/>
+    <p:sldId id="434" r:id="rId65"/>
+    <p:sldId id="436" r:id="rId66"/>
+    <p:sldId id="430" r:id="rId67"/>
+    <p:sldId id="370" r:id="rId68"/>
+    <p:sldId id="371" r:id="rId69"/>
   </p:sldIdLst>
   <p:sldSz cx="12192000" cy="6858000"/>
   <p:notesSz cx="6858000" cy="9144000"/>
@@ -323,7 +327,7 @@
                 </a:solidFill>
               </a:rPr>
               <a:pPr/>
-              <a:t>3/25/2020</a:t>
+              <a:t>3/27/2020</a:t>
             </a:fld>
             <a:endParaRPr lang="en-US">
               <a:solidFill>
@@ -523,7 +527,7 @@
                 </a:solidFill>
               </a:rPr>
               <a:pPr/>
-              <a:t>3/25/2020</a:t>
+              <a:t>3/27/2020</a:t>
             </a:fld>
             <a:endParaRPr lang="en-US">
               <a:solidFill>
@@ -733,7 +737,7 @@
                 </a:solidFill>
               </a:rPr>
               <a:pPr/>
-              <a:t>3/25/2020</a:t>
+              <a:t>3/27/2020</a:t>
             </a:fld>
             <a:endParaRPr lang="en-US">
               <a:solidFill>
@@ -933,7 +937,7 @@
                 </a:solidFill>
               </a:rPr>
               <a:pPr/>
-              <a:t>3/25/2020</a:t>
+              <a:t>3/27/2020</a:t>
             </a:fld>
             <a:endParaRPr lang="en-US">
               <a:solidFill>
@@ -1210,7 +1214,7 @@
                 </a:solidFill>
               </a:rPr>
               <a:pPr/>
-              <a:t>3/25/2020</a:t>
+              <a:t>3/27/2020</a:t>
             </a:fld>
             <a:endParaRPr lang="en-US">
               <a:solidFill>
@@ -1471,7 +1475,7 @@
                 </a:solidFill>
               </a:rPr>
               <a:pPr/>
-              <a:t>3/25/2020</a:t>
+              <a:t>3/27/2020</a:t>
             </a:fld>
             <a:endParaRPr lang="en-US">
               <a:solidFill>
@@ -1867,7 +1871,7 @@
                 </a:solidFill>
               </a:rPr>
               <a:pPr/>
-              <a:t>3/25/2020</a:t>
+              <a:t>3/27/2020</a:t>
             </a:fld>
             <a:endParaRPr lang="en-US">
               <a:solidFill>
@@ -2016,7 +2020,7 @@
                 </a:solidFill>
               </a:rPr>
               <a:pPr/>
-              <a:t>3/25/2020</a:t>
+              <a:t>3/27/2020</a:t>
             </a:fld>
             <a:endParaRPr lang="en-US">
               <a:solidFill>
@@ -2143,7 +2147,7 @@
                 </a:solidFill>
               </a:rPr>
               <a:pPr/>
-              <a:t>3/25/2020</a:t>
+              <a:t>3/27/2020</a:t>
             </a:fld>
             <a:endParaRPr lang="en-US">
               <a:solidFill>
@@ -2450,7 +2454,7 @@
                 </a:solidFill>
               </a:rPr>
               <a:pPr/>
-              <a:t>3/25/2020</a:t>
+              <a:t>3/27/2020</a:t>
             </a:fld>
             <a:endParaRPr lang="en-US">
               <a:solidFill>
@@ -2734,7 +2738,7 @@
                 </a:solidFill>
               </a:rPr>
               <a:pPr/>
-              <a:t>3/25/2020</a:t>
+              <a:t>3/27/2020</a:t>
             </a:fld>
             <a:endParaRPr lang="en-US">
               <a:solidFill>
@@ -2977,7 +2981,7 @@
                 </a:solidFill>
               </a:rPr>
               <a:pPr/>
-              <a:t>3/25/2020</a:t>
+              <a:t>3/27/2020</a:t>
             </a:fld>
             <a:endParaRPr lang="en-US">
               <a:solidFill>
@@ -20641,6 +20645,350 @@
           <p:cNvPr id="2" name="Title 1">
             <a:extLst>
               <a:ext uri="{FF2B5EF4-FFF2-40B4-BE49-F238E27FC236}">
+                <a16:creationId xmlns:a16="http://schemas.microsoft.com/office/drawing/2014/main" id="{2A828122-EEC9-4C82-B168-174EAD2172DB}"/>
+              </a:ext>
+            </a:extLst>
+          </p:cNvPr>
+          <p:cNvSpPr>
+            <a:spLocks noGrp="1"/>
+          </p:cNvSpPr>
+          <p:nvPr>
+            <p:ph type="title"/>
+          </p:nvPr>
+        </p:nvSpPr>
+        <p:spPr/>
+        <p:txBody>
+          <a:bodyPr/>
+          <a:lstStyle/>
+          <a:p>
+            <a:r>
+              <a:rPr lang="en-US" dirty="0"/>
+              <a:t>Regular vs. Non-regular grids</a:t>
+            </a:r>
+          </a:p>
+        </p:txBody>
+      </p:sp>
+      <p:sp>
+        <p:nvSpPr>
+          <p:cNvPr id="3" name="Content Placeholder 2">
+            <a:extLst>
+              <a:ext uri="{FF2B5EF4-FFF2-40B4-BE49-F238E27FC236}">
+                <a16:creationId xmlns:a16="http://schemas.microsoft.com/office/drawing/2014/main" id="{4DC66E99-2311-402C-8418-026799338B19}"/>
+              </a:ext>
+            </a:extLst>
+          </p:cNvPr>
+          <p:cNvSpPr>
+            <a:spLocks noGrp="1"/>
+          </p:cNvSpPr>
+          <p:nvPr>
+            <p:ph idx="1"/>
+          </p:nvPr>
+        </p:nvSpPr>
+        <p:spPr>
+          <a:xfrm>
+            <a:off x="838200" y="1825625"/>
+            <a:ext cx="10515600" cy="4895850"/>
+          </a:xfrm>
+        </p:spPr>
+        <p:txBody>
+          <a:bodyPr>
+            <a:normAutofit fontScale="92500" lnSpcReduction="10000"/>
+          </a:bodyPr>
+          <a:lstStyle/>
+          <a:p>
+            <a:r>
+              <a:rPr lang="en-US" dirty="0"/>
+              <a:t>Regular grid</a:t>
+            </a:r>
+          </a:p>
+          <a:p>
+            <a:pPr lvl="1"/>
+            <a:r>
+              <a:rPr lang="en-US" dirty="0"/>
+              <a:t>a known, pre-defined set of tuning parameter values</a:t>
+            </a:r>
+          </a:p>
+          <a:p>
+            <a:pPr lvl="1"/>
+            <a:r>
+              <a:rPr lang="en-US" dirty="0"/>
+              <a:t>the number of values don't have to be the same per parameter</a:t>
+            </a:r>
+          </a:p>
+          <a:p>
+            <a:pPr lvl="1"/>
+            <a:r>
+              <a:rPr lang="en-US" dirty="0"/>
+              <a:t>Quantitative and qualitative parameters can be combined</a:t>
+            </a:r>
+          </a:p>
+          <a:p>
+            <a:pPr lvl="1"/>
+            <a:r>
+              <a:rPr lang="en-US" dirty="0"/>
+              <a:t>As the number of parameters increases, so does the burden of dimensionality</a:t>
+            </a:r>
+          </a:p>
+          <a:p>
+            <a:pPr lvl="1"/>
+            <a:r>
+              <a:rPr lang="en-US" dirty="0"/>
+              <a:t>Thought to be inefficient but not in all cases</a:t>
+            </a:r>
+          </a:p>
+          <a:p>
+            <a:r>
+              <a:rPr lang="en-US" dirty="0"/>
+              <a:t>Non-regular grids (or random grids)</a:t>
+            </a:r>
+          </a:p>
+          <a:p>
+            <a:pPr lvl="1"/>
+            <a:r>
+              <a:rPr lang="en-US" dirty="0"/>
+              <a:t>define a range of possible values for each parameter and randomly sample the multidimensional space enough times to cover a reasonable amount</a:t>
+            </a:r>
+          </a:p>
+          <a:p>
+            <a:pPr lvl="1"/>
+            <a:r>
+              <a:rPr lang="en-US" dirty="0"/>
+              <a:t>beneficial when there are a large number of tuning parameters and there is no </a:t>
+            </a:r>
+            <a:r>
+              <a:rPr lang="en-US" i="1" dirty="0"/>
+              <a:t>a priori</a:t>
+            </a:r>
+            <a:r>
+              <a:rPr lang="en-US" dirty="0"/>
+              <a:t> notion of which values should be used</a:t>
+            </a:r>
+          </a:p>
+          <a:p>
+            <a:pPr lvl="1"/>
+            <a:r>
+              <a:rPr lang="en-US" dirty="0"/>
+              <a:t>A large grid may be inefficient to search, especially if the profile has a fairly stable pattern with little change over some range of the parameter</a:t>
+            </a:r>
+          </a:p>
+          <a:p>
+            <a:pPr lvl="1"/>
+            <a:r>
+              <a:rPr lang="en-US" dirty="0"/>
+              <a:t>Good for neural networks and gradient boosting machines</a:t>
+            </a:r>
+          </a:p>
+        </p:txBody>
+      </p:sp>
+      <p:sp>
+        <p:nvSpPr>
+          <p:cNvPr id="4" name="Slide Number Placeholder 3">
+            <a:extLst>
+              <a:ext uri="{FF2B5EF4-FFF2-40B4-BE49-F238E27FC236}">
+                <a16:creationId xmlns:a16="http://schemas.microsoft.com/office/drawing/2014/main" id="{9466F23F-EAF5-4F26-B6CE-D5C0E31E6263}"/>
+              </a:ext>
+            </a:extLst>
+          </p:cNvPr>
+          <p:cNvSpPr>
+            <a:spLocks noGrp="1"/>
+          </p:cNvSpPr>
+          <p:nvPr>
+            <p:ph type="sldNum" sz="quarter" idx="12"/>
+          </p:nvPr>
+        </p:nvSpPr>
+        <p:spPr/>
+        <p:txBody>
+          <a:bodyPr/>
+          <a:lstStyle/>
+          <a:p>
+            <a:fld id="{1FD78A80-B303-491C-AEE7-8281801B0C65}" type="slidenum">
+              <a:rPr lang="en-US" smtClean="0">
+                <a:solidFill>
+                  <a:prstClr val="black">
+                    <a:tint val="75000"/>
+                  </a:prstClr>
+                </a:solidFill>
+              </a:rPr>
+              <a:pPr/>
+              <a:t>43</a:t>
+            </a:fld>
+            <a:endParaRPr lang="en-US">
+              <a:solidFill>
+                <a:prstClr val="black">
+                  <a:tint val="75000"/>
+                </a:prstClr>
+              </a:solidFill>
+            </a:endParaRPr>
+          </a:p>
+        </p:txBody>
+      </p:sp>
+    </p:spTree>
+    <p:extLst>
+      <p:ext uri="{BB962C8B-B14F-4D97-AF65-F5344CB8AC3E}">
+        <p14:creationId xmlns:p14="http://schemas.microsoft.com/office/powerpoint/2010/main" val="2075152980"/>
+      </p:ext>
+    </p:extLst>
+  </p:cSld>
+  <p:clrMapOvr>
+    <a:masterClrMapping/>
+  </p:clrMapOvr>
+</p:sld>
+</file>
+
+<file path=ppt/slides/slide44.xml><?xml version="1.0" encoding="utf-8"?>
+<p:sld xmlns:a="http://schemas.openxmlformats.org/drawingml/2006/main" xmlns:r="http://schemas.openxmlformats.org/officeDocument/2006/relationships" xmlns:p="http://schemas.openxmlformats.org/presentationml/2006/main">
+  <p:cSld>
+    <p:spTree>
+      <p:nvGrpSpPr>
+        <p:cNvPr id="1" name=""/>
+        <p:cNvGrpSpPr/>
+        <p:nvPr/>
+      </p:nvGrpSpPr>
+      <p:grpSpPr>
+        <a:xfrm>
+          <a:off x="0" y="0"/>
+          <a:ext cx="0" cy="0"/>
+          <a:chOff x="0" y="0"/>
+          <a:chExt cx="0" cy="0"/>
+        </a:xfrm>
+      </p:grpSpPr>
+      <p:sp>
+        <p:nvSpPr>
+          <p:cNvPr id="4" name="Slide Number Placeholder 3">
+            <a:extLst>
+              <a:ext uri="{FF2B5EF4-FFF2-40B4-BE49-F238E27FC236}">
+                <a16:creationId xmlns:a16="http://schemas.microsoft.com/office/drawing/2014/main" id="{FBD00455-A202-46FA-869D-ACAAD54AD532}"/>
+              </a:ext>
+            </a:extLst>
+          </p:cNvPr>
+          <p:cNvSpPr>
+            <a:spLocks noGrp="1"/>
+          </p:cNvSpPr>
+          <p:nvPr>
+            <p:ph type="sldNum" sz="quarter" idx="12"/>
+          </p:nvPr>
+        </p:nvSpPr>
+        <p:spPr/>
+        <p:txBody>
+          <a:bodyPr/>
+          <a:lstStyle/>
+          <a:p>
+            <a:fld id="{1FD78A80-B303-491C-AEE7-8281801B0C65}" type="slidenum">
+              <a:rPr lang="en-US" smtClean="0">
+                <a:solidFill>
+                  <a:prstClr val="black">
+                    <a:tint val="75000"/>
+                  </a:prstClr>
+                </a:solidFill>
+              </a:rPr>
+              <a:pPr/>
+              <a:t>44</a:t>
+            </a:fld>
+            <a:endParaRPr lang="en-US">
+              <a:solidFill>
+                <a:prstClr val="black">
+                  <a:tint val="75000"/>
+                </a:prstClr>
+              </a:solidFill>
+            </a:endParaRPr>
+          </a:p>
+        </p:txBody>
+      </p:sp>
+      <p:pic>
+        <p:nvPicPr>
+          <p:cNvPr id="5" name="Picture 4">
+            <a:extLst>
+              <a:ext uri="{FF2B5EF4-FFF2-40B4-BE49-F238E27FC236}">
+                <a16:creationId xmlns:a16="http://schemas.microsoft.com/office/drawing/2014/main" id="{626D3D60-2C12-430A-8B52-9CBB24C65A43}"/>
+              </a:ext>
+            </a:extLst>
+          </p:cNvPr>
+          <p:cNvPicPr>
+            <a:picLocks noChangeAspect="1"/>
+          </p:cNvPicPr>
+          <p:nvPr/>
+        </p:nvPicPr>
+        <p:blipFill>
+          <a:blip r:embed="rId2"/>
+          <a:stretch>
+            <a:fillRect/>
+          </a:stretch>
+        </p:blipFill>
+        <p:spPr>
+          <a:xfrm>
+            <a:off x="745536" y="757003"/>
+            <a:ext cx="5440405" cy="5032375"/>
+          </a:xfrm>
+          <a:prstGeom prst="rect">
+            <a:avLst/>
+          </a:prstGeom>
+        </p:spPr>
+      </p:pic>
+      <p:pic>
+        <p:nvPicPr>
+          <p:cNvPr id="6" name="Picture 5">
+            <a:extLst>
+              <a:ext uri="{FF2B5EF4-FFF2-40B4-BE49-F238E27FC236}">
+                <a16:creationId xmlns:a16="http://schemas.microsoft.com/office/drawing/2014/main" id="{28548607-6F3D-49A5-AC29-392C3DC1BC7E}"/>
+              </a:ext>
+            </a:extLst>
+          </p:cNvPr>
+          <p:cNvPicPr>
+            <a:picLocks noChangeAspect="1"/>
+          </p:cNvPicPr>
+          <p:nvPr/>
+        </p:nvPicPr>
+        <p:blipFill>
+          <a:blip r:embed="rId3"/>
+          <a:stretch>
+            <a:fillRect/>
+          </a:stretch>
+        </p:blipFill>
+        <p:spPr>
+          <a:xfrm>
+            <a:off x="6323892" y="757003"/>
+            <a:ext cx="5436973" cy="5029200"/>
+          </a:xfrm>
+          <a:prstGeom prst="rect">
+            <a:avLst/>
+          </a:prstGeom>
+        </p:spPr>
+      </p:pic>
+    </p:spTree>
+    <p:extLst>
+      <p:ext uri="{BB962C8B-B14F-4D97-AF65-F5344CB8AC3E}">
+        <p14:creationId xmlns:p14="http://schemas.microsoft.com/office/powerpoint/2010/main" val="3783399767"/>
+      </p:ext>
+    </p:extLst>
+  </p:cSld>
+  <p:clrMapOvr>
+    <a:masterClrMapping/>
+  </p:clrMapOvr>
+</p:sld>
+</file>
+
+<file path=ppt/slides/slide45.xml><?xml version="1.0" encoding="utf-8"?>
+<p:sld xmlns:a="http://schemas.openxmlformats.org/drawingml/2006/main" xmlns:r="http://schemas.openxmlformats.org/officeDocument/2006/relationships" xmlns:p="http://schemas.openxmlformats.org/presentationml/2006/main">
+  <p:cSld>
+    <p:spTree>
+      <p:nvGrpSpPr>
+        <p:cNvPr id="1" name=""/>
+        <p:cNvGrpSpPr/>
+        <p:nvPr/>
+      </p:nvGrpSpPr>
+      <p:grpSpPr>
+        <a:xfrm>
+          <a:off x="0" y="0"/>
+          <a:ext cx="0" cy="0"/>
+          <a:chOff x="0" y="0"/>
+          <a:chExt cx="0" cy="0"/>
+        </a:xfrm>
+      </p:grpSpPr>
+      <p:sp>
+        <p:nvSpPr>
+          <p:cNvPr id="2" name="Title 1">
+            <a:extLst>
+              <a:ext uri="{FF2B5EF4-FFF2-40B4-BE49-F238E27FC236}">
                 <a16:creationId xmlns:a16="http://schemas.microsoft.com/office/drawing/2014/main" id="{CF714EBA-D095-417E-AFA3-8AEF29CCED25}"/>
               </a:ext>
             </a:extLst>
@@ -20694,7 +21042,7 @@
                 </a:solidFill>
               </a:rPr>
               <a:pPr/>
-              <a:t>43</a:t>
+              <a:t>45</a:t>
             </a:fld>
             <a:endParaRPr lang="en-US">
               <a:solidFill>
@@ -21145,7 +21493,7 @@
 </p:sld>
 </file>
 
-<file path=ppt/slides/slide44.xml><?xml version="1.0" encoding="utf-8"?>
+<file path=ppt/slides/slide46.xml><?xml version="1.0" encoding="utf-8"?>
 <p:sld xmlns:a="http://schemas.openxmlformats.org/drawingml/2006/main" xmlns:r="http://schemas.openxmlformats.org/officeDocument/2006/relationships" xmlns:p="http://schemas.openxmlformats.org/presentationml/2006/main">
   <p:cSld>
     <p:spTree>
@@ -21746,7 +22094,7 @@
                 </a:solidFill>
               </a:rPr>
               <a:pPr/>
-              <a:t>44</a:t>
+              <a:t>46</a:t>
             </a:fld>
             <a:endParaRPr lang="en-US">
               <a:solidFill>
@@ -21884,7 +22232,7 @@
 </p:sld>
 </file>
 
-<file path=ppt/slides/slide45.xml><?xml version="1.0" encoding="utf-8"?>
+<file path=ppt/slides/slide47.xml><?xml version="1.0" encoding="utf-8"?>
 <p:sld xmlns:a="http://schemas.openxmlformats.org/drawingml/2006/main" xmlns:r="http://schemas.openxmlformats.org/officeDocument/2006/relationships" xmlns:p="http://schemas.openxmlformats.org/presentationml/2006/main">
   <p:cSld>
     <p:bg>
@@ -22516,7 +22864,7 @@
                 </a:solidFill>
               </a:rPr>
               <a:pPr/>
-              <a:t>45</a:t>
+              <a:t>47</a:t>
             </a:fld>
             <a:endParaRPr lang="en-US">
               <a:solidFill>
@@ -23131,7 +23479,7 @@
 </p:sld>
 </file>
 
-<file path=ppt/slides/slide46.xml><?xml version="1.0" encoding="utf-8"?>
+<file path=ppt/slides/slide48.xml><?xml version="1.0" encoding="utf-8"?>
 <p:sld xmlns:a="http://schemas.openxmlformats.org/drawingml/2006/main" xmlns:r="http://schemas.openxmlformats.org/officeDocument/2006/relationships" xmlns:p="http://schemas.openxmlformats.org/presentationml/2006/main">
   <p:cSld>
     <p:spTree>
@@ -23420,7 +23768,7 @@
                 </a:solidFill>
               </a:rPr>
               <a:pPr/>
-              <a:t>46</a:t>
+              <a:t>48</a:t>
             </a:fld>
             <a:endParaRPr lang="en-US">
               <a:solidFill>
@@ -23616,7 +23964,7 @@
 </p:sld>
 </file>
 
-<file path=ppt/slides/slide47.xml><?xml version="1.0" encoding="utf-8"?>
+<file path=ppt/slides/slide49.xml><?xml version="1.0" encoding="utf-8"?>
 <p:sld xmlns:a="http://schemas.openxmlformats.org/drawingml/2006/main" xmlns:r="http://schemas.openxmlformats.org/officeDocument/2006/relationships" xmlns:p="http://schemas.openxmlformats.org/presentationml/2006/main">
   <p:cSld>
     <p:spTree>
@@ -23750,7 +24098,7 @@
                 </a:solidFill>
               </a:rPr>
               <a:pPr/>
-              <a:t>47</a:t>
+              <a:t>49</a:t>
             </a:fld>
             <a:endParaRPr lang="en-US">
               <a:solidFill>
@@ -23775,7 +24123,109 @@
 </p:sld>
 </file>
 
-<file path=ppt/slides/slide48.xml><?xml version="1.0" encoding="utf-8"?>
+<file path=ppt/slides/slide5.xml><?xml version="1.0" encoding="utf-8"?>
+<p:sld xmlns:a="http://schemas.openxmlformats.org/drawingml/2006/main" xmlns:r="http://schemas.openxmlformats.org/officeDocument/2006/relationships" xmlns:p="http://schemas.openxmlformats.org/presentationml/2006/main">
+  <p:cSld>
+    <p:spTree>
+      <p:nvGrpSpPr>
+        <p:cNvPr id="1" name=""/>
+        <p:cNvGrpSpPr/>
+        <p:nvPr/>
+      </p:nvGrpSpPr>
+      <p:grpSpPr>
+        <a:xfrm>
+          <a:off x="0" y="0"/>
+          <a:ext cx="0" cy="0"/>
+          <a:chOff x="0" y="0"/>
+          <a:chExt cx="0" cy="0"/>
+        </a:xfrm>
+      </p:grpSpPr>
+      <p:sp>
+        <p:nvSpPr>
+          <p:cNvPr id="4" name="Slide Number Placeholder 3">
+            <a:extLst>
+              <a:ext uri="{FF2B5EF4-FFF2-40B4-BE49-F238E27FC236}">
+                <a16:creationId xmlns:a16="http://schemas.microsoft.com/office/drawing/2014/main" id="{540DFF92-E2A0-426D-8547-DD6358862BD9}"/>
+              </a:ext>
+            </a:extLst>
+          </p:cNvPr>
+          <p:cNvSpPr>
+            <a:spLocks noGrp="1"/>
+          </p:cNvSpPr>
+          <p:nvPr>
+            <p:ph type="sldNum" sz="quarter" idx="12"/>
+          </p:nvPr>
+        </p:nvSpPr>
+        <p:spPr/>
+        <p:txBody>
+          <a:bodyPr/>
+          <a:lstStyle/>
+          <a:p>
+            <a:fld id="{1FD78A80-B303-491C-AEE7-8281801B0C65}" type="slidenum">
+              <a:rPr lang="en-US" smtClean="0">
+                <a:solidFill>
+                  <a:prstClr val="black">
+                    <a:tint val="75000"/>
+                  </a:prstClr>
+                </a:solidFill>
+              </a:rPr>
+              <a:pPr/>
+              <a:t>5</a:t>
+            </a:fld>
+            <a:endParaRPr lang="en-US">
+              <a:solidFill>
+                <a:prstClr val="black">
+                  <a:tint val="75000"/>
+                </a:prstClr>
+              </a:solidFill>
+            </a:endParaRPr>
+          </a:p>
+        </p:txBody>
+      </p:sp>
+      <p:pic>
+        <p:nvPicPr>
+          <p:cNvPr id="5" name="Picture 4">
+            <a:extLst>
+              <a:ext uri="{FF2B5EF4-FFF2-40B4-BE49-F238E27FC236}">
+                <a16:creationId xmlns:a16="http://schemas.microsoft.com/office/drawing/2014/main" id="{2870A04C-AD75-40D4-B6B5-66CCA9E1D8FF}"/>
+              </a:ext>
+            </a:extLst>
+          </p:cNvPr>
+          <p:cNvPicPr>
+            <a:picLocks noChangeAspect="1"/>
+          </p:cNvPicPr>
+          <p:nvPr/>
+        </p:nvPicPr>
+        <p:blipFill>
+          <a:blip r:embed="rId2"/>
+          <a:stretch>
+            <a:fillRect/>
+          </a:stretch>
+        </p:blipFill>
+        <p:spPr>
+          <a:xfrm>
+            <a:off x="2936696" y="0"/>
+            <a:ext cx="6318607" cy="6858000"/>
+          </a:xfrm>
+          <a:prstGeom prst="rect">
+            <a:avLst/>
+          </a:prstGeom>
+        </p:spPr>
+      </p:pic>
+    </p:spTree>
+    <p:extLst>
+      <p:ext uri="{BB962C8B-B14F-4D97-AF65-F5344CB8AC3E}">
+        <p14:creationId xmlns:p14="http://schemas.microsoft.com/office/powerpoint/2010/main" val="1910017591"/>
+      </p:ext>
+    </p:extLst>
+  </p:cSld>
+  <p:clrMapOvr>
+    <a:masterClrMapping/>
+  </p:clrMapOvr>
+</p:sld>
+</file>
+
+<file path=ppt/slides/slide50.xml><?xml version="1.0" encoding="utf-8"?>
 <p:sld xmlns:a="http://schemas.openxmlformats.org/drawingml/2006/main" xmlns:r="http://schemas.openxmlformats.org/officeDocument/2006/relationships" xmlns:p="http://schemas.openxmlformats.org/presentationml/2006/main">
   <p:cSld>
     <p:spTree>
@@ -24026,7 +24476,7 @@
                 </a:solidFill>
               </a:rPr>
               <a:pPr/>
-              <a:t>48</a:t>
+              <a:t>50</a:t>
             </a:fld>
             <a:endParaRPr lang="en-US">
               <a:solidFill>
@@ -24435,7 +24885,7 @@
 </p:sld>
 </file>
 
-<file path=ppt/slides/slide49.xml><?xml version="1.0" encoding="utf-8"?>
+<file path=ppt/slides/slide51.xml><?xml version="1.0" encoding="utf-8"?>
 <p:sld xmlns:a="http://schemas.openxmlformats.org/drawingml/2006/main" xmlns:r="http://schemas.openxmlformats.org/officeDocument/2006/relationships" xmlns:p="http://schemas.openxmlformats.org/presentationml/2006/main">
   <p:cSld>
     <p:spTree>
@@ -24714,7 +25164,7 @@
                 </a:solidFill>
               </a:rPr>
               <a:pPr/>
-              <a:t>49</a:t>
+              <a:t>51</a:t>
             </a:fld>
             <a:endParaRPr lang="en-US">
               <a:solidFill>
@@ -24799,1206 +25249,6 @@
 </p:sld>
 </file>
 
-<file path=ppt/slides/slide5.xml><?xml version="1.0" encoding="utf-8"?>
-<p:sld xmlns:a="http://schemas.openxmlformats.org/drawingml/2006/main" xmlns:r="http://schemas.openxmlformats.org/officeDocument/2006/relationships" xmlns:p="http://schemas.openxmlformats.org/presentationml/2006/main">
-  <p:cSld>
-    <p:spTree>
-      <p:nvGrpSpPr>
-        <p:cNvPr id="1" name=""/>
-        <p:cNvGrpSpPr/>
-        <p:nvPr/>
-      </p:nvGrpSpPr>
-      <p:grpSpPr>
-        <a:xfrm>
-          <a:off x="0" y="0"/>
-          <a:ext cx="0" cy="0"/>
-          <a:chOff x="0" y="0"/>
-          <a:chExt cx="0" cy="0"/>
-        </a:xfrm>
-      </p:grpSpPr>
-      <p:sp>
-        <p:nvSpPr>
-          <p:cNvPr id="4" name="Slide Number Placeholder 3">
-            <a:extLst>
-              <a:ext uri="{FF2B5EF4-FFF2-40B4-BE49-F238E27FC236}">
-                <a16:creationId xmlns:a16="http://schemas.microsoft.com/office/drawing/2014/main" id="{540DFF92-E2A0-426D-8547-DD6358862BD9}"/>
-              </a:ext>
-            </a:extLst>
-          </p:cNvPr>
-          <p:cNvSpPr>
-            <a:spLocks noGrp="1"/>
-          </p:cNvSpPr>
-          <p:nvPr>
-            <p:ph type="sldNum" sz="quarter" idx="12"/>
-          </p:nvPr>
-        </p:nvSpPr>
-        <p:spPr/>
-        <p:txBody>
-          <a:bodyPr/>
-          <a:lstStyle/>
-          <a:p>
-            <a:fld id="{1FD78A80-B303-491C-AEE7-8281801B0C65}" type="slidenum">
-              <a:rPr lang="en-US" smtClean="0">
-                <a:solidFill>
-                  <a:prstClr val="black">
-                    <a:tint val="75000"/>
-                  </a:prstClr>
-                </a:solidFill>
-              </a:rPr>
-              <a:pPr/>
-              <a:t>5</a:t>
-            </a:fld>
-            <a:endParaRPr lang="en-US">
-              <a:solidFill>
-                <a:prstClr val="black">
-                  <a:tint val="75000"/>
-                </a:prstClr>
-              </a:solidFill>
-            </a:endParaRPr>
-          </a:p>
-        </p:txBody>
-      </p:sp>
-      <p:pic>
-        <p:nvPicPr>
-          <p:cNvPr id="5" name="Picture 4">
-            <a:extLst>
-              <a:ext uri="{FF2B5EF4-FFF2-40B4-BE49-F238E27FC236}">
-                <a16:creationId xmlns:a16="http://schemas.microsoft.com/office/drawing/2014/main" id="{2870A04C-AD75-40D4-B6B5-66CCA9E1D8FF}"/>
-              </a:ext>
-            </a:extLst>
-          </p:cNvPr>
-          <p:cNvPicPr>
-            <a:picLocks noChangeAspect="1"/>
-          </p:cNvPicPr>
-          <p:nvPr/>
-        </p:nvPicPr>
-        <p:blipFill>
-          <a:blip r:embed="rId2"/>
-          <a:stretch>
-            <a:fillRect/>
-          </a:stretch>
-        </p:blipFill>
-        <p:spPr>
-          <a:xfrm>
-            <a:off x="2936696" y="0"/>
-            <a:ext cx="6318607" cy="6858000"/>
-          </a:xfrm>
-          <a:prstGeom prst="rect">
-            <a:avLst/>
-          </a:prstGeom>
-        </p:spPr>
-      </p:pic>
-    </p:spTree>
-    <p:extLst>
-      <p:ext uri="{BB962C8B-B14F-4D97-AF65-F5344CB8AC3E}">
-        <p14:creationId xmlns:p14="http://schemas.microsoft.com/office/powerpoint/2010/main" val="1910017591"/>
-      </p:ext>
-    </p:extLst>
-  </p:cSld>
-  <p:clrMapOvr>
-    <a:masterClrMapping/>
-  </p:clrMapOvr>
-</p:sld>
-</file>
-
-<file path=ppt/slides/slide50.xml><?xml version="1.0" encoding="utf-8"?>
-<p:sld xmlns:a="http://schemas.openxmlformats.org/drawingml/2006/main" xmlns:r="http://schemas.openxmlformats.org/officeDocument/2006/relationships" xmlns:p="http://schemas.openxmlformats.org/presentationml/2006/main">
-  <p:cSld>
-    <p:spTree>
-      <p:nvGrpSpPr>
-        <p:cNvPr id="1" name=""/>
-        <p:cNvGrpSpPr/>
-        <p:nvPr/>
-      </p:nvGrpSpPr>
-      <p:grpSpPr>
-        <a:xfrm>
-          <a:off x="0" y="0"/>
-          <a:ext cx="0" cy="0"/>
-          <a:chOff x="0" y="0"/>
-          <a:chExt cx="0" cy="0"/>
-        </a:xfrm>
-      </p:grpSpPr>
-      <p:sp>
-        <p:nvSpPr>
-          <p:cNvPr id="2" name="Title 1">
-            <a:extLst>
-              <a:ext uri="{FF2B5EF4-FFF2-40B4-BE49-F238E27FC236}">
-                <a16:creationId xmlns:a16="http://schemas.microsoft.com/office/drawing/2014/main" id="{335E744C-4531-4922-90A2-6BB5496B0B63}"/>
-              </a:ext>
-            </a:extLst>
-          </p:cNvPr>
-          <p:cNvSpPr>
-            <a:spLocks noGrp="1"/>
-          </p:cNvSpPr>
-          <p:nvPr>
-            <p:ph type="title"/>
-          </p:nvPr>
-        </p:nvSpPr>
-        <p:spPr/>
-        <p:txBody>
-          <a:bodyPr/>
-          <a:lstStyle/>
-          <a:p>
-            <a:r>
-              <a:rPr lang="en-US" dirty="0" err="1">
-                <a:latin typeface="Courier New" panose="02070309020205020404" pitchFamily="49" charset="0"/>
-                <a:cs typeface="Courier New" panose="02070309020205020404" pitchFamily="49" charset="0"/>
-              </a:rPr>
-              <a:t>grid_max_entropy</a:t>
-            </a:r>
-            <a:r>
-              <a:rPr lang="en-US" dirty="0">
-                <a:latin typeface="Courier New" panose="02070309020205020404" pitchFamily="49" charset="0"/>
-                <a:cs typeface="Courier New" panose="02070309020205020404" pitchFamily="49" charset="0"/>
-              </a:rPr>
-              <a:t>()</a:t>
-            </a:r>
-            <a:endParaRPr lang="en-US" dirty="0"/>
-          </a:p>
-        </p:txBody>
-      </p:sp>
-      <p:sp>
-        <p:nvSpPr>
-          <p:cNvPr id="3" name="Content Placeholder 2">
-            <a:extLst>
-              <a:ext uri="{FF2B5EF4-FFF2-40B4-BE49-F238E27FC236}">
-                <a16:creationId xmlns:a16="http://schemas.microsoft.com/office/drawing/2014/main" id="{9C8D96EA-7748-44C1-8559-C6CE06C7C747}"/>
-              </a:ext>
-            </a:extLst>
-          </p:cNvPr>
-          <p:cNvSpPr>
-            <a:spLocks noGrp="1"/>
-          </p:cNvSpPr>
-          <p:nvPr>
-            <p:ph idx="1"/>
-          </p:nvPr>
-        </p:nvSpPr>
-        <p:spPr/>
-        <p:txBody>
-          <a:bodyPr/>
-          <a:lstStyle/>
-          <a:p>
-            <a:pPr marL="0" indent="0">
-              <a:buNone/>
-            </a:pPr>
-            <a:r>
-              <a:rPr lang="en-US" dirty="0" err="1"/>
-              <a:t>knn_params</a:t>
-            </a:r>
-            <a:r>
-              <a:rPr lang="en-US" dirty="0"/>
-              <a:t> &lt;- parameters(neighbors(), </a:t>
-            </a:r>
-            <a:r>
-              <a:rPr lang="en-US" dirty="0" err="1"/>
-              <a:t>weight_func</a:t>
-            </a:r>
-            <a:r>
-              <a:rPr lang="en-US" dirty="0"/>
-              <a:t>(), </a:t>
-            </a:r>
-            <a:r>
-              <a:rPr lang="en-US" dirty="0" err="1"/>
-              <a:t>dist_power</a:t>
-            </a:r>
-            <a:r>
-              <a:rPr lang="en-US" dirty="0"/>
-              <a:t>())</a:t>
-            </a:r>
-          </a:p>
-          <a:p>
-            <a:pPr marL="0" indent="0">
-              <a:buNone/>
-            </a:pPr>
-            <a:r>
-              <a:rPr lang="en-US" dirty="0" err="1"/>
-              <a:t>knn_sfd</a:t>
-            </a:r>
-            <a:r>
-              <a:rPr lang="en-US" dirty="0"/>
-              <a:t> &lt;- </a:t>
-            </a:r>
-            <a:r>
-              <a:rPr lang="en-US" dirty="0" err="1">
-                <a:solidFill>
-                  <a:srgbClr val="00B0F0"/>
-                </a:solidFill>
-              </a:rPr>
-              <a:t>grid_max_entropy</a:t>
-            </a:r>
-            <a:r>
-              <a:rPr lang="en-US" dirty="0"/>
-              <a:t>(</a:t>
-            </a:r>
-            <a:r>
-              <a:rPr lang="en-US" dirty="0" err="1"/>
-              <a:t>knn_params</a:t>
-            </a:r>
-            <a:r>
-              <a:rPr lang="en-US" dirty="0"/>
-              <a:t>, </a:t>
-            </a:r>
-            <a:r>
-              <a:rPr lang="en-US" dirty="0">
-                <a:solidFill>
-                  <a:srgbClr val="00B0F0"/>
-                </a:solidFill>
-              </a:rPr>
-              <a:t>size = 50</a:t>
-            </a:r>
-            <a:r>
-              <a:rPr lang="en-US" dirty="0"/>
-              <a:t>)</a:t>
-            </a:r>
-          </a:p>
-          <a:p>
-            <a:pPr marL="0" indent="0">
-              <a:buNone/>
-            </a:pPr>
-            <a:endParaRPr lang="en-US" sz="1400" dirty="0"/>
-          </a:p>
-          <a:p>
-            <a:pPr marL="0" indent="0">
-              <a:buNone/>
-            </a:pPr>
-            <a:endParaRPr lang="en-US" sz="1400" dirty="0"/>
-          </a:p>
-          <a:p>
-            <a:pPr marL="0" indent="0">
-              <a:buNone/>
-            </a:pPr>
-            <a:endParaRPr lang="en-US" sz="1400" dirty="0"/>
-          </a:p>
-          <a:p>
-            <a:pPr marL="0" indent="0">
-              <a:buNone/>
-            </a:pPr>
-            <a:r>
-              <a:rPr lang="en-US" sz="1800" dirty="0" err="1">
-                <a:solidFill>
-                  <a:srgbClr val="7030A0"/>
-                </a:solidFill>
-              </a:rPr>
-              <a:t>knn_sfd</a:t>
-            </a:r>
-            <a:r>
-              <a:rPr lang="en-US" sz="1800" dirty="0"/>
-              <a:t> %&gt;% </a:t>
-            </a:r>
-          </a:p>
-          <a:p>
-            <a:pPr marL="0" indent="0">
-              <a:buNone/>
-            </a:pPr>
-            <a:r>
-              <a:rPr lang="en-US" sz="1800" dirty="0"/>
-              <a:t>  </a:t>
-            </a:r>
-            <a:r>
-              <a:rPr lang="en-US" sz="1800" dirty="0" err="1"/>
-              <a:t>ggplot</a:t>
-            </a:r>
-            <a:r>
-              <a:rPr lang="en-US" sz="1800" dirty="0"/>
-              <a:t>(</a:t>
-            </a:r>
-            <a:r>
-              <a:rPr lang="en-US" sz="1800" dirty="0" err="1"/>
-              <a:t>aes</a:t>
-            </a:r>
-            <a:r>
-              <a:rPr lang="en-US" sz="1800" dirty="0"/>
-              <a:t>(neighbors, </a:t>
-            </a:r>
-            <a:r>
-              <a:rPr lang="en-US" sz="1800" dirty="0" err="1"/>
-              <a:t>dist_power</a:t>
-            </a:r>
-            <a:r>
-              <a:rPr lang="en-US" sz="1800" dirty="0"/>
-              <a:t>)) +</a:t>
-            </a:r>
-          </a:p>
-          <a:p>
-            <a:pPr marL="0" indent="0">
-              <a:buNone/>
-            </a:pPr>
-            <a:r>
-              <a:rPr lang="en-US" sz="1800" dirty="0"/>
-              <a:t>  </a:t>
-            </a:r>
-            <a:r>
-              <a:rPr lang="en-US" sz="1800" dirty="0" err="1"/>
-              <a:t>geom_point</a:t>
-            </a:r>
-            <a:r>
-              <a:rPr lang="en-US" sz="1800" dirty="0"/>
-              <a:t>(</a:t>
-            </a:r>
-            <a:r>
-              <a:rPr lang="en-US" sz="1800" dirty="0" err="1"/>
-              <a:t>aes</a:t>
-            </a:r>
-            <a:r>
-              <a:rPr lang="en-US" sz="1800" dirty="0"/>
-              <a:t>(color = </a:t>
-            </a:r>
-            <a:r>
-              <a:rPr lang="en-US" sz="1800" dirty="0" err="1"/>
-              <a:t>weight_func</a:t>
-            </a:r>
-            <a:r>
-              <a:rPr lang="en-US" sz="1800" dirty="0"/>
-              <a:t>))</a:t>
-            </a:r>
-          </a:p>
-        </p:txBody>
-      </p:sp>
-      <p:sp>
-        <p:nvSpPr>
-          <p:cNvPr id="4" name="Slide Number Placeholder 3">
-            <a:extLst>
-              <a:ext uri="{FF2B5EF4-FFF2-40B4-BE49-F238E27FC236}">
-                <a16:creationId xmlns:a16="http://schemas.microsoft.com/office/drawing/2014/main" id="{66843850-2D8D-46FD-826F-9280286150DB}"/>
-              </a:ext>
-            </a:extLst>
-          </p:cNvPr>
-          <p:cNvSpPr>
-            <a:spLocks noGrp="1"/>
-          </p:cNvSpPr>
-          <p:nvPr>
-            <p:ph type="sldNum" sz="quarter" idx="12"/>
-          </p:nvPr>
-        </p:nvSpPr>
-        <p:spPr/>
-        <p:txBody>
-          <a:bodyPr/>
-          <a:lstStyle/>
-          <a:p>
-            <a:fld id="{1FD78A80-B303-491C-AEE7-8281801B0C65}" type="slidenum">
-              <a:rPr lang="en-US" smtClean="0">
-                <a:solidFill>
-                  <a:prstClr val="black">
-                    <a:tint val="75000"/>
-                  </a:prstClr>
-                </a:solidFill>
-              </a:rPr>
-              <a:pPr/>
-              <a:t>50</a:t>
-            </a:fld>
-            <a:endParaRPr lang="en-US">
-              <a:solidFill>
-                <a:prstClr val="black">
-                  <a:tint val="75000"/>
-                </a:prstClr>
-              </a:solidFill>
-            </a:endParaRPr>
-          </a:p>
-        </p:txBody>
-      </p:sp>
-      <p:pic>
-        <p:nvPicPr>
-          <p:cNvPr id="5" name="Picture 4">
-            <a:extLst>
-              <a:ext uri="{FF2B5EF4-FFF2-40B4-BE49-F238E27FC236}">
-                <a16:creationId xmlns:a16="http://schemas.microsoft.com/office/drawing/2014/main" id="{58D55AD3-6F20-4B33-86E1-04B66338D629}"/>
-              </a:ext>
-            </a:extLst>
-          </p:cNvPr>
-          <p:cNvPicPr>
-            <a:picLocks noChangeAspect="1"/>
-          </p:cNvPicPr>
-          <p:nvPr/>
-        </p:nvPicPr>
-        <p:blipFill>
-          <a:blip r:embed="rId2"/>
-          <a:stretch>
-            <a:fillRect/>
-          </a:stretch>
-        </p:blipFill>
-        <p:spPr>
-          <a:xfrm>
-            <a:off x="4754880" y="2743200"/>
-            <a:ext cx="5408402" cy="4094659"/>
-          </a:xfrm>
-          <a:prstGeom prst="rect">
-            <a:avLst/>
-          </a:prstGeom>
-        </p:spPr>
-      </p:pic>
-    </p:spTree>
-    <p:extLst>
-      <p:ext uri="{BB962C8B-B14F-4D97-AF65-F5344CB8AC3E}">
-        <p14:creationId xmlns:p14="http://schemas.microsoft.com/office/powerpoint/2010/main" val="285177931"/>
-      </p:ext>
-    </p:extLst>
-  </p:cSld>
-  <p:clrMapOvr>
-    <a:masterClrMapping/>
-  </p:clrMapOvr>
-  <p:timing>
-    <p:tnLst>
-      <p:par>
-        <p:cTn id="1" dur="indefinite" restart="never" nodeType="tmRoot">
-          <p:childTnLst>
-            <p:seq concurrent="1" nextAc="seek">
-              <p:cTn id="2" dur="indefinite" nodeType="mainSeq">
-                <p:childTnLst>
-                  <p:par>
-                    <p:cTn id="3" fill="hold">
-                      <p:stCondLst>
-                        <p:cond delay="indefinite"/>
-                      </p:stCondLst>
-                      <p:childTnLst>
-                        <p:par>
-                          <p:cTn id="4" fill="hold">
-                            <p:stCondLst>
-                              <p:cond delay="0"/>
-                            </p:stCondLst>
-                            <p:childTnLst>
-                              <p:par>
-                                <p:cTn id="5" presetID="1" presetClass="entr" presetSubtype="0" fill="hold" nodeType="clickEffect">
-                                  <p:stCondLst>
-                                    <p:cond delay="0"/>
-                                  </p:stCondLst>
-                                  <p:childTnLst>
-                                    <p:set>
-                                      <p:cBhvr>
-                                        <p:cTn id="6" dur="1" fill="hold">
-                                          <p:stCondLst>
-                                            <p:cond delay="0"/>
-                                          </p:stCondLst>
-                                        </p:cTn>
-                                        <p:tgtEl>
-                                          <p:spTgt spid="3">
-                                            <p:txEl>
-                                              <p:pRg st="1" end="1"/>
-                                            </p:txEl>
-                                          </p:spTgt>
-                                        </p:tgtEl>
-                                        <p:attrNameLst>
-                                          <p:attrName>style.visibility</p:attrName>
-                                        </p:attrNameLst>
-                                      </p:cBhvr>
-                                      <p:to>
-                                        <p:strVal val="visible"/>
-                                      </p:to>
-                                    </p:set>
-                                  </p:childTnLst>
-                                </p:cTn>
-                              </p:par>
-                            </p:childTnLst>
-                          </p:cTn>
-                        </p:par>
-                      </p:childTnLst>
-                    </p:cTn>
-                  </p:par>
-                  <p:par>
-                    <p:cTn id="7" fill="hold">
-                      <p:stCondLst>
-                        <p:cond delay="indefinite"/>
-                      </p:stCondLst>
-                      <p:childTnLst>
-                        <p:par>
-                          <p:cTn id="8" fill="hold">
-                            <p:stCondLst>
-                              <p:cond delay="0"/>
-                            </p:stCondLst>
-                            <p:childTnLst>
-                              <p:par>
-                                <p:cTn id="9" presetID="1" presetClass="entr" presetSubtype="0" fill="hold" nodeType="clickEffect">
-                                  <p:stCondLst>
-                                    <p:cond delay="0"/>
-                                  </p:stCondLst>
-                                  <p:childTnLst>
-                                    <p:set>
-                                      <p:cBhvr>
-                                        <p:cTn id="10" dur="1" fill="hold">
-                                          <p:stCondLst>
-                                            <p:cond delay="0"/>
-                                          </p:stCondLst>
-                                        </p:cTn>
-                                        <p:tgtEl>
-                                          <p:spTgt spid="3">
-                                            <p:txEl>
-                                              <p:pRg st="5" end="5"/>
-                                            </p:txEl>
-                                          </p:spTgt>
-                                        </p:tgtEl>
-                                        <p:attrNameLst>
-                                          <p:attrName>style.visibility</p:attrName>
-                                        </p:attrNameLst>
-                                      </p:cBhvr>
-                                      <p:to>
-                                        <p:strVal val="visible"/>
-                                      </p:to>
-                                    </p:set>
-                                  </p:childTnLst>
-                                </p:cTn>
-                              </p:par>
-                              <p:par>
-                                <p:cTn id="11" presetID="1" presetClass="entr" presetSubtype="0" fill="hold" nodeType="withEffect">
-                                  <p:stCondLst>
-                                    <p:cond delay="0"/>
-                                  </p:stCondLst>
-                                  <p:childTnLst>
-                                    <p:set>
-                                      <p:cBhvr>
-                                        <p:cTn id="12" dur="1" fill="hold">
-                                          <p:stCondLst>
-                                            <p:cond delay="0"/>
-                                          </p:stCondLst>
-                                        </p:cTn>
-                                        <p:tgtEl>
-                                          <p:spTgt spid="3">
-                                            <p:txEl>
-                                              <p:pRg st="6" end="6"/>
-                                            </p:txEl>
-                                          </p:spTgt>
-                                        </p:tgtEl>
-                                        <p:attrNameLst>
-                                          <p:attrName>style.visibility</p:attrName>
-                                        </p:attrNameLst>
-                                      </p:cBhvr>
-                                      <p:to>
-                                        <p:strVal val="visible"/>
-                                      </p:to>
-                                    </p:set>
-                                  </p:childTnLst>
-                                </p:cTn>
-                              </p:par>
-                              <p:par>
-                                <p:cTn id="13" presetID="1" presetClass="entr" presetSubtype="0" fill="hold" nodeType="withEffect">
-                                  <p:stCondLst>
-                                    <p:cond delay="0"/>
-                                  </p:stCondLst>
-                                  <p:childTnLst>
-                                    <p:set>
-                                      <p:cBhvr>
-                                        <p:cTn id="14" dur="1" fill="hold">
-                                          <p:stCondLst>
-                                            <p:cond delay="0"/>
-                                          </p:stCondLst>
-                                        </p:cTn>
-                                        <p:tgtEl>
-                                          <p:spTgt spid="3">
-                                            <p:txEl>
-                                              <p:pRg st="7" end="7"/>
-                                            </p:txEl>
-                                          </p:spTgt>
-                                        </p:tgtEl>
-                                        <p:attrNameLst>
-                                          <p:attrName>style.visibility</p:attrName>
-                                        </p:attrNameLst>
-                                      </p:cBhvr>
-                                      <p:to>
-                                        <p:strVal val="visible"/>
-                                      </p:to>
-                                    </p:set>
-                                  </p:childTnLst>
-                                </p:cTn>
-                              </p:par>
-                              <p:par>
-                                <p:cTn id="15" presetID="1" presetClass="entr" presetSubtype="0" fill="hold" nodeType="withEffect">
-                                  <p:stCondLst>
-                                    <p:cond delay="0"/>
-                                  </p:stCondLst>
-                                  <p:childTnLst>
-                                    <p:set>
-                                      <p:cBhvr>
-                                        <p:cTn id="16" dur="1" fill="hold">
-                                          <p:stCondLst>
-                                            <p:cond delay="0"/>
-                                          </p:stCondLst>
-                                        </p:cTn>
-                                        <p:tgtEl>
-                                          <p:spTgt spid="5"/>
-                                        </p:tgtEl>
-                                        <p:attrNameLst>
-                                          <p:attrName>style.visibility</p:attrName>
-                                        </p:attrNameLst>
-                                      </p:cBhvr>
-                                      <p:to>
-                                        <p:strVal val="visible"/>
-                                      </p:to>
-                                    </p:set>
-                                  </p:childTnLst>
-                                </p:cTn>
-                              </p:par>
-                            </p:childTnLst>
-                          </p:cTn>
-                        </p:par>
-                      </p:childTnLst>
-                    </p:cTn>
-                  </p:par>
-                </p:childTnLst>
-              </p:cTn>
-              <p:prevCondLst>
-                <p:cond evt="onPrev" delay="0">
-                  <p:tgtEl>
-                    <p:sldTgt/>
-                  </p:tgtEl>
-                </p:cond>
-              </p:prevCondLst>
-              <p:nextCondLst>
-                <p:cond evt="onNext" delay="0">
-                  <p:tgtEl>
-                    <p:sldTgt/>
-                  </p:tgtEl>
-                </p:cond>
-              </p:nextCondLst>
-            </p:seq>
-          </p:childTnLst>
-        </p:cTn>
-      </p:par>
-    </p:tnLst>
-  </p:timing>
-</p:sld>
-</file>
-
-<file path=ppt/slides/slide51.xml><?xml version="1.0" encoding="utf-8"?>
-<p:sld xmlns:a="http://schemas.openxmlformats.org/drawingml/2006/main" xmlns:r="http://schemas.openxmlformats.org/officeDocument/2006/relationships" xmlns:p="http://schemas.openxmlformats.org/presentationml/2006/main">
-  <p:cSld>
-    <p:spTree>
-      <p:nvGrpSpPr>
-        <p:cNvPr id="1" name=""/>
-        <p:cNvGrpSpPr/>
-        <p:nvPr/>
-      </p:nvGrpSpPr>
-      <p:grpSpPr>
-        <a:xfrm>
-          <a:off x="0" y="0"/>
-          <a:ext cx="0" cy="0"/>
-          <a:chOff x="0" y="0"/>
-          <a:chExt cx="0" cy="0"/>
-        </a:xfrm>
-      </p:grpSpPr>
-      <p:sp>
-        <p:nvSpPr>
-          <p:cNvPr id="2" name="Title 1">
-            <a:extLst>
-              <a:ext uri="{FF2B5EF4-FFF2-40B4-BE49-F238E27FC236}">
-                <a16:creationId xmlns:a16="http://schemas.microsoft.com/office/drawing/2014/main" id="{335E744C-4531-4922-90A2-6BB5496B0B63}"/>
-              </a:ext>
-            </a:extLst>
-          </p:cNvPr>
-          <p:cNvSpPr>
-            <a:spLocks noGrp="1"/>
-          </p:cNvSpPr>
-          <p:nvPr>
-            <p:ph type="title"/>
-          </p:nvPr>
-        </p:nvSpPr>
-        <p:spPr/>
-        <p:txBody>
-          <a:bodyPr/>
-          <a:lstStyle/>
-          <a:p>
-            <a:r>
-              <a:rPr lang="en-US" dirty="0" err="1">
-                <a:latin typeface="Courier New" panose="02070309020205020404" pitchFamily="49" charset="0"/>
-                <a:cs typeface="Courier New" panose="02070309020205020404" pitchFamily="49" charset="0"/>
-              </a:rPr>
-              <a:t>grid_regular</a:t>
-            </a:r>
-            <a:r>
-              <a:rPr lang="en-US" dirty="0">
-                <a:latin typeface="Courier New" panose="02070309020205020404" pitchFamily="49" charset="0"/>
-                <a:cs typeface="Courier New" panose="02070309020205020404" pitchFamily="49" charset="0"/>
-              </a:rPr>
-              <a:t>()</a:t>
-            </a:r>
-            <a:endParaRPr lang="en-US" dirty="0"/>
-          </a:p>
-        </p:txBody>
-      </p:sp>
-      <p:sp>
-        <p:nvSpPr>
-          <p:cNvPr id="3" name="Content Placeholder 2">
-            <a:extLst>
-              <a:ext uri="{FF2B5EF4-FFF2-40B4-BE49-F238E27FC236}">
-                <a16:creationId xmlns:a16="http://schemas.microsoft.com/office/drawing/2014/main" id="{9C8D96EA-7748-44C1-8559-C6CE06C7C747}"/>
-              </a:ext>
-            </a:extLst>
-          </p:cNvPr>
-          <p:cNvSpPr>
-            <a:spLocks noGrp="1"/>
-          </p:cNvSpPr>
-          <p:nvPr>
-            <p:ph idx="1"/>
-          </p:nvPr>
-        </p:nvSpPr>
-        <p:spPr/>
-        <p:txBody>
-          <a:bodyPr/>
-          <a:lstStyle/>
-          <a:p>
-            <a:pPr marL="0" indent="0">
-              <a:buNone/>
-            </a:pPr>
-            <a:r>
-              <a:rPr lang="en-US" dirty="0" err="1"/>
-              <a:t>knn_params</a:t>
-            </a:r>
-            <a:r>
-              <a:rPr lang="en-US" dirty="0"/>
-              <a:t> &lt;- parameters(neighbors(), </a:t>
-            </a:r>
-            <a:r>
-              <a:rPr lang="en-US" dirty="0" err="1"/>
-              <a:t>weight_func</a:t>
-            </a:r>
-            <a:r>
-              <a:rPr lang="en-US" dirty="0"/>
-              <a:t>(), </a:t>
-            </a:r>
-            <a:r>
-              <a:rPr lang="en-US" dirty="0" err="1"/>
-              <a:t>dist_power</a:t>
-            </a:r>
-            <a:r>
-              <a:rPr lang="en-US" dirty="0"/>
-              <a:t>())</a:t>
-            </a:r>
-          </a:p>
-          <a:p>
-            <a:pPr marL="0" indent="0">
-              <a:buNone/>
-            </a:pPr>
-            <a:r>
-              <a:rPr lang="en-US" dirty="0" err="1"/>
-              <a:t>knn_grid_reg</a:t>
-            </a:r>
-            <a:r>
-              <a:rPr lang="en-US" dirty="0"/>
-              <a:t> &lt;- </a:t>
-            </a:r>
-            <a:r>
-              <a:rPr lang="en-US" dirty="0" err="1">
-                <a:solidFill>
-                  <a:srgbClr val="00B0F0"/>
-                </a:solidFill>
-              </a:rPr>
-              <a:t>grid_regular</a:t>
-            </a:r>
-            <a:r>
-              <a:rPr lang="en-US" dirty="0"/>
-              <a:t>(</a:t>
-            </a:r>
-            <a:r>
-              <a:rPr lang="en-US" dirty="0" err="1"/>
-              <a:t>knn_params</a:t>
-            </a:r>
-            <a:r>
-              <a:rPr lang="en-US" dirty="0"/>
-              <a:t>, levels = c(10, 9, 5))</a:t>
-            </a:r>
-          </a:p>
-          <a:p>
-            <a:pPr marL="0" indent="0">
-              <a:buNone/>
-            </a:pPr>
-            <a:endParaRPr lang="en-US" sz="1400" dirty="0"/>
-          </a:p>
-          <a:p>
-            <a:pPr marL="0" indent="0">
-              <a:buNone/>
-            </a:pPr>
-            <a:endParaRPr lang="en-US" sz="1400" dirty="0"/>
-          </a:p>
-          <a:p>
-            <a:pPr marL="0" indent="0">
-              <a:buNone/>
-            </a:pPr>
-            <a:endParaRPr lang="en-US" sz="1400" dirty="0"/>
-          </a:p>
-          <a:p>
-            <a:pPr marL="0" indent="0">
-              <a:buNone/>
-            </a:pPr>
-            <a:r>
-              <a:rPr lang="en-US" sz="1800" dirty="0" err="1">
-                <a:solidFill>
-                  <a:srgbClr val="7030A0"/>
-                </a:solidFill>
-              </a:rPr>
-              <a:t>knn_grid_reg</a:t>
-            </a:r>
-            <a:r>
-              <a:rPr lang="en-US" sz="1800" dirty="0"/>
-              <a:t> %&gt;% </a:t>
-            </a:r>
-          </a:p>
-          <a:p>
-            <a:pPr marL="0" indent="0">
-              <a:buNone/>
-            </a:pPr>
-            <a:r>
-              <a:rPr lang="en-US" sz="1800" dirty="0"/>
-              <a:t>  </a:t>
-            </a:r>
-            <a:r>
-              <a:rPr lang="en-US" sz="1800" dirty="0" err="1"/>
-              <a:t>ggplot</a:t>
-            </a:r>
-            <a:r>
-              <a:rPr lang="en-US" sz="1800" dirty="0"/>
-              <a:t>(</a:t>
-            </a:r>
-            <a:r>
-              <a:rPr lang="en-US" sz="1800" dirty="0" err="1"/>
-              <a:t>aes</a:t>
-            </a:r>
-            <a:r>
-              <a:rPr lang="en-US" sz="1800" dirty="0"/>
-              <a:t>(neighbors, </a:t>
-            </a:r>
-            <a:r>
-              <a:rPr lang="en-US" sz="1800" dirty="0" err="1"/>
-              <a:t>dist_power</a:t>
-            </a:r>
-            <a:r>
-              <a:rPr lang="en-US" sz="1800" dirty="0"/>
-              <a:t>)) +</a:t>
-            </a:r>
-          </a:p>
-          <a:p>
-            <a:pPr marL="0" indent="0">
-              <a:buNone/>
-            </a:pPr>
-            <a:r>
-              <a:rPr lang="en-US" sz="1800" dirty="0"/>
-              <a:t>  </a:t>
-            </a:r>
-            <a:r>
-              <a:rPr lang="en-US" sz="1800" dirty="0" err="1"/>
-              <a:t>geom_point</a:t>
-            </a:r>
-            <a:r>
-              <a:rPr lang="en-US" sz="1800" dirty="0"/>
-              <a:t>(</a:t>
-            </a:r>
-            <a:r>
-              <a:rPr lang="en-US" sz="1800" dirty="0" err="1"/>
-              <a:t>aes</a:t>
-            </a:r>
-            <a:r>
-              <a:rPr lang="en-US" sz="1800" dirty="0"/>
-              <a:t>(color = </a:t>
-            </a:r>
-            <a:r>
-              <a:rPr lang="en-US" sz="1800" dirty="0" err="1"/>
-              <a:t>weight_func</a:t>
-            </a:r>
-            <a:r>
-              <a:rPr lang="en-US" sz="1800" dirty="0"/>
-              <a:t>))</a:t>
-            </a:r>
-          </a:p>
-        </p:txBody>
-      </p:sp>
-      <p:sp>
-        <p:nvSpPr>
-          <p:cNvPr id="4" name="Slide Number Placeholder 3">
-            <a:extLst>
-              <a:ext uri="{FF2B5EF4-FFF2-40B4-BE49-F238E27FC236}">
-                <a16:creationId xmlns:a16="http://schemas.microsoft.com/office/drawing/2014/main" id="{66843850-2D8D-46FD-826F-9280286150DB}"/>
-              </a:ext>
-            </a:extLst>
-          </p:cNvPr>
-          <p:cNvSpPr>
-            <a:spLocks noGrp="1"/>
-          </p:cNvSpPr>
-          <p:nvPr>
-            <p:ph type="sldNum" sz="quarter" idx="12"/>
-          </p:nvPr>
-        </p:nvSpPr>
-        <p:spPr/>
-        <p:txBody>
-          <a:bodyPr/>
-          <a:lstStyle/>
-          <a:p>
-            <a:fld id="{1FD78A80-B303-491C-AEE7-8281801B0C65}" type="slidenum">
-              <a:rPr lang="en-US" smtClean="0">
-                <a:solidFill>
-                  <a:prstClr val="black">
-                    <a:tint val="75000"/>
-                  </a:prstClr>
-                </a:solidFill>
-              </a:rPr>
-              <a:pPr/>
-              <a:t>51</a:t>
-            </a:fld>
-            <a:endParaRPr lang="en-US">
-              <a:solidFill>
-                <a:prstClr val="black">
-                  <a:tint val="75000"/>
-                </a:prstClr>
-              </a:solidFill>
-            </a:endParaRPr>
-          </a:p>
-        </p:txBody>
-      </p:sp>
-      <p:pic>
-        <p:nvPicPr>
-          <p:cNvPr id="6" name="Picture 5">
-            <a:extLst>
-              <a:ext uri="{FF2B5EF4-FFF2-40B4-BE49-F238E27FC236}">
-                <a16:creationId xmlns:a16="http://schemas.microsoft.com/office/drawing/2014/main" id="{01563B2D-2579-4A65-B520-217BAA9D9838}"/>
-              </a:ext>
-            </a:extLst>
-          </p:cNvPr>
-          <p:cNvPicPr>
-            <a:picLocks noChangeAspect="1"/>
-          </p:cNvPicPr>
-          <p:nvPr/>
-        </p:nvPicPr>
-        <p:blipFill>
-          <a:blip r:embed="rId2"/>
-          <a:stretch>
-            <a:fillRect/>
-          </a:stretch>
-        </p:blipFill>
-        <p:spPr>
-          <a:xfrm>
-            <a:off x="4754880" y="2743200"/>
-            <a:ext cx="5410850" cy="4096512"/>
-          </a:xfrm>
-          <a:prstGeom prst="rect">
-            <a:avLst/>
-          </a:prstGeom>
-        </p:spPr>
-      </p:pic>
-    </p:spTree>
-    <p:extLst>
-      <p:ext uri="{BB962C8B-B14F-4D97-AF65-F5344CB8AC3E}">
-        <p14:creationId xmlns:p14="http://schemas.microsoft.com/office/powerpoint/2010/main" val="3146705853"/>
-      </p:ext>
-    </p:extLst>
-  </p:cSld>
-  <p:clrMapOvr>
-    <a:masterClrMapping/>
-  </p:clrMapOvr>
-  <p:timing>
-    <p:tnLst>
-      <p:par>
-        <p:cTn id="1" dur="indefinite" restart="never" nodeType="tmRoot">
-          <p:childTnLst>
-            <p:seq concurrent="1" nextAc="seek">
-              <p:cTn id="2" dur="indefinite" nodeType="mainSeq">
-                <p:childTnLst>
-                  <p:par>
-                    <p:cTn id="3" fill="hold">
-                      <p:stCondLst>
-                        <p:cond delay="indefinite"/>
-                      </p:stCondLst>
-                      <p:childTnLst>
-                        <p:par>
-                          <p:cTn id="4" fill="hold">
-                            <p:stCondLst>
-                              <p:cond delay="0"/>
-                            </p:stCondLst>
-                            <p:childTnLst>
-                              <p:par>
-                                <p:cTn id="5" presetID="1" presetClass="entr" presetSubtype="0" fill="hold" nodeType="clickEffect">
-                                  <p:stCondLst>
-                                    <p:cond delay="0"/>
-                                  </p:stCondLst>
-                                  <p:childTnLst>
-                                    <p:set>
-                                      <p:cBhvr>
-                                        <p:cTn id="6" dur="1" fill="hold">
-                                          <p:stCondLst>
-                                            <p:cond delay="0"/>
-                                          </p:stCondLst>
-                                        </p:cTn>
-                                        <p:tgtEl>
-                                          <p:spTgt spid="3">
-                                            <p:txEl>
-                                              <p:pRg st="1" end="1"/>
-                                            </p:txEl>
-                                          </p:spTgt>
-                                        </p:tgtEl>
-                                        <p:attrNameLst>
-                                          <p:attrName>style.visibility</p:attrName>
-                                        </p:attrNameLst>
-                                      </p:cBhvr>
-                                      <p:to>
-                                        <p:strVal val="visible"/>
-                                      </p:to>
-                                    </p:set>
-                                  </p:childTnLst>
-                                </p:cTn>
-                              </p:par>
-                            </p:childTnLst>
-                          </p:cTn>
-                        </p:par>
-                      </p:childTnLst>
-                    </p:cTn>
-                  </p:par>
-                  <p:par>
-                    <p:cTn id="7" fill="hold">
-                      <p:stCondLst>
-                        <p:cond delay="indefinite"/>
-                      </p:stCondLst>
-                      <p:childTnLst>
-                        <p:par>
-                          <p:cTn id="8" fill="hold">
-                            <p:stCondLst>
-                              <p:cond delay="0"/>
-                            </p:stCondLst>
-                            <p:childTnLst>
-                              <p:par>
-                                <p:cTn id="9" presetID="1" presetClass="entr" presetSubtype="0" fill="hold" nodeType="clickEffect">
-                                  <p:stCondLst>
-                                    <p:cond delay="0"/>
-                                  </p:stCondLst>
-                                  <p:childTnLst>
-                                    <p:set>
-                                      <p:cBhvr>
-                                        <p:cTn id="10" dur="1" fill="hold">
-                                          <p:stCondLst>
-                                            <p:cond delay="0"/>
-                                          </p:stCondLst>
-                                        </p:cTn>
-                                        <p:tgtEl>
-                                          <p:spTgt spid="3">
-                                            <p:txEl>
-                                              <p:pRg st="5" end="5"/>
-                                            </p:txEl>
-                                          </p:spTgt>
-                                        </p:tgtEl>
-                                        <p:attrNameLst>
-                                          <p:attrName>style.visibility</p:attrName>
-                                        </p:attrNameLst>
-                                      </p:cBhvr>
-                                      <p:to>
-                                        <p:strVal val="visible"/>
-                                      </p:to>
-                                    </p:set>
-                                  </p:childTnLst>
-                                </p:cTn>
-                              </p:par>
-                              <p:par>
-                                <p:cTn id="11" presetID="1" presetClass="entr" presetSubtype="0" fill="hold" nodeType="withEffect">
-                                  <p:stCondLst>
-                                    <p:cond delay="0"/>
-                                  </p:stCondLst>
-                                  <p:childTnLst>
-                                    <p:set>
-                                      <p:cBhvr>
-                                        <p:cTn id="12" dur="1" fill="hold">
-                                          <p:stCondLst>
-                                            <p:cond delay="0"/>
-                                          </p:stCondLst>
-                                        </p:cTn>
-                                        <p:tgtEl>
-                                          <p:spTgt spid="3">
-                                            <p:txEl>
-                                              <p:pRg st="6" end="6"/>
-                                            </p:txEl>
-                                          </p:spTgt>
-                                        </p:tgtEl>
-                                        <p:attrNameLst>
-                                          <p:attrName>style.visibility</p:attrName>
-                                        </p:attrNameLst>
-                                      </p:cBhvr>
-                                      <p:to>
-                                        <p:strVal val="visible"/>
-                                      </p:to>
-                                    </p:set>
-                                  </p:childTnLst>
-                                </p:cTn>
-                              </p:par>
-                              <p:par>
-                                <p:cTn id="13" presetID="1" presetClass="entr" presetSubtype="0" fill="hold" nodeType="withEffect">
-                                  <p:stCondLst>
-                                    <p:cond delay="0"/>
-                                  </p:stCondLst>
-                                  <p:childTnLst>
-                                    <p:set>
-                                      <p:cBhvr>
-                                        <p:cTn id="14" dur="1" fill="hold">
-                                          <p:stCondLst>
-                                            <p:cond delay="0"/>
-                                          </p:stCondLst>
-                                        </p:cTn>
-                                        <p:tgtEl>
-                                          <p:spTgt spid="3">
-                                            <p:txEl>
-                                              <p:pRg st="7" end="7"/>
-                                            </p:txEl>
-                                          </p:spTgt>
-                                        </p:tgtEl>
-                                        <p:attrNameLst>
-                                          <p:attrName>style.visibility</p:attrName>
-                                        </p:attrNameLst>
-                                      </p:cBhvr>
-                                      <p:to>
-                                        <p:strVal val="visible"/>
-                                      </p:to>
-                                    </p:set>
-                                  </p:childTnLst>
-                                </p:cTn>
-                              </p:par>
-                              <p:par>
-                                <p:cTn id="15" presetID="1" presetClass="entr" presetSubtype="0" fill="hold" nodeType="withEffect">
-                                  <p:stCondLst>
-                                    <p:cond delay="0"/>
-                                  </p:stCondLst>
-                                  <p:childTnLst>
-                                    <p:set>
-                                      <p:cBhvr>
-                                        <p:cTn id="16" dur="1" fill="hold">
-                                          <p:stCondLst>
-                                            <p:cond delay="0"/>
-                                          </p:stCondLst>
-                                        </p:cTn>
-                                        <p:tgtEl>
-                                          <p:spTgt spid="6"/>
-                                        </p:tgtEl>
-                                        <p:attrNameLst>
-                                          <p:attrName>style.visibility</p:attrName>
-                                        </p:attrNameLst>
-                                      </p:cBhvr>
-                                      <p:to>
-                                        <p:strVal val="visible"/>
-                                      </p:to>
-                                    </p:set>
-                                  </p:childTnLst>
-                                </p:cTn>
-                              </p:par>
-                            </p:childTnLst>
-                          </p:cTn>
-                        </p:par>
-                      </p:childTnLst>
-                    </p:cTn>
-                  </p:par>
-                </p:childTnLst>
-              </p:cTn>
-              <p:prevCondLst>
-                <p:cond evt="onPrev" delay="0">
-                  <p:tgtEl>
-                    <p:sldTgt/>
-                  </p:tgtEl>
-                </p:cond>
-              </p:prevCondLst>
-              <p:nextCondLst>
-                <p:cond evt="onNext" delay="0">
-                  <p:tgtEl>
-                    <p:sldTgt/>
-                  </p:tgtEl>
-                </p:cond>
-              </p:nextCondLst>
-            </p:seq>
-          </p:childTnLst>
-        </p:cTn>
-      </p:par>
-    </p:tnLst>
-  </p:timing>
-</p:sld>
-</file>
-
 <file path=ppt/slides/slide52.xml><?xml version="1.0" encoding="utf-8"?>
 <p:sld xmlns:a="http://schemas.openxmlformats.org/drawingml/2006/main" xmlns:r="http://schemas.openxmlformats.org/officeDocument/2006/relationships" xmlns:p="http://schemas.openxmlformats.org/presentationml/2006/main">
   <p:cSld>
@@ -26042,7 +25292,7 @@
                 <a:latin typeface="Courier New" panose="02070309020205020404" pitchFamily="49" charset="0"/>
                 <a:cs typeface="Courier New" panose="02070309020205020404" pitchFamily="49" charset="0"/>
               </a:rPr>
-              <a:t>grid_random</a:t>
+              <a:t>grid_max_entropy</a:t>
             </a:r>
             <a:r>
               <a:rPr lang="en-US" dirty="0">
@@ -26071,28 +25321,46 @@
             <p:ph idx="1"/>
           </p:nvPr>
         </p:nvSpPr>
-        <p:spPr>
-          <a:xfrm>
-            <a:off x="838199" y="1825625"/>
-            <a:ext cx="11149013" cy="4351338"/>
-          </a:xfrm>
-        </p:spPr>
+        <p:spPr/>
         <p:txBody>
           <a:bodyPr/>
           <a:lstStyle/>
           <a:p>
-            <a:r>
-              <a:rPr lang="en-US" sz="1800" dirty="0"/>
-              <a:t>Uniformly samples the parameter space without taking into account the previously generated sample points</a:t>
-            </a:r>
-          </a:p>
-          <a:p>
             <a:pPr marL="0" indent="0">
               <a:buNone/>
             </a:pPr>
             <a:r>
               <a:rPr lang="en-US" dirty="0" err="1"/>
-              <a:t>knn_grid_ran</a:t>
+              <a:t>knn_params</a:t>
+            </a:r>
+            <a:r>
+              <a:rPr lang="en-US" dirty="0"/>
+              <a:t> &lt;- parameters(neighbors(), </a:t>
+            </a:r>
+            <a:r>
+              <a:rPr lang="en-US" dirty="0" err="1"/>
+              <a:t>weight_func</a:t>
+            </a:r>
+            <a:r>
+              <a:rPr lang="en-US" dirty="0"/>
+              <a:t>(), </a:t>
+            </a:r>
+            <a:r>
+              <a:rPr lang="en-US" dirty="0" err="1"/>
+              <a:t>dist_power</a:t>
+            </a:r>
+            <a:r>
+              <a:rPr lang="en-US" dirty="0"/>
+              <a:t>())</a:t>
+            </a:r>
+          </a:p>
+          <a:p>
+            <a:pPr marL="0" indent="0">
+              <a:buNone/>
+            </a:pPr>
+            <a:r>
+              <a:rPr lang="en-US" dirty="0" err="1"/>
+              <a:t>knn_sfd</a:t>
             </a:r>
             <a:r>
               <a:rPr lang="en-US" dirty="0"/>
@@ -26104,7 +25372,7 @@
                   <a:srgbClr val="00B0F0"/>
                 </a:solidFill>
               </a:rPr>
-              <a:t>grid_random</a:t>
+              <a:t>grid_max_entropy</a:t>
             </a:r>
             <a:r>
               <a:rPr lang="en-US" dirty="0"/>
@@ -26116,7 +25384,19 @@
             </a:r>
             <a:r>
               <a:rPr lang="en-US" dirty="0"/>
-              <a:t>, size = 50)</a:t>
+              <a:t>, </a:t>
+            </a:r>
+            <a:r>
+              <a:rPr lang="en-US" dirty="0">
+                <a:solidFill>
+                  <a:srgbClr val="00B0F0"/>
+                </a:solidFill>
+              </a:rPr>
+              <a:t>size = 50</a:t>
+            </a:r>
+            <a:r>
+              <a:rPr lang="en-US" dirty="0"/>
+              <a:t>)</a:t>
             </a:r>
           </a:p>
           <a:p>
@@ -26147,7 +25427,7 @@
                   <a:srgbClr val="7030A0"/>
                 </a:solidFill>
               </a:rPr>
-              <a:t>knn_grid_ran</a:t>
+              <a:t>knn_sfd</a:t>
             </a:r>
             <a:r>
               <a:rPr lang="en-US" sz="1800" dirty="0"/>
@@ -26269,7 +25549,7 @@
           <p:cNvPr id="5" name="Picture 4">
             <a:extLst>
               <a:ext uri="{FF2B5EF4-FFF2-40B4-BE49-F238E27FC236}">
-                <a16:creationId xmlns:a16="http://schemas.microsoft.com/office/drawing/2014/main" id="{CDAC7418-8C3F-49CA-A228-6A797580A400}"/>
+                <a16:creationId xmlns:a16="http://schemas.microsoft.com/office/drawing/2014/main" id="{58D55AD3-6F20-4B33-86E1-04B66338D629}"/>
               </a:ext>
             </a:extLst>
           </p:cNvPr>
@@ -26287,7 +25567,7 @@
         <p:spPr>
           <a:xfrm>
             <a:off x="4754880" y="2743200"/>
-            <a:ext cx="5410850" cy="4096512"/>
+            <a:ext cx="5408402" cy="4094659"/>
           </a:xfrm>
           <a:prstGeom prst="rect">
             <a:avLst/>
@@ -26297,7 +25577,7 @@
     </p:spTree>
     <p:extLst>
       <p:ext uri="{BB962C8B-B14F-4D97-AF65-F5344CB8AC3E}">
-        <p14:creationId xmlns:p14="http://schemas.microsoft.com/office/powerpoint/2010/main" val="1121799630"/>
+        <p14:creationId xmlns:p14="http://schemas.microsoft.com/office/powerpoint/2010/main" val="285177931"/>
       </p:ext>
     </p:extLst>
   </p:cSld>
@@ -26567,6 +25847,1074 @@
                 <a:latin typeface="Courier New" panose="02070309020205020404" pitchFamily="49" charset="0"/>
                 <a:cs typeface="Courier New" panose="02070309020205020404" pitchFamily="49" charset="0"/>
               </a:rPr>
+              <a:t>grid_regular</a:t>
+            </a:r>
+            <a:r>
+              <a:rPr lang="en-US" dirty="0">
+                <a:latin typeface="Courier New" panose="02070309020205020404" pitchFamily="49" charset="0"/>
+                <a:cs typeface="Courier New" panose="02070309020205020404" pitchFamily="49" charset="0"/>
+              </a:rPr>
+              <a:t>()</a:t>
+            </a:r>
+            <a:endParaRPr lang="en-US" dirty="0"/>
+          </a:p>
+        </p:txBody>
+      </p:sp>
+      <p:sp>
+        <p:nvSpPr>
+          <p:cNvPr id="3" name="Content Placeholder 2">
+            <a:extLst>
+              <a:ext uri="{FF2B5EF4-FFF2-40B4-BE49-F238E27FC236}">
+                <a16:creationId xmlns:a16="http://schemas.microsoft.com/office/drawing/2014/main" id="{9C8D96EA-7748-44C1-8559-C6CE06C7C747}"/>
+              </a:ext>
+            </a:extLst>
+          </p:cNvPr>
+          <p:cNvSpPr>
+            <a:spLocks noGrp="1"/>
+          </p:cNvSpPr>
+          <p:nvPr>
+            <p:ph idx="1"/>
+          </p:nvPr>
+        </p:nvSpPr>
+        <p:spPr/>
+        <p:txBody>
+          <a:bodyPr/>
+          <a:lstStyle/>
+          <a:p>
+            <a:pPr marL="0" indent="0">
+              <a:buNone/>
+            </a:pPr>
+            <a:r>
+              <a:rPr lang="en-US" dirty="0" err="1"/>
+              <a:t>knn_params</a:t>
+            </a:r>
+            <a:r>
+              <a:rPr lang="en-US" dirty="0"/>
+              <a:t> &lt;- parameters(neighbors(), </a:t>
+            </a:r>
+            <a:r>
+              <a:rPr lang="en-US" dirty="0" err="1"/>
+              <a:t>weight_func</a:t>
+            </a:r>
+            <a:r>
+              <a:rPr lang="en-US" dirty="0"/>
+              <a:t>(), </a:t>
+            </a:r>
+            <a:r>
+              <a:rPr lang="en-US" dirty="0" err="1"/>
+              <a:t>dist_power</a:t>
+            </a:r>
+            <a:r>
+              <a:rPr lang="en-US" dirty="0"/>
+              <a:t>())</a:t>
+            </a:r>
+          </a:p>
+          <a:p>
+            <a:pPr marL="0" indent="0">
+              <a:buNone/>
+            </a:pPr>
+            <a:r>
+              <a:rPr lang="en-US" dirty="0" err="1"/>
+              <a:t>knn_grid_reg</a:t>
+            </a:r>
+            <a:r>
+              <a:rPr lang="en-US" dirty="0"/>
+              <a:t> &lt;- </a:t>
+            </a:r>
+            <a:r>
+              <a:rPr lang="en-US" dirty="0" err="1">
+                <a:solidFill>
+                  <a:srgbClr val="00B0F0"/>
+                </a:solidFill>
+              </a:rPr>
+              <a:t>grid_regular</a:t>
+            </a:r>
+            <a:r>
+              <a:rPr lang="en-US" dirty="0"/>
+              <a:t>(</a:t>
+            </a:r>
+            <a:r>
+              <a:rPr lang="en-US" dirty="0" err="1"/>
+              <a:t>knn_params</a:t>
+            </a:r>
+            <a:r>
+              <a:rPr lang="en-US" dirty="0"/>
+              <a:t>, levels = c(10, 9, 5))</a:t>
+            </a:r>
+          </a:p>
+          <a:p>
+            <a:pPr marL="0" indent="0">
+              <a:buNone/>
+            </a:pPr>
+            <a:endParaRPr lang="en-US" sz="1400" dirty="0"/>
+          </a:p>
+          <a:p>
+            <a:pPr marL="0" indent="0">
+              <a:buNone/>
+            </a:pPr>
+            <a:endParaRPr lang="en-US" sz="1400" dirty="0"/>
+          </a:p>
+          <a:p>
+            <a:pPr marL="0" indent="0">
+              <a:buNone/>
+            </a:pPr>
+            <a:endParaRPr lang="en-US" sz="1400" dirty="0"/>
+          </a:p>
+          <a:p>
+            <a:pPr marL="0" indent="0">
+              <a:buNone/>
+            </a:pPr>
+            <a:r>
+              <a:rPr lang="en-US" sz="1800" dirty="0" err="1">
+                <a:solidFill>
+                  <a:srgbClr val="7030A0"/>
+                </a:solidFill>
+              </a:rPr>
+              <a:t>knn_grid_reg</a:t>
+            </a:r>
+            <a:r>
+              <a:rPr lang="en-US" sz="1800" dirty="0"/>
+              <a:t> %&gt;% </a:t>
+            </a:r>
+          </a:p>
+          <a:p>
+            <a:pPr marL="0" indent="0">
+              <a:buNone/>
+            </a:pPr>
+            <a:r>
+              <a:rPr lang="en-US" sz="1800" dirty="0"/>
+              <a:t>  </a:t>
+            </a:r>
+            <a:r>
+              <a:rPr lang="en-US" sz="1800" dirty="0" err="1"/>
+              <a:t>ggplot</a:t>
+            </a:r>
+            <a:r>
+              <a:rPr lang="en-US" sz="1800" dirty="0"/>
+              <a:t>(</a:t>
+            </a:r>
+            <a:r>
+              <a:rPr lang="en-US" sz="1800" dirty="0" err="1"/>
+              <a:t>aes</a:t>
+            </a:r>
+            <a:r>
+              <a:rPr lang="en-US" sz="1800" dirty="0"/>
+              <a:t>(neighbors, </a:t>
+            </a:r>
+            <a:r>
+              <a:rPr lang="en-US" sz="1800" dirty="0" err="1"/>
+              <a:t>dist_power</a:t>
+            </a:r>
+            <a:r>
+              <a:rPr lang="en-US" sz="1800" dirty="0"/>
+              <a:t>)) +</a:t>
+            </a:r>
+          </a:p>
+          <a:p>
+            <a:pPr marL="0" indent="0">
+              <a:buNone/>
+            </a:pPr>
+            <a:r>
+              <a:rPr lang="en-US" sz="1800" dirty="0"/>
+              <a:t>  </a:t>
+            </a:r>
+            <a:r>
+              <a:rPr lang="en-US" sz="1800" dirty="0" err="1"/>
+              <a:t>geom_point</a:t>
+            </a:r>
+            <a:r>
+              <a:rPr lang="en-US" sz="1800" dirty="0"/>
+              <a:t>(</a:t>
+            </a:r>
+            <a:r>
+              <a:rPr lang="en-US" sz="1800" dirty="0" err="1"/>
+              <a:t>aes</a:t>
+            </a:r>
+            <a:r>
+              <a:rPr lang="en-US" sz="1800" dirty="0"/>
+              <a:t>(color = </a:t>
+            </a:r>
+            <a:r>
+              <a:rPr lang="en-US" sz="1800" dirty="0" err="1"/>
+              <a:t>weight_func</a:t>
+            </a:r>
+            <a:r>
+              <a:rPr lang="en-US" sz="1800" dirty="0"/>
+              <a:t>))</a:t>
+            </a:r>
+          </a:p>
+        </p:txBody>
+      </p:sp>
+      <p:sp>
+        <p:nvSpPr>
+          <p:cNvPr id="4" name="Slide Number Placeholder 3">
+            <a:extLst>
+              <a:ext uri="{FF2B5EF4-FFF2-40B4-BE49-F238E27FC236}">
+                <a16:creationId xmlns:a16="http://schemas.microsoft.com/office/drawing/2014/main" id="{66843850-2D8D-46FD-826F-9280286150DB}"/>
+              </a:ext>
+            </a:extLst>
+          </p:cNvPr>
+          <p:cNvSpPr>
+            <a:spLocks noGrp="1"/>
+          </p:cNvSpPr>
+          <p:nvPr>
+            <p:ph type="sldNum" sz="quarter" idx="12"/>
+          </p:nvPr>
+        </p:nvSpPr>
+        <p:spPr/>
+        <p:txBody>
+          <a:bodyPr/>
+          <a:lstStyle/>
+          <a:p>
+            <a:fld id="{1FD78A80-B303-491C-AEE7-8281801B0C65}" type="slidenum">
+              <a:rPr lang="en-US" smtClean="0">
+                <a:solidFill>
+                  <a:prstClr val="black">
+                    <a:tint val="75000"/>
+                  </a:prstClr>
+                </a:solidFill>
+              </a:rPr>
+              <a:pPr/>
+              <a:t>53</a:t>
+            </a:fld>
+            <a:endParaRPr lang="en-US">
+              <a:solidFill>
+                <a:prstClr val="black">
+                  <a:tint val="75000"/>
+                </a:prstClr>
+              </a:solidFill>
+            </a:endParaRPr>
+          </a:p>
+        </p:txBody>
+      </p:sp>
+      <p:pic>
+        <p:nvPicPr>
+          <p:cNvPr id="6" name="Picture 5">
+            <a:extLst>
+              <a:ext uri="{FF2B5EF4-FFF2-40B4-BE49-F238E27FC236}">
+                <a16:creationId xmlns:a16="http://schemas.microsoft.com/office/drawing/2014/main" id="{01563B2D-2579-4A65-B520-217BAA9D9838}"/>
+              </a:ext>
+            </a:extLst>
+          </p:cNvPr>
+          <p:cNvPicPr>
+            <a:picLocks noChangeAspect="1"/>
+          </p:cNvPicPr>
+          <p:nvPr/>
+        </p:nvPicPr>
+        <p:blipFill>
+          <a:blip r:embed="rId2"/>
+          <a:stretch>
+            <a:fillRect/>
+          </a:stretch>
+        </p:blipFill>
+        <p:spPr>
+          <a:xfrm>
+            <a:off x="4754880" y="2743200"/>
+            <a:ext cx="5410850" cy="4096512"/>
+          </a:xfrm>
+          <a:prstGeom prst="rect">
+            <a:avLst/>
+          </a:prstGeom>
+        </p:spPr>
+      </p:pic>
+    </p:spTree>
+    <p:extLst>
+      <p:ext uri="{BB962C8B-B14F-4D97-AF65-F5344CB8AC3E}">
+        <p14:creationId xmlns:p14="http://schemas.microsoft.com/office/powerpoint/2010/main" val="3146705853"/>
+      </p:ext>
+    </p:extLst>
+  </p:cSld>
+  <p:clrMapOvr>
+    <a:masterClrMapping/>
+  </p:clrMapOvr>
+  <p:timing>
+    <p:tnLst>
+      <p:par>
+        <p:cTn id="1" dur="indefinite" restart="never" nodeType="tmRoot">
+          <p:childTnLst>
+            <p:seq concurrent="1" nextAc="seek">
+              <p:cTn id="2" dur="indefinite" nodeType="mainSeq">
+                <p:childTnLst>
+                  <p:par>
+                    <p:cTn id="3" fill="hold">
+                      <p:stCondLst>
+                        <p:cond delay="indefinite"/>
+                      </p:stCondLst>
+                      <p:childTnLst>
+                        <p:par>
+                          <p:cTn id="4" fill="hold">
+                            <p:stCondLst>
+                              <p:cond delay="0"/>
+                            </p:stCondLst>
+                            <p:childTnLst>
+                              <p:par>
+                                <p:cTn id="5" presetID="1" presetClass="entr" presetSubtype="0" fill="hold" nodeType="clickEffect">
+                                  <p:stCondLst>
+                                    <p:cond delay="0"/>
+                                  </p:stCondLst>
+                                  <p:childTnLst>
+                                    <p:set>
+                                      <p:cBhvr>
+                                        <p:cTn id="6" dur="1" fill="hold">
+                                          <p:stCondLst>
+                                            <p:cond delay="0"/>
+                                          </p:stCondLst>
+                                        </p:cTn>
+                                        <p:tgtEl>
+                                          <p:spTgt spid="3">
+                                            <p:txEl>
+                                              <p:pRg st="1" end="1"/>
+                                            </p:txEl>
+                                          </p:spTgt>
+                                        </p:tgtEl>
+                                        <p:attrNameLst>
+                                          <p:attrName>style.visibility</p:attrName>
+                                        </p:attrNameLst>
+                                      </p:cBhvr>
+                                      <p:to>
+                                        <p:strVal val="visible"/>
+                                      </p:to>
+                                    </p:set>
+                                  </p:childTnLst>
+                                </p:cTn>
+                              </p:par>
+                            </p:childTnLst>
+                          </p:cTn>
+                        </p:par>
+                      </p:childTnLst>
+                    </p:cTn>
+                  </p:par>
+                  <p:par>
+                    <p:cTn id="7" fill="hold">
+                      <p:stCondLst>
+                        <p:cond delay="indefinite"/>
+                      </p:stCondLst>
+                      <p:childTnLst>
+                        <p:par>
+                          <p:cTn id="8" fill="hold">
+                            <p:stCondLst>
+                              <p:cond delay="0"/>
+                            </p:stCondLst>
+                            <p:childTnLst>
+                              <p:par>
+                                <p:cTn id="9" presetID="1" presetClass="entr" presetSubtype="0" fill="hold" nodeType="clickEffect">
+                                  <p:stCondLst>
+                                    <p:cond delay="0"/>
+                                  </p:stCondLst>
+                                  <p:childTnLst>
+                                    <p:set>
+                                      <p:cBhvr>
+                                        <p:cTn id="10" dur="1" fill="hold">
+                                          <p:stCondLst>
+                                            <p:cond delay="0"/>
+                                          </p:stCondLst>
+                                        </p:cTn>
+                                        <p:tgtEl>
+                                          <p:spTgt spid="3">
+                                            <p:txEl>
+                                              <p:pRg st="5" end="5"/>
+                                            </p:txEl>
+                                          </p:spTgt>
+                                        </p:tgtEl>
+                                        <p:attrNameLst>
+                                          <p:attrName>style.visibility</p:attrName>
+                                        </p:attrNameLst>
+                                      </p:cBhvr>
+                                      <p:to>
+                                        <p:strVal val="visible"/>
+                                      </p:to>
+                                    </p:set>
+                                  </p:childTnLst>
+                                </p:cTn>
+                              </p:par>
+                              <p:par>
+                                <p:cTn id="11" presetID="1" presetClass="entr" presetSubtype="0" fill="hold" nodeType="withEffect">
+                                  <p:stCondLst>
+                                    <p:cond delay="0"/>
+                                  </p:stCondLst>
+                                  <p:childTnLst>
+                                    <p:set>
+                                      <p:cBhvr>
+                                        <p:cTn id="12" dur="1" fill="hold">
+                                          <p:stCondLst>
+                                            <p:cond delay="0"/>
+                                          </p:stCondLst>
+                                        </p:cTn>
+                                        <p:tgtEl>
+                                          <p:spTgt spid="3">
+                                            <p:txEl>
+                                              <p:pRg st="6" end="6"/>
+                                            </p:txEl>
+                                          </p:spTgt>
+                                        </p:tgtEl>
+                                        <p:attrNameLst>
+                                          <p:attrName>style.visibility</p:attrName>
+                                        </p:attrNameLst>
+                                      </p:cBhvr>
+                                      <p:to>
+                                        <p:strVal val="visible"/>
+                                      </p:to>
+                                    </p:set>
+                                  </p:childTnLst>
+                                </p:cTn>
+                              </p:par>
+                              <p:par>
+                                <p:cTn id="13" presetID="1" presetClass="entr" presetSubtype="0" fill="hold" nodeType="withEffect">
+                                  <p:stCondLst>
+                                    <p:cond delay="0"/>
+                                  </p:stCondLst>
+                                  <p:childTnLst>
+                                    <p:set>
+                                      <p:cBhvr>
+                                        <p:cTn id="14" dur="1" fill="hold">
+                                          <p:stCondLst>
+                                            <p:cond delay="0"/>
+                                          </p:stCondLst>
+                                        </p:cTn>
+                                        <p:tgtEl>
+                                          <p:spTgt spid="3">
+                                            <p:txEl>
+                                              <p:pRg st="7" end="7"/>
+                                            </p:txEl>
+                                          </p:spTgt>
+                                        </p:tgtEl>
+                                        <p:attrNameLst>
+                                          <p:attrName>style.visibility</p:attrName>
+                                        </p:attrNameLst>
+                                      </p:cBhvr>
+                                      <p:to>
+                                        <p:strVal val="visible"/>
+                                      </p:to>
+                                    </p:set>
+                                  </p:childTnLst>
+                                </p:cTn>
+                              </p:par>
+                              <p:par>
+                                <p:cTn id="15" presetID="1" presetClass="entr" presetSubtype="0" fill="hold" nodeType="withEffect">
+                                  <p:stCondLst>
+                                    <p:cond delay="0"/>
+                                  </p:stCondLst>
+                                  <p:childTnLst>
+                                    <p:set>
+                                      <p:cBhvr>
+                                        <p:cTn id="16" dur="1" fill="hold">
+                                          <p:stCondLst>
+                                            <p:cond delay="0"/>
+                                          </p:stCondLst>
+                                        </p:cTn>
+                                        <p:tgtEl>
+                                          <p:spTgt spid="6"/>
+                                        </p:tgtEl>
+                                        <p:attrNameLst>
+                                          <p:attrName>style.visibility</p:attrName>
+                                        </p:attrNameLst>
+                                      </p:cBhvr>
+                                      <p:to>
+                                        <p:strVal val="visible"/>
+                                      </p:to>
+                                    </p:set>
+                                  </p:childTnLst>
+                                </p:cTn>
+                              </p:par>
+                            </p:childTnLst>
+                          </p:cTn>
+                        </p:par>
+                      </p:childTnLst>
+                    </p:cTn>
+                  </p:par>
+                </p:childTnLst>
+              </p:cTn>
+              <p:prevCondLst>
+                <p:cond evt="onPrev" delay="0">
+                  <p:tgtEl>
+                    <p:sldTgt/>
+                  </p:tgtEl>
+                </p:cond>
+              </p:prevCondLst>
+              <p:nextCondLst>
+                <p:cond evt="onNext" delay="0">
+                  <p:tgtEl>
+                    <p:sldTgt/>
+                  </p:tgtEl>
+                </p:cond>
+              </p:nextCondLst>
+            </p:seq>
+          </p:childTnLst>
+        </p:cTn>
+      </p:par>
+    </p:tnLst>
+  </p:timing>
+</p:sld>
+</file>
+
+<file path=ppt/slides/slide54.xml><?xml version="1.0" encoding="utf-8"?>
+<p:sld xmlns:a="http://schemas.openxmlformats.org/drawingml/2006/main" xmlns:r="http://schemas.openxmlformats.org/officeDocument/2006/relationships" xmlns:p="http://schemas.openxmlformats.org/presentationml/2006/main">
+  <p:cSld>
+    <p:spTree>
+      <p:nvGrpSpPr>
+        <p:cNvPr id="1" name=""/>
+        <p:cNvGrpSpPr/>
+        <p:nvPr/>
+      </p:nvGrpSpPr>
+      <p:grpSpPr>
+        <a:xfrm>
+          <a:off x="0" y="0"/>
+          <a:ext cx="0" cy="0"/>
+          <a:chOff x="0" y="0"/>
+          <a:chExt cx="0" cy="0"/>
+        </a:xfrm>
+      </p:grpSpPr>
+      <p:sp>
+        <p:nvSpPr>
+          <p:cNvPr id="2" name="Title 1">
+            <a:extLst>
+              <a:ext uri="{FF2B5EF4-FFF2-40B4-BE49-F238E27FC236}">
+                <a16:creationId xmlns:a16="http://schemas.microsoft.com/office/drawing/2014/main" id="{335E744C-4531-4922-90A2-6BB5496B0B63}"/>
+              </a:ext>
+            </a:extLst>
+          </p:cNvPr>
+          <p:cNvSpPr>
+            <a:spLocks noGrp="1"/>
+          </p:cNvSpPr>
+          <p:nvPr>
+            <p:ph type="title"/>
+          </p:nvPr>
+        </p:nvSpPr>
+        <p:spPr/>
+        <p:txBody>
+          <a:bodyPr/>
+          <a:lstStyle/>
+          <a:p>
+            <a:r>
+              <a:rPr lang="en-US" dirty="0" err="1">
+                <a:latin typeface="Courier New" panose="02070309020205020404" pitchFamily="49" charset="0"/>
+                <a:cs typeface="Courier New" panose="02070309020205020404" pitchFamily="49" charset="0"/>
+              </a:rPr>
+              <a:t>grid_random</a:t>
+            </a:r>
+            <a:r>
+              <a:rPr lang="en-US" dirty="0">
+                <a:latin typeface="Courier New" panose="02070309020205020404" pitchFamily="49" charset="0"/>
+                <a:cs typeface="Courier New" panose="02070309020205020404" pitchFamily="49" charset="0"/>
+              </a:rPr>
+              <a:t>()</a:t>
+            </a:r>
+            <a:endParaRPr lang="en-US" dirty="0"/>
+          </a:p>
+        </p:txBody>
+      </p:sp>
+      <p:sp>
+        <p:nvSpPr>
+          <p:cNvPr id="3" name="Content Placeholder 2">
+            <a:extLst>
+              <a:ext uri="{FF2B5EF4-FFF2-40B4-BE49-F238E27FC236}">
+                <a16:creationId xmlns:a16="http://schemas.microsoft.com/office/drawing/2014/main" id="{9C8D96EA-7748-44C1-8559-C6CE06C7C747}"/>
+              </a:ext>
+            </a:extLst>
+          </p:cNvPr>
+          <p:cNvSpPr>
+            <a:spLocks noGrp="1"/>
+          </p:cNvSpPr>
+          <p:nvPr>
+            <p:ph idx="1"/>
+          </p:nvPr>
+        </p:nvSpPr>
+        <p:spPr>
+          <a:xfrm>
+            <a:off x="838199" y="1825625"/>
+            <a:ext cx="11149013" cy="4351338"/>
+          </a:xfrm>
+        </p:spPr>
+        <p:txBody>
+          <a:bodyPr/>
+          <a:lstStyle/>
+          <a:p>
+            <a:r>
+              <a:rPr lang="en-US" sz="1800" dirty="0"/>
+              <a:t>Uniformly samples the parameter space without taking into account the previously generated sample points</a:t>
+            </a:r>
+          </a:p>
+          <a:p>
+            <a:pPr marL="0" indent="0">
+              <a:buNone/>
+            </a:pPr>
+            <a:r>
+              <a:rPr lang="en-US" dirty="0" err="1"/>
+              <a:t>knn_grid_ran</a:t>
+            </a:r>
+            <a:r>
+              <a:rPr lang="en-US" dirty="0"/>
+              <a:t> &lt;- </a:t>
+            </a:r>
+            <a:r>
+              <a:rPr lang="en-US" dirty="0" err="1">
+                <a:solidFill>
+                  <a:srgbClr val="00B0F0"/>
+                </a:solidFill>
+              </a:rPr>
+              <a:t>grid_random</a:t>
+            </a:r>
+            <a:r>
+              <a:rPr lang="en-US" dirty="0"/>
+              <a:t>(</a:t>
+            </a:r>
+            <a:r>
+              <a:rPr lang="en-US" dirty="0" err="1"/>
+              <a:t>knn_params</a:t>
+            </a:r>
+            <a:r>
+              <a:rPr lang="en-US" dirty="0"/>
+              <a:t>, size = 50)</a:t>
+            </a:r>
+          </a:p>
+          <a:p>
+            <a:pPr marL="0" indent="0">
+              <a:buNone/>
+            </a:pPr>
+            <a:endParaRPr lang="en-US" sz="1400" dirty="0"/>
+          </a:p>
+          <a:p>
+            <a:pPr marL="0" indent="0">
+              <a:buNone/>
+            </a:pPr>
+            <a:endParaRPr lang="en-US" sz="1400" dirty="0"/>
+          </a:p>
+          <a:p>
+            <a:pPr marL="0" indent="0">
+              <a:buNone/>
+            </a:pPr>
+            <a:endParaRPr lang="en-US" sz="1400" dirty="0"/>
+          </a:p>
+          <a:p>
+            <a:pPr marL="0" indent="0">
+              <a:buNone/>
+            </a:pPr>
+            <a:r>
+              <a:rPr lang="en-US" sz="1800" dirty="0" err="1">
+                <a:solidFill>
+                  <a:srgbClr val="7030A0"/>
+                </a:solidFill>
+              </a:rPr>
+              <a:t>knn_grid_ran</a:t>
+            </a:r>
+            <a:r>
+              <a:rPr lang="en-US" sz="1800" dirty="0"/>
+              <a:t> %&gt;% </a:t>
+            </a:r>
+          </a:p>
+          <a:p>
+            <a:pPr marL="0" indent="0">
+              <a:buNone/>
+            </a:pPr>
+            <a:r>
+              <a:rPr lang="en-US" sz="1800" dirty="0"/>
+              <a:t>  </a:t>
+            </a:r>
+            <a:r>
+              <a:rPr lang="en-US" sz="1800" dirty="0" err="1"/>
+              <a:t>ggplot</a:t>
+            </a:r>
+            <a:r>
+              <a:rPr lang="en-US" sz="1800" dirty="0"/>
+              <a:t>(</a:t>
+            </a:r>
+            <a:r>
+              <a:rPr lang="en-US" sz="1800" dirty="0" err="1"/>
+              <a:t>aes</a:t>
+            </a:r>
+            <a:r>
+              <a:rPr lang="en-US" sz="1800" dirty="0"/>
+              <a:t>(neighbors, </a:t>
+            </a:r>
+            <a:r>
+              <a:rPr lang="en-US" sz="1800" dirty="0" err="1"/>
+              <a:t>dist_power</a:t>
+            </a:r>
+            <a:r>
+              <a:rPr lang="en-US" sz="1800" dirty="0"/>
+              <a:t>)) +</a:t>
+            </a:r>
+          </a:p>
+          <a:p>
+            <a:pPr marL="0" indent="0">
+              <a:buNone/>
+            </a:pPr>
+            <a:r>
+              <a:rPr lang="en-US" sz="1800" dirty="0"/>
+              <a:t>  </a:t>
+            </a:r>
+            <a:r>
+              <a:rPr lang="en-US" sz="1800" dirty="0" err="1"/>
+              <a:t>geom_point</a:t>
+            </a:r>
+            <a:r>
+              <a:rPr lang="en-US" sz="1800" dirty="0"/>
+              <a:t>(</a:t>
+            </a:r>
+            <a:r>
+              <a:rPr lang="en-US" sz="1800" dirty="0" err="1"/>
+              <a:t>aes</a:t>
+            </a:r>
+            <a:r>
+              <a:rPr lang="en-US" sz="1800" dirty="0"/>
+              <a:t>(color = </a:t>
+            </a:r>
+            <a:r>
+              <a:rPr lang="en-US" sz="1800" dirty="0" err="1"/>
+              <a:t>weight_func</a:t>
+            </a:r>
+            <a:r>
+              <a:rPr lang="en-US" sz="1800" dirty="0"/>
+              <a:t>))</a:t>
+            </a:r>
+          </a:p>
+        </p:txBody>
+      </p:sp>
+      <p:sp>
+        <p:nvSpPr>
+          <p:cNvPr id="4" name="Slide Number Placeholder 3">
+            <a:extLst>
+              <a:ext uri="{FF2B5EF4-FFF2-40B4-BE49-F238E27FC236}">
+                <a16:creationId xmlns:a16="http://schemas.microsoft.com/office/drawing/2014/main" id="{66843850-2D8D-46FD-826F-9280286150DB}"/>
+              </a:ext>
+            </a:extLst>
+          </p:cNvPr>
+          <p:cNvSpPr>
+            <a:spLocks noGrp="1"/>
+          </p:cNvSpPr>
+          <p:nvPr>
+            <p:ph type="sldNum" sz="quarter" idx="12"/>
+          </p:nvPr>
+        </p:nvSpPr>
+        <p:spPr/>
+        <p:txBody>
+          <a:bodyPr/>
+          <a:lstStyle/>
+          <a:p>
+            <a:fld id="{1FD78A80-B303-491C-AEE7-8281801B0C65}" type="slidenum">
+              <a:rPr lang="en-US" smtClean="0">
+                <a:solidFill>
+                  <a:prstClr val="black">
+                    <a:tint val="75000"/>
+                  </a:prstClr>
+                </a:solidFill>
+              </a:rPr>
+              <a:pPr/>
+              <a:t>54</a:t>
+            </a:fld>
+            <a:endParaRPr lang="en-US">
+              <a:solidFill>
+                <a:prstClr val="black">
+                  <a:tint val="75000"/>
+                </a:prstClr>
+              </a:solidFill>
+            </a:endParaRPr>
+          </a:p>
+        </p:txBody>
+      </p:sp>
+      <p:pic>
+        <p:nvPicPr>
+          <p:cNvPr id="5" name="Picture 4">
+            <a:extLst>
+              <a:ext uri="{FF2B5EF4-FFF2-40B4-BE49-F238E27FC236}">
+                <a16:creationId xmlns:a16="http://schemas.microsoft.com/office/drawing/2014/main" id="{CDAC7418-8C3F-49CA-A228-6A797580A400}"/>
+              </a:ext>
+            </a:extLst>
+          </p:cNvPr>
+          <p:cNvPicPr>
+            <a:picLocks noChangeAspect="1"/>
+          </p:cNvPicPr>
+          <p:nvPr/>
+        </p:nvPicPr>
+        <p:blipFill>
+          <a:blip r:embed="rId2"/>
+          <a:stretch>
+            <a:fillRect/>
+          </a:stretch>
+        </p:blipFill>
+        <p:spPr>
+          <a:xfrm>
+            <a:off x="4754880" y="2743200"/>
+            <a:ext cx="5410850" cy="4096512"/>
+          </a:xfrm>
+          <a:prstGeom prst="rect">
+            <a:avLst/>
+          </a:prstGeom>
+        </p:spPr>
+      </p:pic>
+    </p:spTree>
+    <p:extLst>
+      <p:ext uri="{BB962C8B-B14F-4D97-AF65-F5344CB8AC3E}">
+        <p14:creationId xmlns:p14="http://schemas.microsoft.com/office/powerpoint/2010/main" val="1121799630"/>
+      </p:ext>
+    </p:extLst>
+  </p:cSld>
+  <p:clrMapOvr>
+    <a:masterClrMapping/>
+  </p:clrMapOvr>
+  <p:timing>
+    <p:tnLst>
+      <p:par>
+        <p:cTn id="1" dur="indefinite" restart="never" nodeType="tmRoot">
+          <p:childTnLst>
+            <p:seq concurrent="1" nextAc="seek">
+              <p:cTn id="2" dur="indefinite" nodeType="mainSeq">
+                <p:childTnLst>
+                  <p:par>
+                    <p:cTn id="3" fill="hold">
+                      <p:stCondLst>
+                        <p:cond delay="indefinite"/>
+                      </p:stCondLst>
+                      <p:childTnLst>
+                        <p:par>
+                          <p:cTn id="4" fill="hold">
+                            <p:stCondLst>
+                              <p:cond delay="0"/>
+                            </p:stCondLst>
+                            <p:childTnLst>
+                              <p:par>
+                                <p:cTn id="5" presetID="1" presetClass="entr" presetSubtype="0" fill="hold" nodeType="clickEffect">
+                                  <p:stCondLst>
+                                    <p:cond delay="0"/>
+                                  </p:stCondLst>
+                                  <p:childTnLst>
+                                    <p:set>
+                                      <p:cBhvr>
+                                        <p:cTn id="6" dur="1" fill="hold">
+                                          <p:stCondLst>
+                                            <p:cond delay="0"/>
+                                          </p:stCondLst>
+                                        </p:cTn>
+                                        <p:tgtEl>
+                                          <p:spTgt spid="3">
+                                            <p:txEl>
+                                              <p:pRg st="1" end="1"/>
+                                            </p:txEl>
+                                          </p:spTgt>
+                                        </p:tgtEl>
+                                        <p:attrNameLst>
+                                          <p:attrName>style.visibility</p:attrName>
+                                        </p:attrNameLst>
+                                      </p:cBhvr>
+                                      <p:to>
+                                        <p:strVal val="visible"/>
+                                      </p:to>
+                                    </p:set>
+                                  </p:childTnLst>
+                                </p:cTn>
+                              </p:par>
+                            </p:childTnLst>
+                          </p:cTn>
+                        </p:par>
+                      </p:childTnLst>
+                    </p:cTn>
+                  </p:par>
+                  <p:par>
+                    <p:cTn id="7" fill="hold">
+                      <p:stCondLst>
+                        <p:cond delay="indefinite"/>
+                      </p:stCondLst>
+                      <p:childTnLst>
+                        <p:par>
+                          <p:cTn id="8" fill="hold">
+                            <p:stCondLst>
+                              <p:cond delay="0"/>
+                            </p:stCondLst>
+                            <p:childTnLst>
+                              <p:par>
+                                <p:cTn id="9" presetID="1" presetClass="entr" presetSubtype="0" fill="hold" nodeType="clickEffect">
+                                  <p:stCondLst>
+                                    <p:cond delay="0"/>
+                                  </p:stCondLst>
+                                  <p:childTnLst>
+                                    <p:set>
+                                      <p:cBhvr>
+                                        <p:cTn id="10" dur="1" fill="hold">
+                                          <p:stCondLst>
+                                            <p:cond delay="0"/>
+                                          </p:stCondLst>
+                                        </p:cTn>
+                                        <p:tgtEl>
+                                          <p:spTgt spid="3">
+                                            <p:txEl>
+                                              <p:pRg st="5" end="5"/>
+                                            </p:txEl>
+                                          </p:spTgt>
+                                        </p:tgtEl>
+                                        <p:attrNameLst>
+                                          <p:attrName>style.visibility</p:attrName>
+                                        </p:attrNameLst>
+                                      </p:cBhvr>
+                                      <p:to>
+                                        <p:strVal val="visible"/>
+                                      </p:to>
+                                    </p:set>
+                                  </p:childTnLst>
+                                </p:cTn>
+                              </p:par>
+                              <p:par>
+                                <p:cTn id="11" presetID="1" presetClass="entr" presetSubtype="0" fill="hold" nodeType="withEffect">
+                                  <p:stCondLst>
+                                    <p:cond delay="0"/>
+                                  </p:stCondLst>
+                                  <p:childTnLst>
+                                    <p:set>
+                                      <p:cBhvr>
+                                        <p:cTn id="12" dur="1" fill="hold">
+                                          <p:stCondLst>
+                                            <p:cond delay="0"/>
+                                          </p:stCondLst>
+                                        </p:cTn>
+                                        <p:tgtEl>
+                                          <p:spTgt spid="3">
+                                            <p:txEl>
+                                              <p:pRg st="6" end="6"/>
+                                            </p:txEl>
+                                          </p:spTgt>
+                                        </p:tgtEl>
+                                        <p:attrNameLst>
+                                          <p:attrName>style.visibility</p:attrName>
+                                        </p:attrNameLst>
+                                      </p:cBhvr>
+                                      <p:to>
+                                        <p:strVal val="visible"/>
+                                      </p:to>
+                                    </p:set>
+                                  </p:childTnLst>
+                                </p:cTn>
+                              </p:par>
+                              <p:par>
+                                <p:cTn id="13" presetID="1" presetClass="entr" presetSubtype="0" fill="hold" nodeType="withEffect">
+                                  <p:stCondLst>
+                                    <p:cond delay="0"/>
+                                  </p:stCondLst>
+                                  <p:childTnLst>
+                                    <p:set>
+                                      <p:cBhvr>
+                                        <p:cTn id="14" dur="1" fill="hold">
+                                          <p:stCondLst>
+                                            <p:cond delay="0"/>
+                                          </p:stCondLst>
+                                        </p:cTn>
+                                        <p:tgtEl>
+                                          <p:spTgt spid="3">
+                                            <p:txEl>
+                                              <p:pRg st="7" end="7"/>
+                                            </p:txEl>
+                                          </p:spTgt>
+                                        </p:tgtEl>
+                                        <p:attrNameLst>
+                                          <p:attrName>style.visibility</p:attrName>
+                                        </p:attrNameLst>
+                                      </p:cBhvr>
+                                      <p:to>
+                                        <p:strVal val="visible"/>
+                                      </p:to>
+                                    </p:set>
+                                  </p:childTnLst>
+                                </p:cTn>
+                              </p:par>
+                              <p:par>
+                                <p:cTn id="15" presetID="1" presetClass="entr" presetSubtype="0" fill="hold" nodeType="withEffect">
+                                  <p:stCondLst>
+                                    <p:cond delay="0"/>
+                                  </p:stCondLst>
+                                  <p:childTnLst>
+                                    <p:set>
+                                      <p:cBhvr>
+                                        <p:cTn id="16" dur="1" fill="hold">
+                                          <p:stCondLst>
+                                            <p:cond delay="0"/>
+                                          </p:stCondLst>
+                                        </p:cTn>
+                                        <p:tgtEl>
+                                          <p:spTgt spid="5"/>
+                                        </p:tgtEl>
+                                        <p:attrNameLst>
+                                          <p:attrName>style.visibility</p:attrName>
+                                        </p:attrNameLst>
+                                      </p:cBhvr>
+                                      <p:to>
+                                        <p:strVal val="visible"/>
+                                      </p:to>
+                                    </p:set>
+                                  </p:childTnLst>
+                                </p:cTn>
+                              </p:par>
+                            </p:childTnLst>
+                          </p:cTn>
+                        </p:par>
+                      </p:childTnLst>
+                    </p:cTn>
+                  </p:par>
+                </p:childTnLst>
+              </p:cTn>
+              <p:prevCondLst>
+                <p:cond evt="onPrev" delay="0">
+                  <p:tgtEl>
+                    <p:sldTgt/>
+                  </p:tgtEl>
+                </p:cond>
+              </p:prevCondLst>
+              <p:nextCondLst>
+                <p:cond evt="onNext" delay="0">
+                  <p:tgtEl>
+                    <p:sldTgt/>
+                  </p:tgtEl>
+                </p:cond>
+              </p:nextCondLst>
+            </p:seq>
+          </p:childTnLst>
+        </p:cTn>
+      </p:par>
+    </p:tnLst>
+  </p:timing>
+</p:sld>
+</file>
+
+<file path=ppt/slides/slide55.xml><?xml version="1.0" encoding="utf-8"?>
+<p:sld xmlns:a="http://schemas.openxmlformats.org/drawingml/2006/main" xmlns:r="http://schemas.openxmlformats.org/officeDocument/2006/relationships" xmlns:p="http://schemas.openxmlformats.org/presentationml/2006/main">
+  <p:cSld>
+    <p:spTree>
+      <p:nvGrpSpPr>
+        <p:cNvPr id="1" name=""/>
+        <p:cNvGrpSpPr/>
+        <p:nvPr/>
+      </p:nvGrpSpPr>
+      <p:grpSpPr>
+        <a:xfrm>
+          <a:off x="0" y="0"/>
+          <a:ext cx="0" cy="0"/>
+          <a:chOff x="0" y="0"/>
+          <a:chExt cx="0" cy="0"/>
+        </a:xfrm>
+      </p:grpSpPr>
+      <p:sp>
+        <p:nvSpPr>
+          <p:cNvPr id="2" name="Title 1">
+            <a:extLst>
+              <a:ext uri="{FF2B5EF4-FFF2-40B4-BE49-F238E27FC236}">
+                <a16:creationId xmlns:a16="http://schemas.microsoft.com/office/drawing/2014/main" id="{335E744C-4531-4922-90A2-6BB5496B0B63}"/>
+              </a:ext>
+            </a:extLst>
+          </p:cNvPr>
+          <p:cNvSpPr>
+            <a:spLocks noGrp="1"/>
+          </p:cNvSpPr>
+          <p:nvPr>
+            <p:ph type="title"/>
+          </p:nvPr>
+        </p:nvSpPr>
+        <p:spPr/>
+        <p:txBody>
+          <a:bodyPr/>
+          <a:lstStyle/>
+          <a:p>
+            <a:r>
+              <a:rPr lang="en-US" dirty="0" err="1">
+                <a:latin typeface="Courier New" panose="02070309020205020404" pitchFamily="49" charset="0"/>
+                <a:cs typeface="Courier New" panose="02070309020205020404" pitchFamily="49" charset="0"/>
+              </a:rPr>
               <a:t>grid_latin_hypercube</a:t>
             </a:r>
             <a:r>
@@ -26774,7 +27122,7 @@
                 </a:solidFill>
               </a:rPr>
               <a:pPr/>
-              <a:t>53</a:t>
+              <a:t>55</a:t>
             </a:fld>
             <a:endParaRPr lang="en-US">
               <a:solidFill>
@@ -27068,7 +27416,412 @@
 </p:sld>
 </file>
 
-<file path=ppt/slides/slide54.xml><?xml version="1.0" encoding="utf-8"?>
+<file path=ppt/slides/slide56.xml><?xml version="1.0" encoding="utf-8"?>
+<p:sld xmlns:a="http://schemas.openxmlformats.org/drawingml/2006/main" xmlns:r="http://schemas.openxmlformats.org/officeDocument/2006/relationships" xmlns:p="http://schemas.openxmlformats.org/presentationml/2006/main">
+  <p:cSld>
+    <p:spTree>
+      <p:nvGrpSpPr>
+        <p:cNvPr id="1" name=""/>
+        <p:cNvGrpSpPr/>
+        <p:nvPr/>
+      </p:nvGrpSpPr>
+      <p:grpSpPr>
+        <a:xfrm>
+          <a:off x="0" y="0"/>
+          <a:ext cx="0" cy="0"/>
+          <a:chOff x="0" y="0"/>
+          <a:chExt cx="0" cy="0"/>
+        </a:xfrm>
+      </p:grpSpPr>
+      <p:sp>
+        <p:nvSpPr>
+          <p:cNvPr id="2" name="Title 1">
+            <a:extLst>
+              <a:ext uri="{FF2B5EF4-FFF2-40B4-BE49-F238E27FC236}">
+                <a16:creationId xmlns:a16="http://schemas.microsoft.com/office/drawing/2014/main" id="{2864D812-1DB7-463E-B17B-9167C0456313}"/>
+              </a:ext>
+            </a:extLst>
+          </p:cNvPr>
+          <p:cNvSpPr>
+            <a:spLocks noGrp="1"/>
+          </p:cNvSpPr>
+          <p:nvPr>
+            <p:ph type="title"/>
+          </p:nvPr>
+        </p:nvSpPr>
+        <p:spPr/>
+        <p:txBody>
+          <a:bodyPr/>
+          <a:lstStyle/>
+          <a:p>
+            <a:r>
+              <a:rPr lang="en-US"/>
+              <a:t>Iterative searches</a:t>
+            </a:r>
+            <a:endParaRPr lang="en-US" dirty="0"/>
+          </a:p>
+        </p:txBody>
+      </p:sp>
+      <p:sp>
+        <p:nvSpPr>
+          <p:cNvPr id="3" name="Content Placeholder 2">
+            <a:extLst>
+              <a:ext uri="{FF2B5EF4-FFF2-40B4-BE49-F238E27FC236}">
+                <a16:creationId xmlns:a16="http://schemas.microsoft.com/office/drawing/2014/main" id="{ADA03F1E-D3FC-4536-94EC-D56AE18540F9}"/>
+              </a:ext>
+            </a:extLst>
+          </p:cNvPr>
+          <p:cNvSpPr>
+            <a:spLocks noGrp="1"/>
+          </p:cNvSpPr>
+          <p:nvPr>
+            <p:ph idx="1"/>
+          </p:nvPr>
+        </p:nvSpPr>
+        <p:spPr/>
+        <p:txBody>
+          <a:bodyPr>
+            <a:normAutofit/>
+          </a:bodyPr>
+          <a:lstStyle/>
+          <a:p>
+            <a:r>
+              <a:rPr lang="en-US" dirty="0"/>
+              <a:t>grid searches</a:t>
+            </a:r>
+          </a:p>
+          <a:p>
+            <a:pPr lvl="1"/>
+            <a:r>
+              <a:rPr lang="en-US" dirty="0"/>
+              <a:t>candidate values need to be pre-defined and don't learn from previous results</a:t>
+            </a:r>
+          </a:p>
+          <a:p>
+            <a:pPr lvl="1"/>
+            <a:r>
+              <a:rPr lang="en-US" dirty="0"/>
+              <a:t>don't know the best values until all the computations are finished</a:t>
+            </a:r>
+          </a:p>
+          <a:p>
+            <a:pPr lvl="1"/>
+            <a:r>
+              <a:rPr lang="en-US" dirty="0"/>
+              <a:t>difficult to efficiently cover the parameter space with a lot of parameters</a:t>
+            </a:r>
+          </a:p>
+          <a:p>
+            <a:pPr lvl="1"/>
+            <a:r>
+              <a:rPr lang="en-US" dirty="0"/>
+              <a:t>easily optimized via parallel processing</a:t>
+            </a:r>
+          </a:p>
+          <a:p>
+            <a:r>
+              <a:rPr lang="en-US" dirty="0"/>
+              <a:t>iterative searches</a:t>
+            </a:r>
+          </a:p>
+          <a:p>
+            <a:pPr lvl="1"/>
+            <a:r>
+              <a:rPr lang="en-US" dirty="0"/>
+              <a:t>builds a probability model to predict better parameters to test based on previous results</a:t>
+            </a:r>
+          </a:p>
+          <a:p>
+            <a:pPr lvl="1"/>
+            <a:r>
+              <a:rPr lang="en-US" dirty="0"/>
+              <a:t>more flexible in how the parameter space is searched</a:t>
+            </a:r>
+          </a:p>
+          <a:p>
+            <a:pPr lvl="1"/>
+            <a:r>
+              <a:rPr lang="en-US" dirty="0"/>
+              <a:t>less opportunities for efficiency optimizations</a:t>
+            </a:r>
+          </a:p>
+          <a:p>
+            <a:pPr lvl="1"/>
+            <a:endParaRPr lang="en-US" dirty="0"/>
+          </a:p>
+        </p:txBody>
+      </p:sp>
+      <p:sp>
+        <p:nvSpPr>
+          <p:cNvPr id="4" name="Slide Number Placeholder 3">
+            <a:extLst>
+              <a:ext uri="{FF2B5EF4-FFF2-40B4-BE49-F238E27FC236}">
+                <a16:creationId xmlns:a16="http://schemas.microsoft.com/office/drawing/2014/main" id="{2ABE7127-04D5-41BC-A043-155B3057F404}"/>
+              </a:ext>
+            </a:extLst>
+          </p:cNvPr>
+          <p:cNvSpPr>
+            <a:spLocks noGrp="1"/>
+          </p:cNvSpPr>
+          <p:nvPr>
+            <p:ph type="sldNum" sz="quarter" idx="12"/>
+          </p:nvPr>
+        </p:nvSpPr>
+        <p:spPr/>
+        <p:txBody>
+          <a:bodyPr/>
+          <a:lstStyle/>
+          <a:p>
+            <a:fld id="{1FD78A80-B303-491C-AEE7-8281801B0C65}" type="slidenum">
+              <a:rPr lang="en-US" smtClean="0">
+                <a:solidFill>
+                  <a:prstClr val="black">
+                    <a:tint val="75000"/>
+                  </a:prstClr>
+                </a:solidFill>
+              </a:rPr>
+              <a:pPr/>
+              <a:t>56</a:t>
+            </a:fld>
+            <a:endParaRPr lang="en-US">
+              <a:solidFill>
+                <a:prstClr val="black">
+                  <a:tint val="75000"/>
+                </a:prstClr>
+              </a:solidFill>
+            </a:endParaRPr>
+          </a:p>
+        </p:txBody>
+      </p:sp>
+    </p:spTree>
+    <p:extLst>
+      <p:ext uri="{BB962C8B-B14F-4D97-AF65-F5344CB8AC3E}">
+        <p14:creationId xmlns:p14="http://schemas.microsoft.com/office/powerpoint/2010/main" val="2927535864"/>
+      </p:ext>
+    </p:extLst>
+  </p:cSld>
+  <p:clrMapOvr>
+    <a:masterClrMapping/>
+  </p:clrMapOvr>
+</p:sld>
+</file>
+
+<file path=ppt/slides/slide57.xml><?xml version="1.0" encoding="utf-8"?>
+<p:sld xmlns:a="http://schemas.openxmlformats.org/drawingml/2006/main" xmlns:r="http://schemas.openxmlformats.org/officeDocument/2006/relationships" xmlns:p="http://schemas.openxmlformats.org/presentationml/2006/main">
+  <p:cSld>
+    <p:spTree>
+      <p:nvGrpSpPr>
+        <p:cNvPr id="1" name=""/>
+        <p:cNvGrpSpPr/>
+        <p:nvPr/>
+      </p:nvGrpSpPr>
+      <p:grpSpPr>
+        <a:xfrm>
+          <a:off x="0" y="0"/>
+          <a:ext cx="0" cy="0"/>
+          <a:chOff x="0" y="0"/>
+          <a:chExt cx="0" cy="0"/>
+        </a:xfrm>
+      </p:grpSpPr>
+      <p:sp>
+        <p:nvSpPr>
+          <p:cNvPr id="2" name="Title 1">
+            <a:extLst>
+              <a:ext uri="{FF2B5EF4-FFF2-40B4-BE49-F238E27FC236}">
+                <a16:creationId xmlns:a16="http://schemas.microsoft.com/office/drawing/2014/main" id="{6A730265-7720-4F8B-9A6D-3E45AB3B113D}"/>
+              </a:ext>
+            </a:extLst>
+          </p:cNvPr>
+          <p:cNvSpPr>
+            <a:spLocks noGrp="1"/>
+          </p:cNvSpPr>
+          <p:nvPr>
+            <p:ph type="title"/>
+          </p:nvPr>
+        </p:nvSpPr>
+        <p:spPr/>
+        <p:txBody>
+          <a:bodyPr/>
+          <a:lstStyle/>
+          <a:p>
+            <a:r>
+              <a:rPr lang="en-US" dirty="0"/>
+              <a:t>List of iterative searches</a:t>
+            </a:r>
+          </a:p>
+        </p:txBody>
+      </p:sp>
+      <p:sp>
+        <p:nvSpPr>
+          <p:cNvPr id="3" name="Content Placeholder 2">
+            <a:extLst>
+              <a:ext uri="{FF2B5EF4-FFF2-40B4-BE49-F238E27FC236}">
+                <a16:creationId xmlns:a16="http://schemas.microsoft.com/office/drawing/2014/main" id="{AEA04F8F-925D-45E1-8A0B-99A3EC03BCB8}"/>
+              </a:ext>
+            </a:extLst>
+          </p:cNvPr>
+          <p:cNvSpPr>
+            <a:spLocks noGrp="1"/>
+          </p:cNvSpPr>
+          <p:nvPr>
+            <p:ph idx="1"/>
+          </p:nvPr>
+        </p:nvSpPr>
+        <p:spPr>
+          <a:xfrm>
+            <a:off x="838200" y="1825625"/>
+            <a:ext cx="10515600" cy="4775200"/>
+          </a:xfrm>
+        </p:spPr>
+        <p:txBody>
+          <a:bodyPr>
+            <a:normAutofit/>
+          </a:bodyPr>
+          <a:lstStyle/>
+          <a:p>
+            <a:r>
+              <a:rPr lang="en-US" dirty="0"/>
+              <a:t>nonlinear search methods (computationally expensive)</a:t>
+            </a:r>
+          </a:p>
+          <a:p>
+            <a:pPr lvl="1"/>
+            <a:r>
+              <a:rPr lang="en-US" dirty="0" err="1"/>
+              <a:t>Nelder</a:t>
+            </a:r>
+            <a:r>
+              <a:rPr lang="en-US" dirty="0"/>
+              <a:t>-Mead simplex search procedure</a:t>
+            </a:r>
+          </a:p>
+          <a:p>
+            <a:pPr lvl="1"/>
+            <a:r>
+              <a:rPr lang="en-US" dirty="0"/>
+              <a:t>simulated annealing</a:t>
+            </a:r>
+          </a:p>
+          <a:p>
+            <a:pPr lvl="1"/>
+            <a:r>
+              <a:rPr lang="en-US" dirty="0"/>
+              <a:t>genetic algorithms</a:t>
+            </a:r>
+          </a:p>
+          <a:p>
+            <a:r>
+              <a:rPr lang="en-US" dirty="0"/>
+              <a:t>Bayesian optimization</a:t>
+            </a:r>
+          </a:p>
+          <a:p>
+            <a:pPr lvl="1"/>
+            <a:r>
+              <a:rPr lang="en-US" dirty="0"/>
+              <a:t>an initial pool of samples are evaluated using grid or random search</a:t>
+            </a:r>
+          </a:p>
+          <a:p>
+            <a:pPr lvl="1"/>
+            <a:r>
+              <a:rPr lang="en-US" dirty="0"/>
+              <a:t>previous parameters used as predictors and performance measure used as the outcome</a:t>
+            </a:r>
+          </a:p>
+          <a:p>
+            <a:pPr lvl="1"/>
+            <a:r>
+              <a:rPr lang="en-US" dirty="0"/>
+              <a:t>Bayesian optimization process searches the grid to find the "best" new parameters to evaluate using resampling</a:t>
+            </a:r>
+          </a:p>
+          <a:p>
+            <a:pPr lvl="1"/>
+            <a:r>
+              <a:rPr lang="en-US" dirty="0">
+                <a:latin typeface="Courier New" panose="02070309020205020404" pitchFamily="49" charset="0"/>
+                <a:cs typeface="Courier New" panose="02070309020205020404" pitchFamily="49" charset="0"/>
+              </a:rPr>
+              <a:t>{tune}</a:t>
+            </a:r>
+            <a:r>
+              <a:rPr lang="en-US" dirty="0"/>
+              <a:t> function is </a:t>
+            </a:r>
+            <a:r>
+              <a:rPr lang="en-US" dirty="0" err="1">
+                <a:latin typeface="Courier New" panose="02070309020205020404" pitchFamily="49" charset="0"/>
+                <a:cs typeface="Courier New" panose="02070309020205020404" pitchFamily="49" charset="0"/>
+              </a:rPr>
+              <a:t>tune_bayes</a:t>
+            </a:r>
+            <a:r>
+              <a:rPr lang="en-US" dirty="0">
+                <a:latin typeface="Courier New" panose="02070309020205020404" pitchFamily="49" charset="0"/>
+                <a:cs typeface="Courier New" panose="02070309020205020404" pitchFamily="49" charset="0"/>
+              </a:rPr>
+              <a:t>()</a:t>
+            </a:r>
+          </a:p>
+        </p:txBody>
+      </p:sp>
+      <p:sp>
+        <p:nvSpPr>
+          <p:cNvPr id="4" name="Slide Number Placeholder 3">
+            <a:extLst>
+              <a:ext uri="{FF2B5EF4-FFF2-40B4-BE49-F238E27FC236}">
+                <a16:creationId xmlns:a16="http://schemas.microsoft.com/office/drawing/2014/main" id="{CFD5B3BA-1962-4F3F-B245-346C3614CE40}"/>
+              </a:ext>
+            </a:extLst>
+          </p:cNvPr>
+          <p:cNvSpPr>
+            <a:spLocks noGrp="1"/>
+          </p:cNvSpPr>
+          <p:nvPr>
+            <p:ph type="sldNum" sz="quarter" idx="12"/>
+          </p:nvPr>
+        </p:nvSpPr>
+        <p:spPr/>
+        <p:txBody>
+          <a:bodyPr/>
+          <a:lstStyle/>
+          <a:p>
+            <a:fld id="{1FD78A80-B303-491C-AEE7-8281801B0C65}" type="slidenum">
+              <a:rPr lang="en-US" smtClean="0">
+                <a:solidFill>
+                  <a:prstClr val="black">
+                    <a:tint val="75000"/>
+                  </a:prstClr>
+                </a:solidFill>
+              </a:rPr>
+              <a:pPr/>
+              <a:t>57</a:t>
+            </a:fld>
+            <a:endParaRPr lang="en-US">
+              <a:solidFill>
+                <a:prstClr val="black">
+                  <a:tint val="75000"/>
+                </a:prstClr>
+              </a:solidFill>
+            </a:endParaRPr>
+          </a:p>
+        </p:txBody>
+      </p:sp>
+    </p:spTree>
+    <p:extLst>
+      <p:ext uri="{BB962C8B-B14F-4D97-AF65-F5344CB8AC3E}">
+        <p14:creationId xmlns:p14="http://schemas.microsoft.com/office/powerpoint/2010/main" val="2270732851"/>
+      </p:ext>
+    </p:extLst>
+  </p:cSld>
+  <p:clrMapOvr>
+    <a:masterClrMapping/>
+  </p:clrMapOvr>
+</p:sld>
+</file>
+
+<file path=ppt/slides/slide58.xml><?xml version="1.0" encoding="utf-8"?>
 <p:sld xmlns:a="http://schemas.openxmlformats.org/drawingml/2006/main" xmlns:r="http://schemas.openxmlformats.org/officeDocument/2006/relationships" xmlns:p="http://schemas.openxmlformats.org/presentationml/2006/main">
   <p:cSld>
     <p:bg>
@@ -27191,7 +27944,7 @@
                 <a:tabLst/>
                 <a:defRPr/>
               </a:pPr>
-              <a:t>54</a:t>
+              <a:t>58</a:t>
             </a:fld>
             <a:endParaRPr kumimoji="0" lang="en-US" sz="1200" b="0" i="0" u="none" strike="noStrike" kern="1200" cap="none" spc="0" normalizeH="0" baseline="0" noProof="0">
               <a:ln>
@@ -27225,7 +27978,7 @@
 </p:sld>
 </file>
 
-<file path=ppt/slides/slide55.xml><?xml version="1.0" encoding="utf-8"?>
+<file path=ppt/slides/slide59.xml><?xml version="1.0" encoding="utf-8"?>
 <p:sld xmlns:a="http://schemas.openxmlformats.org/drawingml/2006/main" xmlns:r="http://schemas.openxmlformats.org/officeDocument/2006/relationships" xmlns:p="http://schemas.openxmlformats.org/presentationml/2006/main">
   <p:cSld>
     <p:spTree>
@@ -27734,7 +28487,7 @@
                 </a:solidFill>
               </a:rPr>
               <a:pPr/>
-              <a:t>55</a:t>
+              <a:t>59</a:t>
             </a:fld>
             <a:endParaRPr lang="en-US">
               <a:solidFill>
@@ -27993,7 +28746,263 @@
 </p:sld>
 </file>
 
-<file path=ppt/slides/slide56.xml><?xml version="1.0" encoding="utf-8"?>
+<file path=ppt/slides/slide6.xml><?xml version="1.0" encoding="utf-8"?>
+<p:sld xmlns:a="http://schemas.openxmlformats.org/drawingml/2006/main" xmlns:r="http://schemas.openxmlformats.org/officeDocument/2006/relationships" xmlns:p="http://schemas.openxmlformats.org/presentationml/2006/main">
+  <p:cSld>
+    <p:spTree>
+      <p:nvGrpSpPr>
+        <p:cNvPr id="1" name=""/>
+        <p:cNvGrpSpPr/>
+        <p:nvPr/>
+      </p:nvGrpSpPr>
+      <p:grpSpPr>
+        <a:xfrm>
+          <a:off x="0" y="0"/>
+          <a:ext cx="0" cy="0"/>
+          <a:chOff x="0" y="0"/>
+          <a:chExt cx="0" cy="0"/>
+        </a:xfrm>
+      </p:grpSpPr>
+      <p:sp>
+        <p:nvSpPr>
+          <p:cNvPr id="2" name="Title 1">
+            <a:extLst>
+              <a:ext uri="{FF2B5EF4-FFF2-40B4-BE49-F238E27FC236}">
+                <a16:creationId xmlns:a16="http://schemas.microsoft.com/office/drawing/2014/main" id="{CC688E9B-5F4F-4BBF-8471-D3FDE82C6EC4}"/>
+              </a:ext>
+            </a:extLst>
+          </p:cNvPr>
+          <p:cNvSpPr>
+            <a:spLocks noGrp="1"/>
+          </p:cNvSpPr>
+          <p:nvPr>
+            <p:ph type="title"/>
+          </p:nvPr>
+        </p:nvSpPr>
+        <p:spPr/>
+        <p:txBody>
+          <a:bodyPr/>
+          <a:lstStyle/>
+          <a:p>
+            <a:r>
+              <a:rPr lang="en-US" i="1" dirty="0"/>
+              <a:t>K</a:t>
+            </a:r>
+            <a:r>
+              <a:rPr lang="en-US" dirty="0"/>
+              <a:t>-nearest neighbors (</a:t>
+            </a:r>
+            <a:r>
+              <a:rPr lang="en-US" i="1" dirty="0"/>
+              <a:t>K</a:t>
+            </a:r>
+            <a:r>
+              <a:rPr lang="en-US" dirty="0"/>
+              <a:t>NN)</a:t>
+            </a:r>
+          </a:p>
+        </p:txBody>
+      </p:sp>
+      <p:sp>
+        <p:nvSpPr>
+          <p:cNvPr id="3" name="Content Placeholder 2">
+            <a:extLst>
+              <a:ext uri="{FF2B5EF4-FFF2-40B4-BE49-F238E27FC236}">
+                <a16:creationId xmlns:a16="http://schemas.microsoft.com/office/drawing/2014/main" id="{EA80F638-697C-4638-90E9-8261B8DC4D87}"/>
+              </a:ext>
+            </a:extLst>
+          </p:cNvPr>
+          <p:cNvSpPr>
+            <a:spLocks noGrp="1"/>
+          </p:cNvSpPr>
+          <p:nvPr>
+            <p:ph idx="1"/>
+          </p:nvPr>
+        </p:nvSpPr>
+        <p:spPr>
+          <a:xfrm>
+            <a:off x="838200" y="1825624"/>
+            <a:ext cx="10515600" cy="4742955"/>
+          </a:xfrm>
+        </p:spPr>
+        <p:txBody>
+          <a:bodyPr>
+            <a:normAutofit/>
+          </a:bodyPr>
+          <a:lstStyle/>
+          <a:p>
+            <a:r>
+              <a:rPr lang="en-US" i="1" dirty="0"/>
+              <a:t>K</a:t>
+            </a:r>
+            <a:r>
+              <a:rPr lang="en-US" dirty="0"/>
+              <a:t>NN is a</a:t>
+            </a:r>
+            <a:r>
+              <a:rPr lang="en-US" i="1" dirty="0"/>
+              <a:t> </a:t>
+            </a:r>
+            <a:r>
+              <a:rPr lang="en-US" dirty="0"/>
+              <a:t>nonparametric method </a:t>
+            </a:r>
+          </a:p>
+          <a:p>
+            <a:pPr lvl="1"/>
+            <a:r>
+              <a:rPr lang="en-US" dirty="0"/>
+              <a:t>Unlike parametric models, nonparametric models:</a:t>
+            </a:r>
+          </a:p>
+          <a:p>
+            <a:pPr lvl="2"/>
+            <a:r>
+              <a:rPr lang="en-US" dirty="0"/>
+              <a:t>cannot be described by a fixed number of parameters that are being adjusted to the training set</a:t>
+            </a:r>
+          </a:p>
+          <a:p>
+            <a:pPr lvl="2"/>
+            <a:r>
+              <a:rPr lang="en-US" dirty="0"/>
+              <a:t>the model structure is set </a:t>
+            </a:r>
+            <a:r>
+              <a:rPr lang="en-US" i="1" dirty="0"/>
+              <a:t>a priori </a:t>
+            </a:r>
+            <a:r>
+              <a:rPr lang="en-US" dirty="0"/>
+              <a:t>(and not defined by the training data)</a:t>
+            </a:r>
+          </a:p>
+          <a:p>
+            <a:pPr lvl="2"/>
+            <a:r>
+              <a:rPr lang="en-US" dirty="0"/>
+              <a:t>do not assume that the data follow certain probability distributions (except Bayesian nonparametric methods)</a:t>
+            </a:r>
+          </a:p>
+          <a:p>
+            <a:pPr lvl="2"/>
+            <a:r>
+              <a:rPr lang="en-US" dirty="0"/>
+              <a:t>make fewer assumptions about the data (than parametric methods)</a:t>
+            </a:r>
+          </a:p>
+          <a:p>
+            <a:r>
+              <a:rPr lang="en-US" i="1" dirty="0"/>
+              <a:t>K</a:t>
+            </a:r>
+            <a:r>
+              <a:rPr lang="en-US" dirty="0"/>
+              <a:t>NN uses lazy learning (or instance-based learning) </a:t>
+            </a:r>
+          </a:p>
+          <a:p>
+            <a:pPr lvl="1"/>
+            <a:r>
+              <a:rPr lang="en-US" dirty="0"/>
+              <a:t>There is no training or model fitting stage</a:t>
+            </a:r>
+          </a:p>
+          <a:p>
+            <a:pPr lvl="2"/>
+            <a:r>
+              <a:rPr lang="en-US" dirty="0"/>
+              <a:t>A </a:t>
+            </a:r>
+            <a:r>
+              <a:rPr lang="en-US" i="1" dirty="0"/>
+              <a:t>K</a:t>
+            </a:r>
+            <a:r>
+              <a:rPr lang="en-US" dirty="0"/>
+              <a:t>NN model literally stores the training data and uses it only at prediction time</a:t>
+            </a:r>
+          </a:p>
+          <a:p>
+            <a:pPr lvl="2"/>
+            <a:r>
+              <a:rPr lang="en-US" dirty="0"/>
+              <a:t>Thus, each training instance represents a parameter in </a:t>
+            </a:r>
+            <a:r>
+              <a:rPr lang="en-US" i="1" dirty="0"/>
+              <a:t>K</a:t>
+            </a:r>
+            <a:r>
+              <a:rPr lang="en-US" dirty="0"/>
+              <a:t>NN model </a:t>
+            </a:r>
+          </a:p>
+          <a:p>
+            <a:pPr lvl="2"/>
+            <a:r>
+              <a:rPr lang="en-US" dirty="0"/>
+              <a:t>Computationally inefficient</a:t>
+            </a:r>
+          </a:p>
+        </p:txBody>
+      </p:sp>
+      <p:sp>
+        <p:nvSpPr>
+          <p:cNvPr id="4" name="Slide Number Placeholder 3">
+            <a:extLst>
+              <a:ext uri="{FF2B5EF4-FFF2-40B4-BE49-F238E27FC236}">
+                <a16:creationId xmlns:a16="http://schemas.microsoft.com/office/drawing/2014/main" id="{CF3B792C-65E4-42A8-865B-B4C20E3046ED}"/>
+              </a:ext>
+            </a:extLst>
+          </p:cNvPr>
+          <p:cNvSpPr>
+            <a:spLocks noGrp="1"/>
+          </p:cNvSpPr>
+          <p:nvPr>
+            <p:ph type="sldNum" sz="quarter" idx="12"/>
+          </p:nvPr>
+        </p:nvSpPr>
+        <p:spPr/>
+        <p:txBody>
+          <a:bodyPr/>
+          <a:lstStyle/>
+          <a:p>
+            <a:fld id="{1FD78A80-B303-491C-AEE7-8281801B0C65}" type="slidenum">
+              <a:rPr lang="en-US" smtClean="0">
+                <a:solidFill>
+                  <a:prstClr val="black">
+                    <a:tint val="75000"/>
+                  </a:prstClr>
+                </a:solidFill>
+              </a:rPr>
+              <a:pPr/>
+              <a:t>6</a:t>
+            </a:fld>
+            <a:endParaRPr lang="en-US">
+              <a:solidFill>
+                <a:prstClr val="black">
+                  <a:tint val="75000"/>
+                </a:prstClr>
+              </a:solidFill>
+            </a:endParaRPr>
+          </a:p>
+        </p:txBody>
+      </p:sp>
+    </p:spTree>
+    <p:extLst>
+      <p:ext uri="{BB962C8B-B14F-4D97-AF65-F5344CB8AC3E}">
+        <p14:creationId xmlns:p14="http://schemas.microsoft.com/office/powerpoint/2010/main" val="1964165862"/>
+      </p:ext>
+    </p:extLst>
+  </p:cSld>
+  <p:clrMapOvr>
+    <a:masterClrMapping/>
+  </p:clrMapOvr>
+</p:sld>
+</file>
+
+<file path=ppt/slides/slide60.xml><?xml version="1.0" encoding="utf-8"?>
 <p:sld xmlns:a="http://schemas.openxmlformats.org/drawingml/2006/main" xmlns:r="http://schemas.openxmlformats.org/officeDocument/2006/relationships" xmlns:p="http://schemas.openxmlformats.org/presentationml/2006/main">
   <p:cSld>
     <p:spTree>
@@ -28393,7 +29402,7 @@
                 </a:solidFill>
               </a:rPr>
               <a:pPr/>
-              <a:t>56</a:t>
+              <a:t>60</a:t>
             </a:fld>
             <a:endParaRPr lang="en-US">
               <a:solidFill>
@@ -28745,7 +29754,7 @@
 </p:sld>
 </file>
 
-<file path=ppt/slides/slide57.xml><?xml version="1.0" encoding="utf-8"?>
+<file path=ppt/slides/slide61.xml><?xml version="1.0" encoding="utf-8"?>
 <p:sld xmlns:a="http://schemas.openxmlformats.org/drawingml/2006/main" xmlns:r="http://schemas.openxmlformats.org/officeDocument/2006/relationships" xmlns:p="http://schemas.openxmlformats.org/presentationml/2006/main">
   <p:cSld>
     <p:spTree>
@@ -29530,7 +30539,7 @@
                 </a:solidFill>
               </a:rPr>
               <a:pPr/>
-              <a:t>57</a:t>
+              <a:t>61</a:t>
             </a:fld>
             <a:endParaRPr lang="en-US">
               <a:solidFill>
@@ -29555,7 +30564,7 @@
 </p:sld>
 </file>
 
-<file path=ppt/slides/slide58.xml><?xml version="1.0" encoding="utf-8"?>
+<file path=ppt/slides/slide62.xml><?xml version="1.0" encoding="utf-8"?>
 <p:sld xmlns:a="http://schemas.openxmlformats.org/drawingml/2006/main" xmlns:r="http://schemas.openxmlformats.org/officeDocument/2006/relationships" xmlns:p="http://schemas.openxmlformats.org/presentationml/2006/main">
   <p:cSld>
     <p:spTree>
@@ -30220,7 +31229,7 @@
                 </a:solidFill>
               </a:rPr>
               <a:pPr/>
-              <a:t>58</a:t>
+              <a:t>62</a:t>
             </a:fld>
             <a:endParaRPr lang="en-US">
               <a:solidFill>
@@ -30245,7 +31254,7 @@
 </p:sld>
 </file>
 
-<file path=ppt/slides/slide59.xml><?xml version="1.0" encoding="utf-8"?>
+<file path=ppt/slides/slide63.xml><?xml version="1.0" encoding="utf-8"?>
 <p:sld xmlns:a="http://schemas.openxmlformats.org/drawingml/2006/main" xmlns:r="http://schemas.openxmlformats.org/officeDocument/2006/relationships" xmlns:p="http://schemas.openxmlformats.org/presentationml/2006/main">
   <p:cSld>
     <p:spTree>
@@ -30387,7 +31396,7 @@
                 </a:solidFill>
               </a:rPr>
               <a:pPr/>
-              <a:t>59</a:t>
+              <a:t>63</a:t>
             </a:fld>
             <a:endParaRPr lang="en-US">
               <a:solidFill>
@@ -30442,263 +31451,7 @@
 </p:sld>
 </file>
 
-<file path=ppt/slides/slide6.xml><?xml version="1.0" encoding="utf-8"?>
-<p:sld xmlns:a="http://schemas.openxmlformats.org/drawingml/2006/main" xmlns:r="http://schemas.openxmlformats.org/officeDocument/2006/relationships" xmlns:p="http://schemas.openxmlformats.org/presentationml/2006/main">
-  <p:cSld>
-    <p:spTree>
-      <p:nvGrpSpPr>
-        <p:cNvPr id="1" name=""/>
-        <p:cNvGrpSpPr/>
-        <p:nvPr/>
-      </p:nvGrpSpPr>
-      <p:grpSpPr>
-        <a:xfrm>
-          <a:off x="0" y="0"/>
-          <a:ext cx="0" cy="0"/>
-          <a:chOff x="0" y="0"/>
-          <a:chExt cx="0" cy="0"/>
-        </a:xfrm>
-      </p:grpSpPr>
-      <p:sp>
-        <p:nvSpPr>
-          <p:cNvPr id="2" name="Title 1">
-            <a:extLst>
-              <a:ext uri="{FF2B5EF4-FFF2-40B4-BE49-F238E27FC236}">
-                <a16:creationId xmlns:a16="http://schemas.microsoft.com/office/drawing/2014/main" id="{CC688E9B-5F4F-4BBF-8471-D3FDE82C6EC4}"/>
-              </a:ext>
-            </a:extLst>
-          </p:cNvPr>
-          <p:cNvSpPr>
-            <a:spLocks noGrp="1"/>
-          </p:cNvSpPr>
-          <p:nvPr>
-            <p:ph type="title"/>
-          </p:nvPr>
-        </p:nvSpPr>
-        <p:spPr/>
-        <p:txBody>
-          <a:bodyPr/>
-          <a:lstStyle/>
-          <a:p>
-            <a:r>
-              <a:rPr lang="en-US" i="1" dirty="0"/>
-              <a:t>K</a:t>
-            </a:r>
-            <a:r>
-              <a:rPr lang="en-US" dirty="0"/>
-              <a:t>-nearest neighbors (</a:t>
-            </a:r>
-            <a:r>
-              <a:rPr lang="en-US" i="1" dirty="0"/>
-              <a:t>K</a:t>
-            </a:r>
-            <a:r>
-              <a:rPr lang="en-US" dirty="0"/>
-              <a:t>NN)</a:t>
-            </a:r>
-          </a:p>
-        </p:txBody>
-      </p:sp>
-      <p:sp>
-        <p:nvSpPr>
-          <p:cNvPr id="3" name="Content Placeholder 2">
-            <a:extLst>
-              <a:ext uri="{FF2B5EF4-FFF2-40B4-BE49-F238E27FC236}">
-                <a16:creationId xmlns:a16="http://schemas.microsoft.com/office/drawing/2014/main" id="{EA80F638-697C-4638-90E9-8261B8DC4D87}"/>
-              </a:ext>
-            </a:extLst>
-          </p:cNvPr>
-          <p:cNvSpPr>
-            <a:spLocks noGrp="1"/>
-          </p:cNvSpPr>
-          <p:nvPr>
-            <p:ph idx="1"/>
-          </p:nvPr>
-        </p:nvSpPr>
-        <p:spPr>
-          <a:xfrm>
-            <a:off x="838200" y="1825624"/>
-            <a:ext cx="10515600" cy="4742955"/>
-          </a:xfrm>
-        </p:spPr>
-        <p:txBody>
-          <a:bodyPr>
-            <a:normAutofit/>
-          </a:bodyPr>
-          <a:lstStyle/>
-          <a:p>
-            <a:r>
-              <a:rPr lang="en-US" i="1" dirty="0"/>
-              <a:t>K</a:t>
-            </a:r>
-            <a:r>
-              <a:rPr lang="en-US" dirty="0"/>
-              <a:t>NN is a</a:t>
-            </a:r>
-            <a:r>
-              <a:rPr lang="en-US" i="1" dirty="0"/>
-              <a:t> </a:t>
-            </a:r>
-            <a:r>
-              <a:rPr lang="en-US" dirty="0"/>
-              <a:t>nonparametric method </a:t>
-            </a:r>
-          </a:p>
-          <a:p>
-            <a:pPr lvl="1"/>
-            <a:r>
-              <a:rPr lang="en-US" dirty="0"/>
-              <a:t>Unlike parametric models, nonparametric models:</a:t>
-            </a:r>
-          </a:p>
-          <a:p>
-            <a:pPr lvl="2"/>
-            <a:r>
-              <a:rPr lang="en-US" dirty="0"/>
-              <a:t>cannot be described by a fixed number of parameters that are being adjusted to the training set</a:t>
-            </a:r>
-          </a:p>
-          <a:p>
-            <a:pPr lvl="2"/>
-            <a:r>
-              <a:rPr lang="en-US" dirty="0"/>
-              <a:t>the model structure is set </a:t>
-            </a:r>
-            <a:r>
-              <a:rPr lang="en-US" i="1" dirty="0"/>
-              <a:t>a priori </a:t>
-            </a:r>
-            <a:r>
-              <a:rPr lang="en-US" dirty="0"/>
-              <a:t>(and not defined by the training data)</a:t>
-            </a:r>
-          </a:p>
-          <a:p>
-            <a:pPr lvl="2"/>
-            <a:r>
-              <a:rPr lang="en-US" dirty="0"/>
-              <a:t>do not assume that the data follow certain probability distributions (except Bayesian nonparametric methods)</a:t>
-            </a:r>
-          </a:p>
-          <a:p>
-            <a:pPr lvl="2"/>
-            <a:r>
-              <a:rPr lang="en-US" dirty="0"/>
-              <a:t>make fewer assumptions about the data (than parametric methods)</a:t>
-            </a:r>
-          </a:p>
-          <a:p>
-            <a:r>
-              <a:rPr lang="en-US" i="1" dirty="0"/>
-              <a:t>K</a:t>
-            </a:r>
-            <a:r>
-              <a:rPr lang="en-US" dirty="0"/>
-              <a:t>NN uses lazy learning (or instance-based learning) </a:t>
-            </a:r>
-          </a:p>
-          <a:p>
-            <a:pPr lvl="1"/>
-            <a:r>
-              <a:rPr lang="en-US" dirty="0"/>
-              <a:t>There is no training or model fitting stage</a:t>
-            </a:r>
-          </a:p>
-          <a:p>
-            <a:pPr lvl="2"/>
-            <a:r>
-              <a:rPr lang="en-US" dirty="0"/>
-              <a:t>A </a:t>
-            </a:r>
-            <a:r>
-              <a:rPr lang="en-US" i="1" dirty="0"/>
-              <a:t>K</a:t>
-            </a:r>
-            <a:r>
-              <a:rPr lang="en-US" dirty="0"/>
-              <a:t>NN model literally stores the training data and uses it only at prediction time</a:t>
-            </a:r>
-          </a:p>
-          <a:p>
-            <a:pPr lvl="2"/>
-            <a:r>
-              <a:rPr lang="en-US" dirty="0"/>
-              <a:t>Thus, each training instance represents a parameter in </a:t>
-            </a:r>
-            <a:r>
-              <a:rPr lang="en-US" i="1" dirty="0"/>
-              <a:t>K</a:t>
-            </a:r>
-            <a:r>
-              <a:rPr lang="en-US" dirty="0"/>
-              <a:t>NN model </a:t>
-            </a:r>
-          </a:p>
-          <a:p>
-            <a:pPr lvl="2"/>
-            <a:r>
-              <a:rPr lang="en-US" dirty="0"/>
-              <a:t>Computationally inefficient</a:t>
-            </a:r>
-          </a:p>
-        </p:txBody>
-      </p:sp>
-      <p:sp>
-        <p:nvSpPr>
-          <p:cNvPr id="4" name="Slide Number Placeholder 3">
-            <a:extLst>
-              <a:ext uri="{FF2B5EF4-FFF2-40B4-BE49-F238E27FC236}">
-                <a16:creationId xmlns:a16="http://schemas.microsoft.com/office/drawing/2014/main" id="{CF3B792C-65E4-42A8-865B-B4C20E3046ED}"/>
-              </a:ext>
-            </a:extLst>
-          </p:cNvPr>
-          <p:cNvSpPr>
-            <a:spLocks noGrp="1"/>
-          </p:cNvSpPr>
-          <p:nvPr>
-            <p:ph type="sldNum" sz="quarter" idx="12"/>
-          </p:nvPr>
-        </p:nvSpPr>
-        <p:spPr/>
-        <p:txBody>
-          <a:bodyPr/>
-          <a:lstStyle/>
-          <a:p>
-            <a:fld id="{1FD78A80-B303-491C-AEE7-8281801B0C65}" type="slidenum">
-              <a:rPr lang="en-US" smtClean="0">
-                <a:solidFill>
-                  <a:prstClr val="black">
-                    <a:tint val="75000"/>
-                  </a:prstClr>
-                </a:solidFill>
-              </a:rPr>
-              <a:pPr/>
-              <a:t>6</a:t>
-            </a:fld>
-            <a:endParaRPr lang="en-US">
-              <a:solidFill>
-                <a:prstClr val="black">
-                  <a:tint val="75000"/>
-                </a:prstClr>
-              </a:solidFill>
-            </a:endParaRPr>
-          </a:p>
-        </p:txBody>
-      </p:sp>
-    </p:spTree>
-    <p:extLst>
-      <p:ext uri="{BB962C8B-B14F-4D97-AF65-F5344CB8AC3E}">
-        <p14:creationId xmlns:p14="http://schemas.microsoft.com/office/powerpoint/2010/main" val="1964165862"/>
-      </p:ext>
-    </p:extLst>
-  </p:cSld>
-  <p:clrMapOvr>
-    <a:masterClrMapping/>
-  </p:clrMapOvr>
-</p:sld>
-</file>
-
-<file path=ppt/slides/slide60.xml><?xml version="1.0" encoding="utf-8"?>
+<file path=ppt/slides/slide64.xml><?xml version="1.0" encoding="utf-8"?>
 <p:sld xmlns:a="http://schemas.openxmlformats.org/drawingml/2006/main" xmlns:r="http://schemas.openxmlformats.org/officeDocument/2006/relationships" xmlns:p="http://schemas.openxmlformats.org/presentationml/2006/main">
   <p:cSld>
     <p:spTree>
@@ -31588,7 +32341,7 @@
                 </a:solidFill>
               </a:rPr>
               <a:pPr/>
-              <a:t>60</a:t>
+              <a:t>64</a:t>
             </a:fld>
             <a:endParaRPr lang="en-US">
               <a:solidFill>
@@ -31613,7 +32366,7 @@
 </p:sld>
 </file>
 
-<file path=ppt/slides/slide61.xml><?xml version="1.0" encoding="utf-8"?>
+<file path=ppt/slides/slide65.xml><?xml version="1.0" encoding="utf-8"?>
 <p:sld xmlns:a="http://schemas.openxmlformats.org/drawingml/2006/main" xmlns:r="http://schemas.openxmlformats.org/officeDocument/2006/relationships" xmlns:p="http://schemas.openxmlformats.org/presentationml/2006/main">
   <p:cSld>
     <p:spTree>
@@ -31957,7 +32710,7 @@
                 </a:solidFill>
               </a:rPr>
               <a:pPr/>
-              <a:t>61</a:t>
+              <a:t>65</a:t>
             </a:fld>
             <a:endParaRPr lang="en-US">
               <a:solidFill>
@@ -32012,7 +32765,7 @@
 </p:sld>
 </file>
 
-<file path=ppt/slides/slide62.xml><?xml version="1.0" encoding="utf-8"?>
+<file path=ppt/slides/slide66.xml><?xml version="1.0" encoding="utf-8"?>
 <p:sld xmlns:a="http://schemas.openxmlformats.org/drawingml/2006/main" xmlns:r="http://schemas.openxmlformats.org/officeDocument/2006/relationships" xmlns:p="http://schemas.openxmlformats.org/presentationml/2006/main">
   <p:cSld>
     <p:bg>
@@ -32144,7 +32897,7 @@
                 <a:tabLst/>
                 <a:defRPr/>
               </a:pPr>
-              <a:t>62</a:t>
+              <a:t>66</a:t>
             </a:fld>
             <a:endParaRPr kumimoji="0" lang="en-US" sz="1200" b="0" i="0" u="none" strike="noStrike" kern="1200" cap="none" spc="0" normalizeH="0" baseline="0" noProof="0">
               <a:ln>
@@ -32215,7 +32968,7 @@
 </p:sld>
 </file>
 
-<file path=ppt/slides/slide63.xml><?xml version="1.0" encoding="utf-8"?>
+<file path=ppt/slides/slide67.xml><?xml version="1.0" encoding="utf-8"?>
 <p:sld xmlns:a="http://schemas.openxmlformats.org/drawingml/2006/main" xmlns:r="http://schemas.openxmlformats.org/officeDocument/2006/relationships" xmlns:p="http://schemas.openxmlformats.org/presentationml/2006/main">
   <p:cSld>
     <p:spTree>
@@ -32361,7 +33114,7 @@
                 </a:solidFill>
               </a:rPr>
               <a:pPr/>
-              <a:t>63</a:t>
+              <a:t>67</a:t>
             </a:fld>
             <a:endParaRPr lang="en-US">
               <a:solidFill>
@@ -32386,7 +33139,7 @@
 </p:sld>
 </file>
 
-<file path=ppt/slides/slide64.xml><?xml version="1.0" encoding="utf-8"?>
+<file path=ppt/slides/slide68.xml><?xml version="1.0" encoding="utf-8"?>
 <p:sld xmlns:a="http://schemas.openxmlformats.org/drawingml/2006/main" xmlns:r="http://schemas.openxmlformats.org/officeDocument/2006/relationships" xmlns:p="http://schemas.openxmlformats.org/presentationml/2006/main">
   <p:cSld>
     <p:spTree>
@@ -32832,7 +33585,7 @@
                 </a:solidFill>
               </a:rPr>
               <a:pPr/>
-              <a:t>64</a:t>
+              <a:t>68</a:t>
             </a:fld>
             <a:endParaRPr lang="en-US">
               <a:solidFill>

</xml_diff>

<commit_message>
update slides w2 & w6
</commit_message>
<xml_diff>
--- a/slides/w6p1-knn/w6p1.pptx
+++ b/slides/w6p1-knn/w6p1.pptx
@@ -68,11 +68,12 @@
     <p:sldId id="427" r:id="rId62"/>
     <p:sldId id="428" r:id="rId63"/>
     <p:sldId id="429" r:id="rId64"/>
-    <p:sldId id="434" r:id="rId65"/>
-    <p:sldId id="436" r:id="rId66"/>
-    <p:sldId id="430" r:id="rId67"/>
-    <p:sldId id="370" r:id="rId68"/>
-    <p:sldId id="371" r:id="rId69"/>
+    <p:sldId id="452" r:id="rId65"/>
+    <p:sldId id="434" r:id="rId66"/>
+    <p:sldId id="436" r:id="rId67"/>
+    <p:sldId id="430" r:id="rId68"/>
+    <p:sldId id="370" r:id="rId69"/>
+    <p:sldId id="371" r:id="rId70"/>
   </p:sldIdLst>
   <p:sldSz cx="12192000" cy="6858000"/>
   <p:notesSz cx="6858000" cy="9144000"/>
@@ -327,7 +328,7 @@
                 </a:solidFill>
               </a:rPr>
               <a:pPr/>
-              <a:t>3/27/2020</a:t>
+              <a:t>3/30/2020</a:t>
             </a:fld>
             <a:endParaRPr lang="en-US">
               <a:solidFill>
@@ -527,7 +528,7 @@
                 </a:solidFill>
               </a:rPr>
               <a:pPr/>
-              <a:t>3/27/2020</a:t>
+              <a:t>3/30/2020</a:t>
             </a:fld>
             <a:endParaRPr lang="en-US">
               <a:solidFill>
@@ -737,7 +738,7 @@
                 </a:solidFill>
               </a:rPr>
               <a:pPr/>
-              <a:t>3/27/2020</a:t>
+              <a:t>3/30/2020</a:t>
             </a:fld>
             <a:endParaRPr lang="en-US">
               <a:solidFill>
@@ -937,7 +938,7 @@
                 </a:solidFill>
               </a:rPr>
               <a:pPr/>
-              <a:t>3/27/2020</a:t>
+              <a:t>3/30/2020</a:t>
             </a:fld>
             <a:endParaRPr lang="en-US">
               <a:solidFill>
@@ -1214,7 +1215,7 @@
                 </a:solidFill>
               </a:rPr>
               <a:pPr/>
-              <a:t>3/27/2020</a:t>
+              <a:t>3/30/2020</a:t>
             </a:fld>
             <a:endParaRPr lang="en-US">
               <a:solidFill>
@@ -1475,7 +1476,7 @@
                 </a:solidFill>
               </a:rPr>
               <a:pPr/>
-              <a:t>3/27/2020</a:t>
+              <a:t>3/30/2020</a:t>
             </a:fld>
             <a:endParaRPr lang="en-US">
               <a:solidFill>
@@ -1871,7 +1872,7 @@
                 </a:solidFill>
               </a:rPr>
               <a:pPr/>
-              <a:t>3/27/2020</a:t>
+              <a:t>3/30/2020</a:t>
             </a:fld>
             <a:endParaRPr lang="en-US">
               <a:solidFill>
@@ -2020,7 +2021,7 @@
                 </a:solidFill>
               </a:rPr>
               <a:pPr/>
-              <a:t>3/27/2020</a:t>
+              <a:t>3/30/2020</a:t>
             </a:fld>
             <a:endParaRPr lang="en-US">
               <a:solidFill>
@@ -2147,7 +2148,7 @@
                 </a:solidFill>
               </a:rPr>
               <a:pPr/>
-              <a:t>3/27/2020</a:t>
+              <a:t>3/30/2020</a:t>
             </a:fld>
             <a:endParaRPr lang="en-US">
               <a:solidFill>
@@ -2454,7 +2455,7 @@
                 </a:solidFill>
               </a:rPr>
               <a:pPr/>
-              <a:t>3/27/2020</a:t>
+              <a:t>3/30/2020</a:t>
             </a:fld>
             <a:endParaRPr lang="en-US">
               <a:solidFill>
@@ -2738,7 +2739,7 @@
                 </a:solidFill>
               </a:rPr>
               <a:pPr/>
-              <a:t>3/27/2020</a:t>
+              <a:t>3/30/2020</a:t>
             </a:fld>
             <a:endParaRPr lang="en-US">
               <a:solidFill>
@@ -2981,7 +2982,7 @@
                 </a:solidFill>
               </a:rPr>
               <a:pPr/>
-              <a:t>3/27/2020</a:t>
+              <a:t>3/30/2020</a:t>
             </a:fld>
             <a:endParaRPr lang="en-US">
               <a:solidFill>
@@ -31454,6 +31455,139 @@
 <file path=ppt/slides/slide64.xml><?xml version="1.0" encoding="utf-8"?>
 <p:sld xmlns:a="http://schemas.openxmlformats.org/drawingml/2006/main" xmlns:r="http://schemas.openxmlformats.org/officeDocument/2006/relationships" xmlns:p="http://schemas.openxmlformats.org/presentationml/2006/main">
   <p:cSld>
+    <p:bg>
+      <p:bgPr>
+        <a:solidFill>
+          <a:srgbClr val="C00000"/>
+        </a:solidFill>
+        <a:effectLst/>
+      </p:bgPr>
+    </p:bg>
+    <p:spTree>
+      <p:nvGrpSpPr>
+        <p:cNvPr id="1" name=""/>
+        <p:cNvGrpSpPr/>
+        <p:nvPr/>
+      </p:nvGrpSpPr>
+      <p:grpSpPr>
+        <a:xfrm>
+          <a:off x="0" y="0"/>
+          <a:ext cx="0" cy="0"/>
+          <a:chOff x="0" y="0"/>
+          <a:chExt cx="0" cy="0"/>
+        </a:xfrm>
+      </p:grpSpPr>
+      <p:sp>
+        <p:nvSpPr>
+          <p:cNvPr id="2" name="Title 1">
+            <a:extLst>
+              <a:ext uri="{FF2B5EF4-FFF2-40B4-BE49-F238E27FC236}">
+                <a16:creationId xmlns:a16="http://schemas.microsoft.com/office/drawing/2014/main" id="{58680B64-C48B-481E-9933-48FBE06614C1}"/>
+              </a:ext>
+            </a:extLst>
+          </p:cNvPr>
+          <p:cNvSpPr>
+            <a:spLocks noGrp="1"/>
+          </p:cNvSpPr>
+          <p:nvPr>
+            <p:ph type="title"/>
+          </p:nvPr>
+        </p:nvSpPr>
+        <p:spPr/>
+        <p:txBody>
+          <a:bodyPr/>
+          <a:lstStyle/>
+          <a:p>
+            <a:r>
+              <a:rPr lang="en-US" dirty="0"/>
+              <a:t>Classification objective functions</a:t>
+            </a:r>
+          </a:p>
+        </p:txBody>
+      </p:sp>
+      <p:sp>
+        <p:nvSpPr>
+          <p:cNvPr id="3" name="Content Placeholder 2">
+            <a:extLst>
+              <a:ext uri="{FF2B5EF4-FFF2-40B4-BE49-F238E27FC236}">
+                <a16:creationId xmlns:a16="http://schemas.microsoft.com/office/drawing/2014/main" id="{290CEB26-3185-42EA-9E9C-0923F641BD41}"/>
+              </a:ext>
+            </a:extLst>
+          </p:cNvPr>
+          <p:cNvSpPr>
+            <a:spLocks noGrp="1"/>
+          </p:cNvSpPr>
+          <p:nvPr>
+            <p:ph idx="1"/>
+          </p:nvPr>
+        </p:nvSpPr>
+        <p:spPr/>
+        <p:txBody>
+          <a:bodyPr/>
+          <a:lstStyle/>
+          <a:p>
+            <a:endParaRPr lang="en-US" dirty="0"/>
+          </a:p>
+        </p:txBody>
+      </p:sp>
+      <p:sp>
+        <p:nvSpPr>
+          <p:cNvPr id="4" name="Slide Number Placeholder 3">
+            <a:extLst>
+              <a:ext uri="{FF2B5EF4-FFF2-40B4-BE49-F238E27FC236}">
+                <a16:creationId xmlns:a16="http://schemas.microsoft.com/office/drawing/2014/main" id="{053AAA38-4CC8-4868-9839-5A557209F9BA}"/>
+              </a:ext>
+            </a:extLst>
+          </p:cNvPr>
+          <p:cNvSpPr>
+            <a:spLocks noGrp="1"/>
+          </p:cNvSpPr>
+          <p:nvPr>
+            <p:ph type="sldNum" sz="quarter" idx="12"/>
+          </p:nvPr>
+        </p:nvSpPr>
+        <p:spPr/>
+        <p:txBody>
+          <a:bodyPr/>
+          <a:lstStyle/>
+          <a:p>
+            <a:fld id="{1FD78A80-B303-491C-AEE7-8281801B0C65}" type="slidenum">
+              <a:rPr lang="en-US" smtClean="0">
+                <a:solidFill>
+                  <a:prstClr val="black">
+                    <a:tint val="75000"/>
+                  </a:prstClr>
+                </a:solidFill>
+              </a:rPr>
+              <a:pPr/>
+              <a:t>64</a:t>
+            </a:fld>
+            <a:endParaRPr lang="en-US">
+              <a:solidFill>
+                <a:prstClr val="black">
+                  <a:tint val="75000"/>
+                </a:prstClr>
+              </a:solidFill>
+            </a:endParaRPr>
+          </a:p>
+        </p:txBody>
+      </p:sp>
+    </p:spTree>
+    <p:extLst>
+      <p:ext uri="{BB962C8B-B14F-4D97-AF65-F5344CB8AC3E}">
+        <p14:creationId xmlns:p14="http://schemas.microsoft.com/office/powerpoint/2010/main" val="280631986"/>
+      </p:ext>
+    </p:extLst>
+  </p:cSld>
+  <p:clrMapOvr>
+    <a:masterClrMapping/>
+  </p:clrMapOvr>
+</p:sld>
+</file>
+
+<file path=ppt/slides/slide65.xml><?xml version="1.0" encoding="utf-8"?>
+<p:sld xmlns:a="http://schemas.openxmlformats.org/drawingml/2006/main" xmlns:r="http://schemas.openxmlformats.org/officeDocument/2006/relationships" xmlns:p="http://schemas.openxmlformats.org/presentationml/2006/main">
+  <p:cSld>
     <p:spTree>
       <p:nvGrpSpPr>
         <p:cNvPr id="1" name=""/>
@@ -32341,7 +32475,7 @@
                 </a:solidFill>
               </a:rPr>
               <a:pPr/>
-              <a:t>64</a:t>
+              <a:t>65</a:t>
             </a:fld>
             <a:endParaRPr lang="en-US">
               <a:solidFill>
@@ -32366,7 +32500,7 @@
 </p:sld>
 </file>
 
-<file path=ppt/slides/slide65.xml><?xml version="1.0" encoding="utf-8"?>
+<file path=ppt/slides/slide66.xml><?xml version="1.0" encoding="utf-8"?>
 <p:sld xmlns:a="http://schemas.openxmlformats.org/drawingml/2006/main" xmlns:r="http://schemas.openxmlformats.org/officeDocument/2006/relationships" xmlns:p="http://schemas.openxmlformats.org/presentationml/2006/main">
   <p:cSld>
     <p:spTree>
@@ -32710,7 +32844,7 @@
                 </a:solidFill>
               </a:rPr>
               <a:pPr/>
-              <a:t>65</a:t>
+              <a:t>66</a:t>
             </a:fld>
             <a:endParaRPr lang="en-US">
               <a:solidFill>
@@ -32765,7 +32899,7 @@
 </p:sld>
 </file>
 
-<file path=ppt/slides/slide66.xml><?xml version="1.0" encoding="utf-8"?>
+<file path=ppt/slides/slide67.xml><?xml version="1.0" encoding="utf-8"?>
 <p:sld xmlns:a="http://schemas.openxmlformats.org/drawingml/2006/main" xmlns:r="http://schemas.openxmlformats.org/officeDocument/2006/relationships" xmlns:p="http://schemas.openxmlformats.org/presentationml/2006/main">
   <p:cSld>
     <p:bg>
@@ -32897,7 +33031,7 @@
                 <a:tabLst/>
                 <a:defRPr/>
               </a:pPr>
-              <a:t>66</a:t>
+              <a:t>67</a:t>
             </a:fld>
             <a:endParaRPr kumimoji="0" lang="en-US" sz="1200" b="0" i="0" u="none" strike="noStrike" kern="1200" cap="none" spc="0" normalizeH="0" baseline="0" noProof="0">
               <a:ln>
@@ -32968,7 +33102,7 @@
 </p:sld>
 </file>
 
-<file path=ppt/slides/slide67.xml><?xml version="1.0" encoding="utf-8"?>
+<file path=ppt/slides/slide68.xml><?xml version="1.0" encoding="utf-8"?>
 <p:sld xmlns:a="http://schemas.openxmlformats.org/drawingml/2006/main" xmlns:r="http://schemas.openxmlformats.org/officeDocument/2006/relationships" xmlns:p="http://schemas.openxmlformats.org/presentationml/2006/main">
   <p:cSld>
     <p:spTree>
@@ -33114,7 +33248,7 @@
                 </a:solidFill>
               </a:rPr>
               <a:pPr/>
-              <a:t>67</a:t>
+              <a:t>68</a:t>
             </a:fld>
             <a:endParaRPr lang="en-US">
               <a:solidFill>
@@ -33139,7 +33273,7 @@
 </p:sld>
 </file>
 
-<file path=ppt/slides/slide68.xml><?xml version="1.0" encoding="utf-8"?>
+<file path=ppt/slides/slide69.xml><?xml version="1.0" encoding="utf-8"?>
 <p:sld xmlns:a="http://schemas.openxmlformats.org/drawingml/2006/main" xmlns:r="http://schemas.openxmlformats.org/officeDocument/2006/relationships" xmlns:p="http://schemas.openxmlformats.org/presentationml/2006/main">
   <p:cSld>
     <p:spTree>
@@ -33585,7 +33719,7 @@
                 </a:solidFill>
               </a:rPr>
               <a:pPr/>
-              <a:t>68</a:t>
+              <a:t>69</a:t>
             </a:fld>
             <a:endParaRPr lang="en-US">
               <a:solidFill>

</xml_diff>